<commit_message>
more slides and notes
</commit_message>
<xml_diff>
--- a/slides.pptx
+++ b/slides.pptx
@@ -5,12 +5,17 @@
     <p:sldMasterId id="2147483648" r:id="rId1"/>
   </p:sldMasterIdLst>
   <p:notesMasterIdLst>
-    <p:notesMasterId r:id="rId5"/>
+    <p:notesMasterId r:id="rId10"/>
   </p:notesMasterIdLst>
   <p:sldIdLst>
     <p:sldId id="256" r:id="rId2"/>
     <p:sldId id="258" r:id="rId3"/>
-    <p:sldId id="257" r:id="rId4"/>
+    <p:sldId id="261" r:id="rId4"/>
+    <p:sldId id="262" r:id="rId5"/>
+    <p:sldId id="263" r:id="rId6"/>
+    <p:sldId id="264" r:id="rId7"/>
+    <p:sldId id="257" r:id="rId8"/>
+    <p:sldId id="260" r:id="rId9"/>
   </p:sldIdLst>
   <p:sldSz cx="12192000" cy="6858000"/>
   <p:notesSz cx="6858000" cy="9144000"/>
@@ -203,7 +208,7 @@
           <a:p>
             <a:fld id="{9768728B-C74D-450C-A579-E5E997D18F7C}" type="datetimeFigureOut">
               <a:rPr lang="de-DE" smtClean="0"/>
-              <a:t>05.11.2017</a:t>
+              <a:t>06.11.2017</a:t>
             </a:fld>
             <a:endParaRPr lang="de-DE"/>
           </a:p>
@@ -911,10 +916,109 @@
           <a:lstStyle/>
           <a:p>
             <a:r>
-              <a:rPr lang="de-DE" dirty="0" err="1"/>
-              <a:t>todo</a:t>
-            </a:r>
-            <a:endParaRPr lang="de-DE" dirty="0"/>
+              <a:rPr lang="en-US" dirty="0" err="1"/>
+              <a:t>Todo</a:t>
+            </a:r>
+            <a:r>
+              <a:rPr lang="en-US" dirty="0"/>
+              <a:t>: </a:t>
+            </a:r>
+            <a:r>
+              <a:rPr lang="en-US" dirty="0" err="1"/>
+              <a:t>wirklich</a:t>
+            </a:r>
+            <a:r>
+              <a:rPr lang="en-US" dirty="0"/>
+              <a:t> relevant und </a:t>
+            </a:r>
+            <a:r>
+              <a:rPr lang="en-US" dirty="0" err="1"/>
+              <a:t>leicht</a:t>
+            </a:r>
+            <a:r>
+              <a:rPr lang="en-US" dirty="0"/>
+              <a:t> </a:t>
+            </a:r>
+            <a:r>
+              <a:rPr lang="en-US" dirty="0" err="1"/>
+              <a:t>genug</a:t>
+            </a:r>
+            <a:r>
+              <a:rPr lang="en-US" dirty="0"/>
+              <a:t> </a:t>
+            </a:r>
+            <a:r>
+              <a:rPr lang="en-US" dirty="0" err="1"/>
+              <a:t>verständlich</a:t>
+            </a:r>
+            <a:r>
+              <a:rPr lang="en-US" dirty="0"/>
+              <a:t>? </a:t>
+            </a:r>
+            <a:r>
+              <a:rPr lang="en-US" dirty="0" err="1"/>
+              <a:t>Evtl</a:t>
+            </a:r>
+            <a:r>
+              <a:rPr lang="en-US" dirty="0"/>
+              <a:t>. </a:t>
+            </a:r>
+            <a:r>
+              <a:rPr lang="en-US" dirty="0" err="1"/>
+              <a:t>besser</a:t>
+            </a:r>
+            <a:r>
+              <a:rPr lang="en-US" dirty="0"/>
+              <a:t> so </a:t>
+            </a:r>
+            <a:r>
+              <a:rPr lang="en-US" dirty="0" err="1"/>
+              <a:t>erklären</a:t>
+            </a:r>
+            <a:r>
+              <a:rPr lang="en-US" dirty="0"/>
+              <a:t> </a:t>
+            </a:r>
+            <a:r>
+              <a:rPr lang="en-US" dirty="0" err="1"/>
+              <a:t>wie</a:t>
+            </a:r>
+            <a:r>
+              <a:rPr lang="en-US" dirty="0"/>
+              <a:t> der </a:t>
+            </a:r>
+            <a:r>
+              <a:rPr lang="en-US" dirty="0" err="1"/>
+              <a:t>letzte</a:t>
+            </a:r>
+            <a:r>
+              <a:rPr lang="en-US" dirty="0"/>
+              <a:t> </a:t>
+            </a:r>
+            <a:r>
+              <a:rPr lang="en-US" dirty="0" err="1"/>
+              <a:t>Absatz</a:t>
+            </a:r>
+            <a:r>
+              <a:rPr lang="en-US" dirty="0"/>
+              <a:t> </a:t>
+            </a:r>
+            <a:r>
+              <a:rPr lang="en-US" dirty="0" err="1"/>
+              <a:t>vor</a:t>
+            </a:r>
+            <a:r>
+              <a:rPr lang="en-US" dirty="0"/>
+              <a:t> </a:t>
+            </a:r>
+            <a:r>
+              <a:rPr lang="en-US" dirty="0" err="1"/>
+              <a:t>Abschnitt</a:t>
+            </a:r>
+            <a:r>
+              <a:rPr lang="en-US" dirty="0"/>
+              <a:t> 1.1?</a:t>
+            </a:r>
           </a:p>
         </p:txBody>
       </p:sp>
@@ -944,7 +1048,452 @@
     </p:spTree>
     <p:extLst>
       <p:ext uri="{BB962C8B-B14F-4D97-AF65-F5344CB8AC3E}">
+        <p14:creationId xmlns:p14="http://schemas.microsoft.com/office/powerpoint/2010/main" val="3558965081"/>
+      </p:ext>
+    </p:extLst>
+  </p:cSld>
+  <p:clrMapOvr>
+    <a:masterClrMapping/>
+  </p:clrMapOvr>
+</p:notes>
+</file>
+
+<file path=ppt/notesSlides/notesSlide4.xml><?xml version="1.0" encoding="utf-8"?>
+<p:notes xmlns:a="http://schemas.openxmlformats.org/drawingml/2006/main" xmlns:r="http://schemas.openxmlformats.org/officeDocument/2006/relationships" xmlns:p="http://schemas.openxmlformats.org/presentationml/2006/main">
+  <p:cSld>
+    <p:spTree>
+      <p:nvGrpSpPr>
+        <p:cNvPr id="1" name=""/>
+        <p:cNvGrpSpPr/>
+        <p:nvPr/>
+      </p:nvGrpSpPr>
+      <p:grpSpPr>
+        <a:xfrm>
+          <a:off x="0" y="0"/>
+          <a:ext cx="0" cy="0"/>
+          <a:chOff x="0" y="0"/>
+          <a:chExt cx="0" cy="0"/>
+        </a:xfrm>
+      </p:grpSpPr>
+      <p:sp>
+        <p:nvSpPr>
+          <p:cNvPr id="2" name="Folienbildplatzhalter 1"/>
+          <p:cNvSpPr>
+            <a:spLocks noGrp="1" noRot="1" noChangeAspect="1"/>
+          </p:cNvSpPr>
+          <p:nvPr>
+            <p:ph type="sldImg"/>
+          </p:nvPr>
+        </p:nvSpPr>
+        <p:spPr/>
+      </p:sp>
+      <p:sp>
+        <p:nvSpPr>
+          <p:cNvPr id="3" name="Notizenplatzhalter 2"/>
+          <p:cNvSpPr>
+            <a:spLocks noGrp="1"/>
+          </p:cNvSpPr>
+          <p:nvPr>
+            <p:ph type="body" idx="1"/>
+          </p:nvPr>
+        </p:nvSpPr>
+        <p:spPr/>
+        <p:txBody>
+          <a:bodyPr/>
+          <a:lstStyle/>
+          <a:p>
+            <a:r>
+              <a:rPr lang="en-US" dirty="0"/>
+              <a:t>needed?</a:t>
+            </a:r>
+          </a:p>
+        </p:txBody>
+      </p:sp>
+      <p:sp>
+        <p:nvSpPr>
+          <p:cNvPr id="4" name="Foliennummernplatzhalter 3"/>
+          <p:cNvSpPr>
+            <a:spLocks noGrp="1"/>
+          </p:cNvSpPr>
+          <p:nvPr>
+            <p:ph type="sldNum" sz="quarter" idx="10"/>
+          </p:nvPr>
+        </p:nvSpPr>
+        <p:spPr/>
+        <p:txBody>
+          <a:bodyPr/>
+          <a:lstStyle/>
+          <a:p>
+            <a:fld id="{FAA32559-8951-4C46-A356-FBB9455D7E38}" type="slidenum">
+              <a:rPr lang="de-DE" smtClean="0"/>
+              <a:t>4</a:t>
+            </a:fld>
+            <a:endParaRPr lang="de-DE"/>
+          </a:p>
+        </p:txBody>
+      </p:sp>
+    </p:spTree>
+    <p:extLst>
+      <p:ext uri="{BB962C8B-B14F-4D97-AF65-F5344CB8AC3E}">
+        <p14:creationId xmlns:p14="http://schemas.microsoft.com/office/powerpoint/2010/main" val="4070183969"/>
+      </p:ext>
+    </p:extLst>
+  </p:cSld>
+  <p:clrMapOvr>
+    <a:masterClrMapping/>
+  </p:clrMapOvr>
+</p:notes>
+</file>
+
+<file path=ppt/notesSlides/notesSlide5.xml><?xml version="1.0" encoding="utf-8"?>
+<p:notes xmlns:a="http://schemas.openxmlformats.org/drawingml/2006/main" xmlns:r="http://schemas.openxmlformats.org/officeDocument/2006/relationships" xmlns:p="http://schemas.openxmlformats.org/presentationml/2006/main">
+  <p:cSld>
+    <p:spTree>
+      <p:nvGrpSpPr>
+        <p:cNvPr id="1" name=""/>
+        <p:cNvGrpSpPr/>
+        <p:nvPr/>
+      </p:nvGrpSpPr>
+      <p:grpSpPr>
+        <a:xfrm>
+          <a:off x="0" y="0"/>
+          <a:ext cx="0" cy="0"/>
+          <a:chOff x="0" y="0"/>
+          <a:chExt cx="0" cy="0"/>
+        </a:xfrm>
+      </p:grpSpPr>
+      <p:sp>
+        <p:nvSpPr>
+          <p:cNvPr id="2" name="Folienbildplatzhalter 1"/>
+          <p:cNvSpPr>
+            <a:spLocks noGrp="1" noRot="1" noChangeAspect="1"/>
+          </p:cNvSpPr>
+          <p:nvPr>
+            <p:ph type="sldImg"/>
+          </p:nvPr>
+        </p:nvSpPr>
+        <p:spPr/>
+      </p:sp>
+      <p:sp>
+        <p:nvSpPr>
+          <p:cNvPr id="3" name="Notizenplatzhalter 2"/>
+          <p:cNvSpPr>
+            <a:spLocks noGrp="1"/>
+          </p:cNvSpPr>
+          <p:nvPr>
+            <p:ph type="body" idx="1"/>
+          </p:nvPr>
+        </p:nvSpPr>
+        <p:spPr/>
+        <p:txBody>
+          <a:bodyPr/>
+          <a:lstStyle/>
+          <a:p>
+            <a:r>
+              <a:rPr lang="en-US" dirty="0"/>
+              <a:t>and they will, in the case where the languages are infinite.</a:t>
+            </a:r>
+          </a:p>
+          <a:p>
+            <a:endParaRPr lang="en-US" dirty="0"/>
+          </a:p>
+          <a:p>
+            <a:r>
+              <a:rPr lang="en-US" dirty="0"/>
+              <a:t>… and if a representation is finite, we can at least hope to be able to construct it.</a:t>
+            </a:r>
+          </a:p>
+        </p:txBody>
+      </p:sp>
+      <p:sp>
+        <p:nvSpPr>
+          <p:cNvPr id="4" name="Foliennummernplatzhalter 3"/>
+          <p:cNvSpPr>
+            <a:spLocks noGrp="1"/>
+          </p:cNvSpPr>
+          <p:nvPr>
+            <p:ph type="sldNum" sz="quarter" idx="10"/>
+          </p:nvPr>
+        </p:nvSpPr>
+        <p:spPr/>
+        <p:txBody>
+          <a:bodyPr/>
+          <a:lstStyle/>
+          <a:p>
+            <a:fld id="{FAA32559-8951-4C46-A356-FBB9455D7E38}" type="slidenum">
+              <a:rPr lang="de-DE" smtClean="0"/>
+              <a:t>5</a:t>
+            </a:fld>
+            <a:endParaRPr lang="de-DE"/>
+          </a:p>
+        </p:txBody>
+      </p:sp>
+    </p:spTree>
+    <p:extLst>
+      <p:ext uri="{BB962C8B-B14F-4D97-AF65-F5344CB8AC3E}">
+        <p14:creationId xmlns:p14="http://schemas.microsoft.com/office/powerpoint/2010/main" val="2346868481"/>
+      </p:ext>
+    </p:extLst>
+  </p:cSld>
+  <p:clrMapOvr>
+    <a:masterClrMapping/>
+  </p:clrMapOvr>
+</p:notes>
+</file>
+
+<file path=ppt/notesSlides/notesSlide6.xml><?xml version="1.0" encoding="utf-8"?>
+<p:notes xmlns:a="http://schemas.openxmlformats.org/drawingml/2006/main" xmlns:r="http://schemas.openxmlformats.org/officeDocument/2006/relationships" xmlns:p="http://schemas.openxmlformats.org/presentationml/2006/main">
+  <p:cSld>
+    <p:spTree>
+      <p:nvGrpSpPr>
+        <p:cNvPr id="1" name=""/>
+        <p:cNvGrpSpPr/>
+        <p:nvPr/>
+      </p:nvGrpSpPr>
+      <p:grpSpPr>
+        <a:xfrm>
+          <a:off x="0" y="0"/>
+          <a:ext cx="0" cy="0"/>
+          <a:chOff x="0" y="0"/>
+          <a:chExt cx="0" cy="0"/>
+        </a:xfrm>
+      </p:grpSpPr>
+      <p:sp>
+        <p:nvSpPr>
+          <p:cNvPr id="2" name="Folienbildplatzhalter 1"/>
+          <p:cNvSpPr>
+            <a:spLocks noGrp="1" noRot="1" noChangeAspect="1"/>
+          </p:cNvSpPr>
+          <p:nvPr>
+            <p:ph type="sldImg"/>
+          </p:nvPr>
+        </p:nvSpPr>
+        <p:spPr/>
+      </p:sp>
+      <p:sp>
+        <p:nvSpPr>
+          <p:cNvPr id="3" name="Notizenplatzhalter 2"/>
+          <p:cNvSpPr>
+            <a:spLocks noGrp="1"/>
+          </p:cNvSpPr>
+          <p:nvPr>
+            <p:ph type="body" idx="1"/>
+          </p:nvPr>
+        </p:nvSpPr>
+        <p:spPr/>
+        <p:txBody>
+          <a:bodyPr/>
+          <a:lstStyle/>
+          <a:p>
+            <a:r>
+              <a:rPr lang="en-US" dirty="0"/>
+              <a:t>…and _must_, for this algorithm</a:t>
+            </a:r>
+          </a:p>
+        </p:txBody>
+      </p:sp>
+      <p:sp>
+        <p:nvSpPr>
+          <p:cNvPr id="4" name="Foliennummernplatzhalter 3"/>
+          <p:cNvSpPr>
+            <a:spLocks noGrp="1"/>
+          </p:cNvSpPr>
+          <p:nvPr>
+            <p:ph type="sldNum" sz="quarter" idx="10"/>
+          </p:nvPr>
+        </p:nvSpPr>
+        <p:spPr/>
+        <p:txBody>
+          <a:bodyPr/>
+          <a:lstStyle/>
+          <a:p>
+            <a:fld id="{FAA32559-8951-4C46-A356-FBB9455D7E38}" type="slidenum">
+              <a:rPr lang="de-DE" smtClean="0"/>
+              <a:t>6</a:t>
+            </a:fld>
+            <a:endParaRPr lang="de-DE"/>
+          </a:p>
+        </p:txBody>
+      </p:sp>
+    </p:spTree>
+    <p:extLst>
+      <p:ext uri="{BB962C8B-B14F-4D97-AF65-F5344CB8AC3E}">
+        <p14:creationId xmlns:p14="http://schemas.microsoft.com/office/powerpoint/2010/main" val="2615019396"/>
+      </p:ext>
+    </p:extLst>
+  </p:cSld>
+  <p:clrMapOvr>
+    <a:masterClrMapping/>
+  </p:clrMapOvr>
+</p:notes>
+</file>
+
+<file path=ppt/notesSlides/notesSlide7.xml><?xml version="1.0" encoding="utf-8"?>
+<p:notes xmlns:a="http://schemas.openxmlformats.org/drawingml/2006/main" xmlns:r="http://schemas.openxmlformats.org/officeDocument/2006/relationships" xmlns:p="http://schemas.openxmlformats.org/presentationml/2006/main">
+  <p:cSld>
+    <p:spTree>
+      <p:nvGrpSpPr>
+        <p:cNvPr id="1" name=""/>
+        <p:cNvGrpSpPr/>
+        <p:nvPr/>
+      </p:nvGrpSpPr>
+      <p:grpSpPr>
+        <a:xfrm>
+          <a:off x="0" y="0"/>
+          <a:ext cx="0" cy="0"/>
+          <a:chOff x="0" y="0"/>
+          <a:chExt cx="0" cy="0"/>
+        </a:xfrm>
+      </p:grpSpPr>
+      <p:sp>
+        <p:nvSpPr>
+          <p:cNvPr id="2" name="Folienbildplatzhalter 1"/>
+          <p:cNvSpPr>
+            <a:spLocks noGrp="1" noRot="1" noChangeAspect="1"/>
+          </p:cNvSpPr>
+          <p:nvPr>
+            <p:ph type="sldImg"/>
+          </p:nvPr>
+        </p:nvSpPr>
+        <p:spPr/>
+      </p:sp>
+      <p:sp>
+        <p:nvSpPr>
+          <p:cNvPr id="3" name="Notizenplatzhalter 2"/>
+          <p:cNvSpPr>
+            <a:spLocks noGrp="1"/>
+          </p:cNvSpPr>
+          <p:nvPr>
+            <p:ph type="body" idx="1"/>
+          </p:nvPr>
+        </p:nvSpPr>
+        <p:spPr/>
+        <p:txBody>
+          <a:bodyPr/>
+          <a:lstStyle/>
+          <a:p>
+            <a:r>
+              <a:rPr lang="de-DE" dirty="0" err="1"/>
+              <a:t>todo</a:t>
+            </a:r>
+            <a:endParaRPr lang="de-DE" dirty="0"/>
+          </a:p>
+        </p:txBody>
+      </p:sp>
+      <p:sp>
+        <p:nvSpPr>
+          <p:cNvPr id="4" name="Foliennummernplatzhalter 3"/>
+          <p:cNvSpPr>
+            <a:spLocks noGrp="1"/>
+          </p:cNvSpPr>
+          <p:nvPr>
+            <p:ph type="sldNum" sz="quarter" idx="10"/>
+          </p:nvPr>
+        </p:nvSpPr>
+        <p:spPr/>
+        <p:txBody>
+          <a:bodyPr/>
+          <a:lstStyle/>
+          <a:p>
+            <a:fld id="{FAA32559-8951-4C46-A356-FBB9455D7E38}" type="slidenum">
+              <a:rPr lang="de-DE" smtClean="0"/>
+              <a:t>7</a:t>
+            </a:fld>
+            <a:endParaRPr lang="de-DE"/>
+          </a:p>
+        </p:txBody>
+      </p:sp>
+    </p:spTree>
+    <p:extLst>
+      <p:ext uri="{BB962C8B-B14F-4D97-AF65-F5344CB8AC3E}">
         <p14:creationId xmlns:p14="http://schemas.microsoft.com/office/powerpoint/2010/main" val="277471394"/>
+      </p:ext>
+    </p:extLst>
+  </p:cSld>
+  <p:clrMapOvr>
+    <a:masterClrMapping/>
+  </p:clrMapOvr>
+</p:notes>
+</file>
+
+<file path=ppt/notesSlides/notesSlide8.xml><?xml version="1.0" encoding="utf-8"?>
+<p:notes xmlns:a="http://schemas.openxmlformats.org/drawingml/2006/main" xmlns:r="http://schemas.openxmlformats.org/officeDocument/2006/relationships" xmlns:p="http://schemas.openxmlformats.org/presentationml/2006/main">
+  <p:cSld>
+    <p:spTree>
+      <p:nvGrpSpPr>
+        <p:cNvPr id="1" name=""/>
+        <p:cNvGrpSpPr/>
+        <p:nvPr/>
+      </p:nvGrpSpPr>
+      <p:grpSpPr>
+        <a:xfrm>
+          <a:off x="0" y="0"/>
+          <a:ext cx="0" cy="0"/>
+          <a:chOff x="0" y="0"/>
+          <a:chExt cx="0" cy="0"/>
+        </a:xfrm>
+      </p:grpSpPr>
+      <p:sp>
+        <p:nvSpPr>
+          <p:cNvPr id="2" name="Folienbildplatzhalter 1"/>
+          <p:cNvSpPr>
+            <a:spLocks noGrp="1" noRot="1" noChangeAspect="1"/>
+          </p:cNvSpPr>
+          <p:nvPr>
+            <p:ph type="sldImg"/>
+          </p:nvPr>
+        </p:nvSpPr>
+        <p:spPr/>
+      </p:sp>
+      <p:sp>
+        <p:nvSpPr>
+          <p:cNvPr id="3" name="Notizenplatzhalter 2"/>
+          <p:cNvSpPr>
+            <a:spLocks noGrp="1"/>
+          </p:cNvSpPr>
+          <p:nvPr>
+            <p:ph type="body" idx="1"/>
+          </p:nvPr>
+        </p:nvSpPr>
+        <p:spPr/>
+        <p:txBody>
+          <a:bodyPr/>
+          <a:lstStyle/>
+          <a:p>
+            <a:r>
+              <a:rPr lang="en-US" dirty="0"/>
+              <a:t>Question to the audience: How to obtain a decision procedure for “⊆”?</a:t>
+            </a:r>
+          </a:p>
+        </p:txBody>
+      </p:sp>
+      <p:sp>
+        <p:nvSpPr>
+          <p:cNvPr id="4" name="Foliennummernplatzhalter 3"/>
+          <p:cNvSpPr>
+            <a:spLocks noGrp="1"/>
+          </p:cNvSpPr>
+          <p:nvPr>
+            <p:ph type="sldNum" sz="quarter" idx="10"/>
+          </p:nvPr>
+        </p:nvSpPr>
+        <p:spPr/>
+        <p:txBody>
+          <a:bodyPr/>
+          <a:lstStyle/>
+          <a:p>
+            <a:fld id="{FAA32559-8951-4C46-A356-FBB9455D7E38}" type="slidenum">
+              <a:rPr lang="de-DE" smtClean="0"/>
+              <a:t>8</a:t>
+            </a:fld>
+            <a:endParaRPr lang="de-DE"/>
+          </a:p>
+        </p:txBody>
+      </p:sp>
+    </p:spTree>
+    <p:extLst>
+      <p:ext uri="{BB962C8B-B14F-4D97-AF65-F5344CB8AC3E}">
+        <p14:creationId xmlns:p14="http://schemas.microsoft.com/office/powerpoint/2010/main" val="4044844971"/>
       </p:ext>
     </p:extLst>
   </p:cSld>
@@ -1101,7 +1650,7 @@
           <a:p>
             <a:fld id="{B8511AE9-C2D5-45E7-980E-A4DD1A9265AF}" type="datetimeFigureOut">
               <a:rPr lang="en-US" noProof="0" smtClean="0"/>
-              <a:t>11/5/2017</a:t>
+              <a:t>11/6/2017</a:t>
             </a:fld>
             <a:endParaRPr lang="en-US" noProof="0"/>
           </a:p>
@@ -1299,7 +1848,7 @@
           <a:p>
             <a:fld id="{B8511AE9-C2D5-45E7-980E-A4DD1A9265AF}" type="datetimeFigureOut">
               <a:rPr lang="de-DE" smtClean="0"/>
-              <a:t>05.11.2017</a:t>
+              <a:t>06.11.2017</a:t>
             </a:fld>
             <a:endParaRPr lang="de-DE"/>
           </a:p>
@@ -1601,7 +2150,7 @@
             <a:fld id="{B8511AE9-C2D5-45E7-980E-A4DD1A9265AF}" type="datetimeFigureOut">
               <a:rPr lang="en-US" noProof="0" smtClean="0"/>
               <a:pPr/>
-              <a:t>11/5/2017</a:t>
+              <a:t>11/6/2017</a:t>
             </a:fld>
             <a:endParaRPr lang="en-US" noProof="0"/>
           </a:p>
@@ -1755,7 +2304,7 @@
           <a:p>
             <a:fld id="{B8511AE9-C2D5-45E7-980E-A4DD1A9265AF}" type="datetimeFigureOut">
               <a:rPr lang="en-US" noProof="0" smtClean="0"/>
-              <a:t>11/5/2017</a:t>
+              <a:t>11/6/2017</a:t>
             </a:fld>
             <a:endParaRPr lang="en-US" noProof="0"/>
           </a:p>
@@ -1953,7 +2502,7 @@
           <a:p>
             <a:fld id="{B8511AE9-C2D5-45E7-980E-A4DD1A9265AF}" type="datetimeFigureOut">
               <a:rPr lang="en-US" noProof="0" smtClean="0"/>
-              <a:t>11/5/2017</a:t>
+              <a:t>11/6/2017</a:t>
             </a:fld>
             <a:endParaRPr lang="en-US" noProof="0"/>
           </a:p>
@@ -2228,7 +2777,7 @@
           <a:p>
             <a:fld id="{B8511AE9-C2D5-45E7-980E-A4DD1A9265AF}" type="datetimeFigureOut">
               <a:rPr lang="en-US" noProof="0" smtClean="0"/>
-              <a:t>11/5/2017</a:t>
+              <a:t>11/6/2017</a:t>
             </a:fld>
             <a:endParaRPr lang="en-US" noProof="0"/>
           </a:p>
@@ -2550,7 +3099,7 @@
           <a:p>
             <a:fld id="{B8511AE9-C2D5-45E7-980E-A4DD1A9265AF}" type="datetimeFigureOut">
               <a:rPr lang="en-US" noProof="0" smtClean="0"/>
-              <a:t>11/5/2017</a:t>
+              <a:t>11/6/2017</a:t>
             </a:fld>
             <a:endParaRPr lang="en-US" noProof="0"/>
           </a:p>
@@ -2962,7 +3511,7 @@
           <a:p>
             <a:fld id="{B8511AE9-C2D5-45E7-980E-A4DD1A9265AF}" type="datetimeFigureOut">
               <a:rPr lang="en-US" noProof="0" smtClean="0"/>
-              <a:t>11/5/2017</a:t>
+              <a:t>11/6/2017</a:t>
             </a:fld>
             <a:endParaRPr lang="en-US" noProof="0"/>
           </a:p>
@@ -3103,7 +3652,7 @@
           <a:p>
             <a:fld id="{B8511AE9-C2D5-45E7-980E-A4DD1A9265AF}" type="datetimeFigureOut">
               <a:rPr lang="en-US" noProof="0" smtClean="0"/>
-              <a:t>11/5/2017</a:t>
+              <a:t>11/6/2017</a:t>
             </a:fld>
             <a:endParaRPr lang="en-US" noProof="0"/>
           </a:p>
@@ -3221,7 +3770,7 @@
           <a:p>
             <a:fld id="{B8511AE9-C2D5-45E7-980E-A4DD1A9265AF}" type="datetimeFigureOut">
               <a:rPr lang="en-US" noProof="0" smtClean="0"/>
-              <a:t>11/5/2017</a:t>
+              <a:t>11/6/2017</a:t>
             </a:fld>
             <a:endParaRPr lang="en-US" noProof="0"/>
           </a:p>
@@ -3532,7 +4081,7 @@
           <a:p>
             <a:fld id="{B8511AE9-C2D5-45E7-980E-A4DD1A9265AF}" type="datetimeFigureOut">
               <a:rPr lang="en-US" noProof="0" smtClean="0"/>
-              <a:t>11/5/2017</a:t>
+              <a:t>11/6/2017</a:t>
             </a:fld>
             <a:endParaRPr lang="en-US" noProof="0"/>
           </a:p>
@@ -3825,7 +4374,7 @@
           <a:p>
             <a:fld id="{B8511AE9-C2D5-45E7-980E-A4DD1A9265AF}" type="datetimeFigureOut">
               <a:rPr lang="en-US" noProof="0" smtClean="0"/>
-              <a:t>11/5/2017</a:t>
+              <a:t>11/6/2017</a:t>
             </a:fld>
             <a:endParaRPr lang="en-US" noProof="0"/>
           </a:p>
@@ -4066,7 +4615,7 @@
           <a:p>
             <a:fld id="{B8511AE9-C2D5-45E7-980E-A4DD1A9265AF}" type="datetimeFigureOut">
               <a:rPr lang="en-US" noProof="0" smtClean="0"/>
-              <a:t>11/5/2017</a:t>
+              <a:t>11/6/2017</a:t>
             </a:fld>
             <a:endParaRPr lang="en-US" noProof="0"/>
           </a:p>
@@ -4628,11 +5177,7 @@
             </a:pPr>
             <a:r>
               <a:rPr lang="en-US" dirty="0"/>
-              <a:t>e</a:t>
-            </a:r>
-            <a:r>
-              <a:rPr lang="en-US" noProof="0" dirty="0" err="1"/>
-              <a:t>quivalence</a:t>
+              <a:t>equivalence</a:t>
             </a:r>
             <a:r>
               <a:rPr lang="en-US" noProof="0" dirty="0"/>
@@ -4655,6 +5200,25 @@
             <a:r>
               <a:rPr lang="en-US" dirty="0"/>
               <a:t>elegant, i.e. easy to prove correct</a:t>
+            </a:r>
+          </a:p>
+          <a:p>
+            <a:endParaRPr lang="en-US" noProof="0" dirty="0"/>
+          </a:p>
+          <a:p>
+            <a:endParaRPr lang="en-US" dirty="0"/>
+          </a:p>
+          <a:p>
+            <a:pPr marL="0" indent="0">
+              <a:buNone/>
+            </a:pPr>
+            <a:r>
+              <a:rPr lang="en-US" noProof="0" dirty="0"/>
+              <a:t>… we will only</a:t>
+            </a:r>
+            <a:r>
+              <a:rPr lang="en-US" dirty="0"/>
+              <a:t> prove partial correctness</a:t>
             </a:r>
             <a:endParaRPr lang="en-US" noProof="0" dirty="0"/>
           </a:p>
@@ -4695,6 +5259,461 @@
           <p:cNvPr id="2" name="Titel 1">
             <a:extLst>
               <a:ext uri="{FF2B5EF4-FFF2-40B4-BE49-F238E27FC236}">
+                <a16:creationId xmlns:a16="http://schemas.microsoft.com/office/drawing/2014/main" id="{A929FFEB-97F9-4AAE-81C1-11B5DC6850B7}"/>
+              </a:ext>
+            </a:extLst>
+          </p:cNvPr>
+          <p:cNvSpPr>
+            <a:spLocks noGrp="1"/>
+          </p:cNvSpPr>
+          <p:nvPr>
+            <p:ph type="title"/>
+          </p:nvPr>
+        </p:nvSpPr>
+        <p:spPr/>
+        <p:txBody>
+          <a:bodyPr/>
+          <a:lstStyle/>
+          <a:p>
+            <a:r>
+              <a:rPr lang="en-US" dirty="0"/>
+              <a:t>Shortcuts</a:t>
+            </a:r>
+          </a:p>
+        </p:txBody>
+      </p:sp>
+      <p:sp>
+        <p:nvSpPr>
+          <p:cNvPr id="3" name="Inhaltsplatzhalter 2">
+            <a:extLst>
+              <a:ext uri="{FF2B5EF4-FFF2-40B4-BE49-F238E27FC236}">
+                <a16:creationId xmlns:a16="http://schemas.microsoft.com/office/drawing/2014/main" id="{CB6452AB-3B3D-4DAE-9DC0-92C5D524D106}"/>
+              </a:ext>
+            </a:extLst>
+          </p:cNvPr>
+          <p:cNvSpPr>
+            <a:spLocks noGrp="1"/>
+          </p:cNvSpPr>
+          <p:nvPr>
+            <p:ph idx="1"/>
+          </p:nvPr>
+        </p:nvSpPr>
+        <p:spPr/>
+        <p:txBody>
+          <a:bodyPr/>
+          <a:lstStyle/>
+          <a:p>
+            <a:pPr marL="0" indent="0">
+              <a:buNone/>
+            </a:pPr>
+            <a:r>
+              <a:rPr lang="en-US" dirty="0"/>
+              <a:t>Avoid having to formalize and prove correct the automata</a:t>
+            </a:r>
+          </a:p>
+          <a:p>
+            <a:r>
+              <a:rPr lang="en-US" dirty="0"/>
+              <a:t>construction</a:t>
+            </a:r>
+          </a:p>
+          <a:p>
+            <a:r>
+              <a:rPr lang="en-US" dirty="0"/>
+              <a:t>determinization</a:t>
+            </a:r>
+          </a:p>
+          <a:p>
+            <a:r>
+              <a:rPr lang="en-US" dirty="0"/>
+              <a:t>minimization</a:t>
+            </a:r>
+          </a:p>
+          <a:p>
+            <a:endParaRPr lang="en-US" dirty="0"/>
+          </a:p>
+          <a:p>
+            <a:pPr marL="0" indent="0">
+              <a:buNone/>
+            </a:pPr>
+            <a:r>
+              <a:rPr lang="en-US" dirty="0"/>
+              <a:t>Extension to relations (or other Kleene Algebras) without </a:t>
+            </a:r>
+            <a:r>
+              <a:rPr lang="en-US" dirty="0" err="1"/>
+              <a:t>Kozen’s</a:t>
+            </a:r>
+            <a:r>
+              <a:rPr lang="en-US" dirty="0"/>
+              <a:t> theorem</a:t>
+            </a:r>
+          </a:p>
+        </p:txBody>
+      </p:sp>
+    </p:spTree>
+    <p:extLst>
+      <p:ext uri="{BB962C8B-B14F-4D97-AF65-F5344CB8AC3E}">
+        <p14:creationId xmlns:p14="http://schemas.microsoft.com/office/powerpoint/2010/main" val="4220785108"/>
+      </p:ext>
+    </p:extLst>
+  </p:cSld>
+  <p:clrMapOvr>
+    <a:masterClrMapping/>
+  </p:clrMapOvr>
+</p:sld>
+</file>
+
+<file path=ppt/slides/slide4.xml><?xml version="1.0" encoding="utf-8"?>
+<p:sld xmlns:a="http://schemas.openxmlformats.org/drawingml/2006/main" xmlns:r="http://schemas.openxmlformats.org/officeDocument/2006/relationships" xmlns:p="http://schemas.openxmlformats.org/presentationml/2006/main">
+  <p:cSld>
+    <p:spTree>
+      <p:nvGrpSpPr>
+        <p:cNvPr id="1" name=""/>
+        <p:cNvGrpSpPr/>
+        <p:nvPr/>
+      </p:nvGrpSpPr>
+      <p:grpSpPr>
+        <a:xfrm>
+          <a:off x="0" y="0"/>
+          <a:ext cx="0" cy="0"/>
+          <a:chOff x="0" y="0"/>
+          <a:chExt cx="0" cy="0"/>
+        </a:xfrm>
+      </p:grpSpPr>
+      <p:sp>
+        <p:nvSpPr>
+          <p:cNvPr id="2" name="Titel 1">
+            <a:extLst>
+              <a:ext uri="{FF2B5EF4-FFF2-40B4-BE49-F238E27FC236}">
+                <a16:creationId xmlns:a16="http://schemas.microsoft.com/office/drawing/2014/main" id="{687B1AB8-90E5-4186-AA81-A93103CBA37B}"/>
+              </a:ext>
+            </a:extLst>
+          </p:cNvPr>
+          <p:cNvSpPr>
+            <a:spLocks noGrp="1"/>
+          </p:cNvSpPr>
+          <p:nvPr>
+            <p:ph type="title"/>
+          </p:nvPr>
+        </p:nvSpPr>
+        <p:spPr/>
+        <p:txBody>
+          <a:bodyPr/>
+          <a:lstStyle/>
+          <a:p>
+            <a:r>
+              <a:rPr lang="en-US" dirty="0"/>
+              <a:t>Languages</a:t>
+            </a:r>
+          </a:p>
+        </p:txBody>
+      </p:sp>
+      <p:sp>
+        <p:nvSpPr>
+          <p:cNvPr id="3" name="Inhaltsplatzhalter 2">
+            <a:extLst>
+              <a:ext uri="{FF2B5EF4-FFF2-40B4-BE49-F238E27FC236}">
+                <a16:creationId xmlns:a16="http://schemas.microsoft.com/office/drawing/2014/main" id="{2BF4359E-6341-4A1E-9A32-75F8D0FC3314}"/>
+              </a:ext>
+            </a:extLst>
+          </p:cNvPr>
+          <p:cNvSpPr>
+            <a:spLocks noGrp="1"/>
+          </p:cNvSpPr>
+          <p:nvPr>
+            <p:ph idx="1"/>
+          </p:nvPr>
+        </p:nvSpPr>
+        <p:spPr/>
+        <p:txBody>
+          <a:bodyPr/>
+          <a:lstStyle/>
+          <a:p>
+            <a:endParaRPr lang="en-US"/>
+          </a:p>
+        </p:txBody>
+      </p:sp>
+    </p:spTree>
+    <p:extLst>
+      <p:ext uri="{BB962C8B-B14F-4D97-AF65-F5344CB8AC3E}">
+        <p14:creationId xmlns:p14="http://schemas.microsoft.com/office/powerpoint/2010/main" val="4159968217"/>
+      </p:ext>
+    </p:extLst>
+  </p:cSld>
+  <p:clrMapOvr>
+    <a:masterClrMapping/>
+  </p:clrMapOvr>
+</p:sld>
+</file>
+
+<file path=ppt/slides/slide5.xml><?xml version="1.0" encoding="utf-8"?>
+<p:sld xmlns:a="http://schemas.openxmlformats.org/drawingml/2006/main" xmlns:r="http://schemas.openxmlformats.org/officeDocument/2006/relationships" xmlns:p="http://schemas.openxmlformats.org/presentationml/2006/main">
+  <p:cSld>
+    <p:spTree>
+      <p:nvGrpSpPr>
+        <p:cNvPr id="1" name=""/>
+        <p:cNvGrpSpPr/>
+        <p:nvPr/>
+      </p:nvGrpSpPr>
+      <p:grpSpPr>
+        <a:xfrm>
+          <a:off x="0" y="0"/>
+          <a:ext cx="0" cy="0"/>
+          <a:chOff x="0" y="0"/>
+          <a:chExt cx="0" cy="0"/>
+        </a:xfrm>
+      </p:grpSpPr>
+      <p:sp>
+        <p:nvSpPr>
+          <p:cNvPr id="2" name="Titel 1">
+            <a:extLst>
+              <a:ext uri="{FF2B5EF4-FFF2-40B4-BE49-F238E27FC236}">
+                <a16:creationId xmlns:a16="http://schemas.microsoft.com/office/drawing/2014/main" id="{C690F183-8E7A-454F-8838-12391BD3CD63}"/>
+              </a:ext>
+            </a:extLst>
+          </p:cNvPr>
+          <p:cNvSpPr>
+            <a:spLocks noGrp="1"/>
+          </p:cNvSpPr>
+          <p:nvPr>
+            <p:ph type="title"/>
+          </p:nvPr>
+        </p:nvSpPr>
+        <p:spPr/>
+        <p:txBody>
+          <a:bodyPr/>
+          <a:lstStyle/>
+          <a:p>
+            <a:r>
+              <a:rPr lang="en-US" dirty="0" err="1"/>
+              <a:t>Bisimulations</a:t>
+            </a:r>
+            <a:endParaRPr lang="en-US" dirty="0"/>
+          </a:p>
+        </p:txBody>
+      </p:sp>
+      <p:sp>
+        <p:nvSpPr>
+          <p:cNvPr id="3" name="Inhaltsplatzhalter 2">
+            <a:extLst>
+              <a:ext uri="{FF2B5EF4-FFF2-40B4-BE49-F238E27FC236}">
+                <a16:creationId xmlns:a16="http://schemas.microsoft.com/office/drawing/2014/main" id="{A92A6810-3DFA-48E9-840A-C8CE0480638F}"/>
+              </a:ext>
+            </a:extLst>
+          </p:cNvPr>
+          <p:cNvSpPr>
+            <a:spLocks noGrp="1"/>
+          </p:cNvSpPr>
+          <p:nvPr>
+            <p:ph idx="1"/>
+          </p:nvPr>
+        </p:nvSpPr>
+        <p:spPr/>
+        <p:txBody>
+          <a:bodyPr/>
+          <a:lstStyle/>
+          <a:p>
+            <a:pPr marL="0" indent="0">
+              <a:buNone/>
+            </a:pPr>
+            <a:r>
+              <a:rPr lang="en-US" dirty="0"/>
+              <a:t>Definition</a:t>
+            </a:r>
+          </a:p>
+          <a:p>
+            <a:r>
+              <a:rPr lang="en-US" dirty="0"/>
+              <a:t>Prop1 to-do</a:t>
+            </a:r>
+          </a:p>
+          <a:p>
+            <a:r>
+              <a:rPr lang="en-US" dirty="0"/>
+              <a:t>Prop2 to-do</a:t>
+            </a:r>
+          </a:p>
+          <a:p>
+            <a:endParaRPr lang="en-US" dirty="0"/>
+          </a:p>
+          <a:p>
+            <a:pPr marL="0" indent="0">
+              <a:buNone/>
+            </a:pPr>
+            <a:r>
+              <a:rPr lang="en-US" dirty="0" err="1"/>
+              <a:t>Bisimulations</a:t>
+            </a:r>
+            <a:r>
+              <a:rPr lang="en-US" dirty="0"/>
+              <a:t> can contain infinitely many elements</a:t>
+            </a:r>
+          </a:p>
+          <a:p>
+            <a:pPr marL="0" indent="0">
+              <a:buNone/>
+            </a:pPr>
+            <a:r>
+              <a:rPr lang="en-US" dirty="0"/>
+              <a:t>	</a:t>
+            </a:r>
+            <a:r>
+              <a:rPr lang="en-US" dirty="0">
+                <a:sym typeface="Wingdings" panose="05000000000000000000" pitchFamily="2" charset="2"/>
+              </a:rPr>
+              <a:t> </a:t>
+            </a:r>
+            <a:r>
+              <a:rPr lang="en-US" dirty="0"/>
+              <a:t>use a representation </a:t>
+            </a:r>
+            <a:r>
+              <a:rPr lang="en-GB" dirty="0"/>
+              <a:t>as finite list of pairs of regular expressions</a:t>
+            </a:r>
+            <a:endParaRPr lang="en-US" dirty="0"/>
+          </a:p>
+        </p:txBody>
+      </p:sp>
+    </p:spTree>
+    <p:extLst>
+      <p:ext uri="{BB962C8B-B14F-4D97-AF65-F5344CB8AC3E}">
+        <p14:creationId xmlns:p14="http://schemas.microsoft.com/office/powerpoint/2010/main" val="4293805152"/>
+      </p:ext>
+    </p:extLst>
+  </p:cSld>
+  <p:clrMapOvr>
+    <a:masterClrMapping/>
+  </p:clrMapOvr>
+</p:sld>
+</file>
+
+<file path=ppt/slides/slide6.xml><?xml version="1.0" encoding="utf-8"?>
+<p:sld xmlns:a="http://schemas.openxmlformats.org/drawingml/2006/main" xmlns:r="http://schemas.openxmlformats.org/officeDocument/2006/relationships" xmlns:p="http://schemas.openxmlformats.org/presentationml/2006/main">
+  <p:cSld>
+    <p:spTree>
+      <p:nvGrpSpPr>
+        <p:cNvPr id="1" name=""/>
+        <p:cNvGrpSpPr/>
+        <p:nvPr/>
+      </p:nvGrpSpPr>
+      <p:grpSpPr>
+        <a:xfrm>
+          <a:off x="0" y="0"/>
+          <a:ext cx="0" cy="0"/>
+          <a:chOff x="0" y="0"/>
+          <a:chExt cx="0" cy="0"/>
+        </a:xfrm>
+      </p:grpSpPr>
+      <p:sp>
+        <p:nvSpPr>
+          <p:cNvPr id="2" name="Titel 1">
+            <a:extLst>
+              <a:ext uri="{FF2B5EF4-FFF2-40B4-BE49-F238E27FC236}">
+                <a16:creationId xmlns:a16="http://schemas.microsoft.com/office/drawing/2014/main" id="{D55CD077-9E2B-43F3-83A0-334C38F85C7C}"/>
+              </a:ext>
+            </a:extLst>
+          </p:cNvPr>
+          <p:cNvSpPr>
+            <a:spLocks noGrp="1"/>
+          </p:cNvSpPr>
+          <p:nvPr>
+            <p:ph type="title"/>
+          </p:nvPr>
+        </p:nvSpPr>
+        <p:spPr/>
+        <p:txBody>
+          <a:bodyPr/>
+          <a:lstStyle/>
+          <a:p>
+            <a:r>
+              <a:rPr lang="en-US" dirty="0"/>
+              <a:t>ACI</a:t>
+            </a:r>
+          </a:p>
+        </p:txBody>
+      </p:sp>
+      <p:sp>
+        <p:nvSpPr>
+          <p:cNvPr id="3" name="Inhaltsplatzhalter 2">
+            <a:extLst>
+              <a:ext uri="{FF2B5EF4-FFF2-40B4-BE49-F238E27FC236}">
+                <a16:creationId xmlns:a16="http://schemas.microsoft.com/office/drawing/2014/main" id="{EABB337D-AA1F-4919-A75D-7EF7AE0BF98B}"/>
+              </a:ext>
+            </a:extLst>
+          </p:cNvPr>
+          <p:cNvSpPr>
+            <a:spLocks noGrp="1"/>
+          </p:cNvSpPr>
+          <p:nvPr>
+            <p:ph idx="1"/>
+          </p:nvPr>
+        </p:nvSpPr>
+        <p:spPr/>
+        <p:txBody>
+          <a:bodyPr/>
+          <a:lstStyle/>
+          <a:p>
+            <a:pPr marL="0" indent="0">
+              <a:buNone/>
+            </a:pPr>
+            <a:r>
+              <a:rPr lang="en-US" dirty="0"/>
+              <a:t>associativity, commutativity and idempotence of </a:t>
+            </a:r>
+            <a:r>
+              <a:rPr lang="en-US" i="1" dirty="0"/>
+              <a:t>+</a:t>
+            </a:r>
+          </a:p>
+          <a:p>
+            <a:r>
+              <a:rPr lang="en-US" dirty="0"/>
+              <a:t>can be checked by an auxiliary function </a:t>
+            </a:r>
+            <a:r>
+              <a:rPr lang="en-US" i="1" dirty="0"/>
+              <a:t>norm</a:t>
+            </a:r>
+          </a:p>
+        </p:txBody>
+      </p:sp>
+    </p:spTree>
+    <p:extLst>
+      <p:ext uri="{BB962C8B-B14F-4D97-AF65-F5344CB8AC3E}">
+        <p14:creationId xmlns:p14="http://schemas.microsoft.com/office/powerpoint/2010/main" val="3250996410"/>
+      </p:ext>
+    </p:extLst>
+  </p:cSld>
+  <p:clrMapOvr>
+    <a:masterClrMapping/>
+  </p:clrMapOvr>
+</p:sld>
+</file>
+
+<file path=ppt/slides/slide7.xml><?xml version="1.0" encoding="utf-8"?>
+<p:sld xmlns:a="http://schemas.openxmlformats.org/drawingml/2006/main" xmlns:r="http://schemas.openxmlformats.org/officeDocument/2006/relationships" xmlns:p="http://schemas.openxmlformats.org/presentationml/2006/main">
+  <p:cSld>
+    <p:spTree>
+      <p:nvGrpSpPr>
+        <p:cNvPr id="1" name=""/>
+        <p:cNvGrpSpPr/>
+        <p:nvPr/>
+      </p:nvGrpSpPr>
+      <p:grpSpPr>
+        <a:xfrm>
+          <a:off x="0" y="0"/>
+          <a:ext cx="0" cy="0"/>
+          <a:chOff x="0" y="0"/>
+          <a:chExt cx="0" cy="0"/>
+        </a:xfrm>
+      </p:grpSpPr>
+      <p:sp>
+        <p:nvSpPr>
+          <p:cNvPr id="2" name="Titel 1">
+            <a:extLst>
+              <a:ext uri="{FF2B5EF4-FFF2-40B4-BE49-F238E27FC236}">
                 <a16:creationId xmlns:a16="http://schemas.microsoft.com/office/drawing/2014/main" id="{C2BD6476-74CB-4A4F-8A71-ABCEDDC496FB}"/>
               </a:ext>
             </a:extLst>
@@ -4750,6 +5769,64 @@
     <p:extLst>
       <p:ext uri="{BB962C8B-B14F-4D97-AF65-F5344CB8AC3E}">
         <p14:creationId xmlns:p14="http://schemas.microsoft.com/office/powerpoint/2010/main" val="1306226194"/>
+      </p:ext>
+    </p:extLst>
+  </p:cSld>
+  <p:clrMapOvr>
+    <a:masterClrMapping/>
+  </p:clrMapOvr>
+</p:sld>
+</file>
+
+<file path=ppt/slides/slide8.xml><?xml version="1.0" encoding="utf-8"?>
+<p:sld xmlns:a="http://schemas.openxmlformats.org/drawingml/2006/main" xmlns:r="http://schemas.openxmlformats.org/officeDocument/2006/relationships" xmlns:p="http://schemas.openxmlformats.org/presentationml/2006/main">
+  <p:cSld>
+    <p:spTree>
+      <p:nvGrpSpPr>
+        <p:cNvPr id="1" name=""/>
+        <p:cNvGrpSpPr/>
+        <p:nvPr/>
+      </p:nvGrpSpPr>
+      <p:grpSpPr>
+        <a:xfrm>
+          <a:off x="0" y="0"/>
+          <a:ext cx="0" cy="0"/>
+          <a:chOff x="0" y="0"/>
+          <a:chExt cx="0" cy="0"/>
+        </a:xfrm>
+      </p:grpSpPr>
+      <p:sp>
+        <p:nvSpPr>
+          <p:cNvPr id="2" name="Titel 1">
+            <a:extLst>
+              <a:ext uri="{FF2B5EF4-FFF2-40B4-BE49-F238E27FC236}">
+                <a16:creationId xmlns:a16="http://schemas.microsoft.com/office/drawing/2014/main" id="{59569334-A0FE-40EA-BDDD-A2A29AE45091}"/>
+              </a:ext>
+            </a:extLst>
+          </p:cNvPr>
+          <p:cNvSpPr>
+            <a:spLocks noGrp="1"/>
+          </p:cNvSpPr>
+          <p:nvPr>
+            <p:ph type="title"/>
+          </p:nvPr>
+        </p:nvSpPr>
+        <p:spPr/>
+        <p:txBody>
+          <a:bodyPr/>
+          <a:lstStyle/>
+          <a:p>
+            <a:r>
+              <a:rPr lang="en-US" dirty="0"/>
+              <a:t>Beyond equalities</a:t>
+            </a:r>
+          </a:p>
+        </p:txBody>
+      </p:sp>
+    </p:spTree>
+    <p:extLst>
+      <p:ext uri="{BB962C8B-B14F-4D97-AF65-F5344CB8AC3E}">
+        <p14:creationId xmlns:p14="http://schemas.microsoft.com/office/powerpoint/2010/main" val="1337841628"/>
       </p:ext>
     </p:extLst>
   </p:cSld>

</xml_diff>

<commit_message>
more slides; tuned paper
</commit_message>
<xml_diff>
--- a/slides.pptx
+++ b/slides.pptx
@@ -5,7 +5,7 @@
     <p:sldMasterId id="2147483648" r:id="rId1"/>
   </p:sldMasterIdLst>
   <p:notesMasterIdLst>
-    <p:notesMasterId r:id="rId10"/>
+    <p:notesMasterId r:id="rId12"/>
   </p:notesMasterIdLst>
   <p:sldIdLst>
     <p:sldId id="256" r:id="rId2"/>
@@ -14,8 +14,10 @@
     <p:sldId id="262" r:id="rId5"/>
     <p:sldId id="263" r:id="rId6"/>
     <p:sldId id="264" r:id="rId7"/>
-    <p:sldId id="257" r:id="rId8"/>
-    <p:sldId id="260" r:id="rId9"/>
+    <p:sldId id="265" r:id="rId8"/>
+    <p:sldId id="257" r:id="rId9"/>
+    <p:sldId id="260" r:id="rId10"/>
+    <p:sldId id="268" r:id="rId11"/>
   </p:sldIdLst>
   <p:sldSz cx="12192000" cy="6858000"/>
   <p:notesSz cx="6858000" cy="9144000"/>
@@ -208,7 +210,7 @@
           <a:p>
             <a:fld id="{9768728B-C74D-450C-A579-E5E997D18F7C}" type="datetimeFigureOut">
               <a:rPr lang="de-DE" smtClean="0"/>
-              <a:t>23.11.2017</a:t>
+              <a:t>27.11.2017</a:t>
             </a:fld>
             <a:endParaRPr lang="de-DE"/>
           </a:p>
@@ -1616,7 +1618,7 @@
           <a:p>
             <a:fld id="{FAA32559-8951-4C46-A356-FBB9455D7E38}" type="slidenum">
               <a:rPr lang="de-DE" smtClean="0"/>
-              <a:t>7</a:t>
+              <a:t>8</a:t>
             </a:fld>
             <a:endParaRPr lang="de-DE"/>
           </a:p>
@@ -1703,7 +1705,7 @@
           <a:p>
             <a:fld id="{FAA32559-8951-4C46-A356-FBB9455D7E38}" type="slidenum">
               <a:rPr lang="de-DE" smtClean="0"/>
-              <a:t>8</a:t>
+              <a:t>9</a:t>
             </a:fld>
             <a:endParaRPr lang="de-DE"/>
           </a:p>
@@ -1713,6 +1715,97 @@
     <p:extLst>
       <p:ext uri="{BB962C8B-B14F-4D97-AF65-F5344CB8AC3E}">
         <p14:creationId xmlns:p14="http://schemas.microsoft.com/office/powerpoint/2010/main" val="4044844971"/>
+      </p:ext>
+    </p:extLst>
+  </p:cSld>
+  <p:clrMapOvr>
+    <a:masterClrMapping/>
+  </p:clrMapOvr>
+</p:notes>
+</file>
+
+<file path=ppt/notesSlides/notesSlide9.xml><?xml version="1.0" encoding="utf-8"?>
+<p:notes xmlns:a="http://schemas.openxmlformats.org/drawingml/2006/main" xmlns:r="http://schemas.openxmlformats.org/officeDocument/2006/relationships" xmlns:p="http://schemas.openxmlformats.org/presentationml/2006/main">
+  <p:cSld>
+    <p:spTree>
+      <p:nvGrpSpPr>
+        <p:cNvPr id="1" name=""/>
+        <p:cNvGrpSpPr/>
+        <p:nvPr/>
+      </p:nvGrpSpPr>
+      <p:grpSpPr>
+        <a:xfrm>
+          <a:off x="0" y="0"/>
+          <a:ext cx="0" cy="0"/>
+          <a:chOff x="0" y="0"/>
+          <a:chExt cx="0" cy="0"/>
+        </a:xfrm>
+      </p:grpSpPr>
+      <p:sp>
+        <p:nvSpPr>
+          <p:cNvPr id="2" name="Folienbildplatzhalter 1"/>
+          <p:cNvSpPr>
+            <a:spLocks noGrp="1" noRot="1" noChangeAspect="1"/>
+          </p:cNvSpPr>
+          <p:nvPr>
+            <p:ph type="sldImg"/>
+          </p:nvPr>
+        </p:nvSpPr>
+        <p:spPr/>
+      </p:sp>
+      <p:sp>
+        <p:nvSpPr>
+          <p:cNvPr id="3" name="Notizenplatzhalter 2"/>
+          <p:cNvSpPr>
+            <a:spLocks noGrp="1"/>
+          </p:cNvSpPr>
+          <p:nvPr>
+            <p:ph type="body" idx="1"/>
+          </p:nvPr>
+        </p:nvSpPr>
+        <p:spPr/>
+        <p:txBody>
+          <a:bodyPr/>
+          <a:lstStyle/>
+          <a:p>
+            <a:r>
+              <a:rPr lang="en-US" dirty="0"/>
+              <a:t>… and of course, the source is </a:t>
+            </a:r>
+            <a:r>
+              <a:rPr lang="en-US"/>
+              <a:t>online in the AFP</a:t>
+            </a:r>
+          </a:p>
+        </p:txBody>
+      </p:sp>
+      <p:sp>
+        <p:nvSpPr>
+          <p:cNvPr id="4" name="Foliennummernplatzhalter 3"/>
+          <p:cNvSpPr>
+            <a:spLocks noGrp="1"/>
+          </p:cNvSpPr>
+          <p:nvPr>
+            <p:ph type="sldNum" sz="quarter" idx="10"/>
+          </p:nvPr>
+        </p:nvSpPr>
+        <p:spPr/>
+        <p:txBody>
+          <a:bodyPr/>
+          <a:lstStyle/>
+          <a:p>
+            <a:fld id="{FAA32559-8951-4C46-A356-FBB9455D7E38}" type="slidenum">
+              <a:rPr lang="de-DE" smtClean="0"/>
+              <a:t>10</a:t>
+            </a:fld>
+            <a:endParaRPr lang="de-DE"/>
+          </a:p>
+        </p:txBody>
+      </p:sp>
+    </p:spTree>
+    <p:extLst>
+      <p:ext uri="{BB962C8B-B14F-4D97-AF65-F5344CB8AC3E}">
+        <p14:creationId xmlns:p14="http://schemas.microsoft.com/office/powerpoint/2010/main" val="3173480216"/>
       </p:ext>
     </p:extLst>
   </p:cSld>
@@ -1869,7 +1962,7 @@
           <a:p>
             <a:fld id="{B8511AE9-C2D5-45E7-980E-A4DD1A9265AF}" type="datetimeFigureOut">
               <a:rPr lang="en-US" noProof="0" smtClean="0"/>
-              <a:t>11/23/2017</a:t>
+              <a:t>11/27/2017</a:t>
             </a:fld>
             <a:endParaRPr lang="en-US" noProof="0"/>
           </a:p>
@@ -2067,7 +2160,7 @@
           <a:p>
             <a:fld id="{B8511AE9-C2D5-45E7-980E-A4DD1A9265AF}" type="datetimeFigureOut">
               <a:rPr lang="de-DE" smtClean="0"/>
-              <a:t>23.11.2017</a:t>
+              <a:t>27.11.2017</a:t>
             </a:fld>
             <a:endParaRPr lang="de-DE"/>
           </a:p>
@@ -2369,7 +2462,7 @@
             <a:fld id="{B8511AE9-C2D5-45E7-980E-A4DD1A9265AF}" type="datetimeFigureOut">
               <a:rPr lang="en-US" noProof="0" smtClean="0"/>
               <a:pPr/>
-              <a:t>11/23/2017</a:t>
+              <a:t>11/27/2017</a:t>
             </a:fld>
             <a:endParaRPr lang="en-US" noProof="0"/>
           </a:p>
@@ -2523,7 +2616,7 @@
           <a:p>
             <a:fld id="{B8511AE9-C2D5-45E7-980E-A4DD1A9265AF}" type="datetimeFigureOut">
               <a:rPr lang="en-US" noProof="0" smtClean="0"/>
-              <a:t>11/23/2017</a:t>
+              <a:t>11/27/2017</a:t>
             </a:fld>
             <a:endParaRPr lang="en-US" noProof="0"/>
           </a:p>
@@ -2721,7 +2814,7 @@
           <a:p>
             <a:fld id="{B8511AE9-C2D5-45E7-980E-A4DD1A9265AF}" type="datetimeFigureOut">
               <a:rPr lang="en-US" noProof="0" smtClean="0"/>
-              <a:t>11/23/2017</a:t>
+              <a:t>11/27/2017</a:t>
             </a:fld>
             <a:endParaRPr lang="en-US" noProof="0"/>
           </a:p>
@@ -2996,7 +3089,7 @@
           <a:p>
             <a:fld id="{B8511AE9-C2D5-45E7-980E-A4DD1A9265AF}" type="datetimeFigureOut">
               <a:rPr lang="en-US" noProof="0" smtClean="0"/>
-              <a:t>11/23/2017</a:t>
+              <a:t>11/27/2017</a:t>
             </a:fld>
             <a:endParaRPr lang="en-US" noProof="0"/>
           </a:p>
@@ -3318,7 +3411,7 @@
           <a:p>
             <a:fld id="{B8511AE9-C2D5-45E7-980E-A4DD1A9265AF}" type="datetimeFigureOut">
               <a:rPr lang="en-US" noProof="0" smtClean="0"/>
-              <a:t>11/23/2017</a:t>
+              <a:t>11/27/2017</a:t>
             </a:fld>
             <a:endParaRPr lang="en-US" noProof="0"/>
           </a:p>
@@ -3730,7 +3823,7 @@
           <a:p>
             <a:fld id="{B8511AE9-C2D5-45E7-980E-A4DD1A9265AF}" type="datetimeFigureOut">
               <a:rPr lang="en-US" noProof="0" smtClean="0"/>
-              <a:t>11/23/2017</a:t>
+              <a:t>11/27/2017</a:t>
             </a:fld>
             <a:endParaRPr lang="en-US" noProof="0"/>
           </a:p>
@@ -3871,7 +3964,7 @@
           <a:p>
             <a:fld id="{B8511AE9-C2D5-45E7-980E-A4DD1A9265AF}" type="datetimeFigureOut">
               <a:rPr lang="en-US" noProof="0" smtClean="0"/>
-              <a:t>11/23/2017</a:t>
+              <a:t>11/27/2017</a:t>
             </a:fld>
             <a:endParaRPr lang="en-US" noProof="0"/>
           </a:p>
@@ -3989,7 +4082,7 @@
           <a:p>
             <a:fld id="{B8511AE9-C2D5-45E7-980E-A4DD1A9265AF}" type="datetimeFigureOut">
               <a:rPr lang="en-US" noProof="0" smtClean="0"/>
-              <a:t>11/23/2017</a:t>
+              <a:t>11/27/2017</a:t>
             </a:fld>
             <a:endParaRPr lang="en-US" noProof="0"/>
           </a:p>
@@ -4300,7 +4393,7 @@
           <a:p>
             <a:fld id="{B8511AE9-C2D5-45E7-980E-A4DD1A9265AF}" type="datetimeFigureOut">
               <a:rPr lang="en-US" noProof="0" smtClean="0"/>
-              <a:t>11/23/2017</a:t>
+              <a:t>11/27/2017</a:t>
             </a:fld>
             <a:endParaRPr lang="en-US" noProof="0"/>
           </a:p>
@@ -4593,7 +4686,7 @@
           <a:p>
             <a:fld id="{B8511AE9-C2D5-45E7-980E-A4DD1A9265AF}" type="datetimeFigureOut">
               <a:rPr lang="en-US" noProof="0" smtClean="0"/>
-              <a:t>11/23/2017</a:t>
+              <a:t>11/27/2017</a:t>
             </a:fld>
             <a:endParaRPr lang="en-US" noProof="0"/>
           </a:p>
@@ -4834,7 +4927,7 @@
           <a:p>
             <a:fld id="{B8511AE9-C2D5-45E7-980E-A4DD1A9265AF}" type="datetimeFigureOut">
               <a:rPr lang="en-US" noProof="0" smtClean="0"/>
-              <a:t>11/23/2017</a:t>
+              <a:t>11/27/2017</a:t>
             </a:fld>
             <a:endParaRPr lang="en-US" noProof="0"/>
           </a:p>
@@ -5320,6 +5413,133 @@
 </p:sld>
 </file>
 
+<file path=ppt/slides/slide10.xml><?xml version="1.0" encoding="utf-8"?>
+<p:sld xmlns:a="http://schemas.openxmlformats.org/drawingml/2006/main" xmlns:r="http://schemas.openxmlformats.org/officeDocument/2006/relationships" xmlns:p="http://schemas.openxmlformats.org/presentationml/2006/main">
+  <p:cSld>
+    <p:spTree>
+      <p:nvGrpSpPr>
+        <p:cNvPr id="1" name=""/>
+        <p:cNvGrpSpPr/>
+        <p:nvPr/>
+      </p:nvGrpSpPr>
+      <p:grpSpPr>
+        <a:xfrm>
+          <a:off x="0" y="0"/>
+          <a:ext cx="0" cy="0"/>
+          <a:chOff x="0" y="0"/>
+          <a:chExt cx="0" cy="0"/>
+        </a:xfrm>
+      </p:grpSpPr>
+      <p:sp>
+        <p:nvSpPr>
+          <p:cNvPr id="2" name="Titel 1">
+            <a:extLst>
+              <a:ext uri="{FF2B5EF4-FFF2-40B4-BE49-F238E27FC236}">
+                <a16:creationId xmlns:a16="http://schemas.microsoft.com/office/drawing/2014/main" id="{966C4CD0-AA0A-4AAE-96D7-87C7699D5D00}"/>
+              </a:ext>
+            </a:extLst>
+          </p:cNvPr>
+          <p:cNvSpPr>
+            <a:spLocks noGrp="1"/>
+          </p:cNvSpPr>
+          <p:nvPr>
+            <p:ph type="title"/>
+          </p:nvPr>
+        </p:nvSpPr>
+        <p:spPr/>
+        <p:txBody>
+          <a:bodyPr/>
+          <a:lstStyle/>
+          <a:p>
+            <a:r>
+              <a:rPr lang="en-US" dirty="0"/>
+              <a:t>References</a:t>
+            </a:r>
+          </a:p>
+        </p:txBody>
+      </p:sp>
+      <p:sp>
+        <p:nvSpPr>
+          <p:cNvPr id="3" name="Inhaltsplatzhalter 2">
+            <a:extLst>
+              <a:ext uri="{FF2B5EF4-FFF2-40B4-BE49-F238E27FC236}">
+                <a16:creationId xmlns:a16="http://schemas.microsoft.com/office/drawing/2014/main" id="{DDB33A90-3B67-4ADF-9126-A5C3C8B41815}"/>
+              </a:ext>
+            </a:extLst>
+          </p:cNvPr>
+          <p:cNvSpPr>
+            <a:spLocks noGrp="1"/>
+          </p:cNvSpPr>
+          <p:nvPr>
+            <p:ph idx="1"/>
+          </p:nvPr>
+        </p:nvSpPr>
+        <p:spPr/>
+        <p:txBody>
+          <a:bodyPr/>
+          <a:lstStyle/>
+          <a:p>
+            <a:r>
+              <a:rPr lang="en-GB" dirty="0"/>
+              <a:t>J. A. </a:t>
+            </a:r>
+            <a:r>
+              <a:rPr lang="en-GB" dirty="0" err="1"/>
+              <a:t>Brzozowski</a:t>
+            </a:r>
+            <a:r>
+              <a:rPr lang="en-GB" dirty="0"/>
+              <a:t>. Derivatives of regular expressions. </a:t>
+            </a:r>
+            <a:r>
+              <a:rPr lang="en-GB" i="1" dirty="0"/>
+              <a:t>J. ACM</a:t>
+            </a:r>
+            <a:r>
+              <a:rPr lang="en-GB" dirty="0"/>
+              <a:t>, 11(4):481–494, Oct. 1964.</a:t>
+            </a:r>
+          </a:p>
+          <a:p>
+            <a:r>
+              <a:rPr lang="en-GB" dirty="0"/>
+              <a:t>A. Krauss and T. </a:t>
+            </a:r>
+            <a:r>
+              <a:rPr lang="en-GB" dirty="0" err="1"/>
+              <a:t>Nipkow</a:t>
+            </a:r>
+            <a:r>
+              <a:rPr lang="en-GB" dirty="0"/>
+              <a:t>. Proof pearl: Regular expression equivalence and relation algebra. J. Automated Reasoning, 49:95–106, 2012. published online March 2011.  </a:t>
+            </a:r>
+            <a:r>
+              <a:rPr lang="en-GB" dirty="0">
+                <a:hlinkClick r:id="rId3"/>
+              </a:rPr>
+              <a:t>http://www21.in.tum.de/~nipkow/pubs/jar12.html</a:t>
+            </a:r>
+            <a:r>
+              <a:rPr lang="en-GB" dirty="0"/>
+              <a:t>.</a:t>
+            </a:r>
+            <a:endParaRPr lang="en-US" dirty="0"/>
+          </a:p>
+        </p:txBody>
+      </p:sp>
+    </p:spTree>
+    <p:extLst>
+      <p:ext uri="{BB962C8B-B14F-4D97-AF65-F5344CB8AC3E}">
+        <p14:creationId xmlns:p14="http://schemas.microsoft.com/office/powerpoint/2010/main" val="3839886554"/>
+      </p:ext>
+    </p:extLst>
+  </p:cSld>
+  <p:clrMapOvr>
+    <a:masterClrMapping/>
+  </p:clrMapOvr>
+</p:sld>
+</file>
+
 <file path=ppt/slides/slide2.xml><?xml version="1.0" encoding="utf-8"?>
 <p:sld xmlns:a="http://schemas.openxmlformats.org/drawingml/2006/main" xmlns:r="http://schemas.openxmlformats.org/officeDocument/2006/relationships" xmlns:p="http://schemas.openxmlformats.org/presentationml/2006/main">
   <p:cSld>
@@ -5973,6 +6193,123 @@
           <p:cNvPr id="2" name="Titel 1">
             <a:extLst>
               <a:ext uri="{FF2B5EF4-FFF2-40B4-BE49-F238E27FC236}">
+                <a16:creationId xmlns:a16="http://schemas.microsoft.com/office/drawing/2014/main" id="{7E545568-004C-4426-9618-E5B4001137F9}"/>
+              </a:ext>
+            </a:extLst>
+          </p:cNvPr>
+          <p:cNvSpPr>
+            <a:spLocks noGrp="1"/>
+          </p:cNvSpPr>
+          <p:nvPr>
+            <p:ph type="title"/>
+          </p:nvPr>
+        </p:nvSpPr>
+        <p:spPr/>
+        <p:txBody>
+          <a:bodyPr/>
+          <a:lstStyle/>
+          <a:p>
+            <a:r>
+              <a:rPr lang="en-US" dirty="0"/>
+              <a:t>Closure computation</a:t>
+            </a:r>
+          </a:p>
+        </p:txBody>
+      </p:sp>
+      <p:sp>
+        <p:nvSpPr>
+          <p:cNvPr id="3" name="Inhaltsplatzhalter 2">
+            <a:extLst>
+              <a:ext uri="{FF2B5EF4-FFF2-40B4-BE49-F238E27FC236}">
+                <a16:creationId xmlns:a16="http://schemas.microsoft.com/office/drawing/2014/main" id="{586033B4-AF90-4560-A2E5-9FB163B244C7}"/>
+              </a:ext>
+            </a:extLst>
+          </p:cNvPr>
+          <p:cNvSpPr>
+            <a:spLocks noGrp="1"/>
+          </p:cNvSpPr>
+          <p:nvPr>
+            <p:ph idx="1"/>
+          </p:nvPr>
+        </p:nvSpPr>
+        <p:spPr/>
+        <p:txBody>
+          <a:bodyPr/>
+          <a:lstStyle/>
+          <a:p>
+            <a:endParaRPr lang="en-US" dirty="0"/>
+          </a:p>
+          <a:p>
+            <a:endParaRPr lang="en-US" dirty="0"/>
+          </a:p>
+          <a:p>
+            <a:endParaRPr lang="en-US" dirty="0"/>
+          </a:p>
+          <a:p>
+            <a:r>
+              <a:rPr lang="en-US" dirty="0"/>
+              <a:t>terminates if either</a:t>
+            </a:r>
+          </a:p>
+          <a:p>
+            <a:pPr lvl="1"/>
+            <a:r>
+              <a:rPr lang="en-US" dirty="0"/>
+              <a:t>the work set is empty (</a:t>
+            </a:r>
+            <a:r>
+              <a:rPr lang="en-US" dirty="0" err="1"/>
+              <a:t>bisimulation</a:t>
+            </a:r>
+            <a:r>
+              <a:rPr lang="en-US" dirty="0"/>
+              <a:t> constructed)</a:t>
+            </a:r>
+          </a:p>
+          <a:p>
+            <a:pPr lvl="1"/>
+            <a:r>
+              <a:rPr lang="en-US" dirty="0"/>
+              <a:t>a nonequivalent pair of REs is to be processed (counterexample found)</a:t>
+            </a:r>
+          </a:p>
+        </p:txBody>
+      </p:sp>
+    </p:spTree>
+    <p:extLst>
+      <p:ext uri="{BB962C8B-B14F-4D97-AF65-F5344CB8AC3E}">
+        <p14:creationId xmlns:p14="http://schemas.microsoft.com/office/powerpoint/2010/main" val="1786495179"/>
+      </p:ext>
+    </p:extLst>
+  </p:cSld>
+  <p:clrMapOvr>
+    <a:masterClrMapping/>
+  </p:clrMapOvr>
+</p:sld>
+</file>
+
+<file path=ppt/slides/slide8.xml><?xml version="1.0" encoding="utf-8"?>
+<p:sld xmlns:a="http://schemas.openxmlformats.org/drawingml/2006/main" xmlns:r="http://schemas.openxmlformats.org/officeDocument/2006/relationships" xmlns:p="http://schemas.openxmlformats.org/presentationml/2006/main">
+  <p:cSld>
+    <p:spTree>
+      <p:nvGrpSpPr>
+        <p:cNvPr id="1" name=""/>
+        <p:cNvGrpSpPr/>
+        <p:nvPr/>
+      </p:nvGrpSpPr>
+      <p:grpSpPr>
+        <a:xfrm>
+          <a:off x="0" y="0"/>
+          <a:ext cx="0" cy="0"/>
+          <a:chOff x="0" y="0"/>
+          <a:chExt cx="0" cy="0"/>
+        </a:xfrm>
+      </p:grpSpPr>
+      <p:sp>
+        <p:nvSpPr>
+          <p:cNvPr id="2" name="Titel 1">
+            <a:extLst>
+              <a:ext uri="{FF2B5EF4-FFF2-40B4-BE49-F238E27FC236}">
                 <a16:creationId xmlns:a16="http://schemas.microsoft.com/office/drawing/2014/main" id="{C2BD6476-74CB-4A4F-8A71-ABCEDDC496FB}"/>
               </a:ext>
             </a:extLst>
@@ -6037,7 +6374,7 @@
 </p:sld>
 </file>
 
-<file path=ppt/slides/slide8.xml><?xml version="1.0" encoding="utf-8"?>
+<file path=ppt/slides/slide9.xml><?xml version="1.0" encoding="utf-8"?>
 <p:sld xmlns:a="http://schemas.openxmlformats.org/drawingml/2006/main" xmlns:r="http://schemas.openxmlformats.org/officeDocument/2006/relationships" xmlns:p="http://schemas.openxmlformats.org/presentationml/2006/main">
   <p:cSld>
     <p:spTree>

</xml_diff>

<commit_message>
more for the slides
</commit_message>
<xml_diff>
--- a/slides.pptx
+++ b/slides.pptx
@@ -5,26 +5,27 @@
     <p:sldMasterId id="2147483648" r:id="rId1"/>
   </p:sldMasterIdLst>
   <p:notesMasterIdLst>
-    <p:notesMasterId r:id="rId19"/>
+    <p:notesMasterId r:id="rId20"/>
   </p:notesMasterIdLst>
   <p:sldIdLst>
     <p:sldId id="256" r:id="rId2"/>
     <p:sldId id="258" r:id="rId3"/>
-    <p:sldId id="280" r:id="rId4"/>
-    <p:sldId id="261" r:id="rId5"/>
+    <p:sldId id="261" r:id="rId4"/>
+    <p:sldId id="280" r:id="rId5"/>
     <p:sldId id="262" r:id="rId6"/>
     <p:sldId id="263" r:id="rId7"/>
     <p:sldId id="270" r:id="rId8"/>
     <p:sldId id="271" r:id="rId9"/>
     <p:sldId id="272" r:id="rId10"/>
     <p:sldId id="273" r:id="rId11"/>
-    <p:sldId id="281" r:id="rId12"/>
-    <p:sldId id="274" r:id="rId13"/>
-    <p:sldId id="278" r:id="rId14"/>
-    <p:sldId id="264" r:id="rId15"/>
-    <p:sldId id="265" r:id="rId16"/>
-    <p:sldId id="257" r:id="rId17"/>
-    <p:sldId id="283" r:id="rId18"/>
+    <p:sldId id="278" r:id="rId12"/>
+    <p:sldId id="281" r:id="rId13"/>
+    <p:sldId id="265" r:id="rId14"/>
+    <p:sldId id="274" r:id="rId15"/>
+    <p:sldId id="264" r:id="rId16"/>
+    <p:sldId id="284" r:id="rId17"/>
+    <p:sldId id="257" r:id="rId18"/>
+    <p:sldId id="283" r:id="rId19"/>
   </p:sldIdLst>
   <p:sldSz cx="12192000" cy="6858000"/>
   <p:notesSz cx="6858000" cy="9144000"/>
@@ -670,8 +671,13 @@
           <a:p>
             <a:r>
               <a:rPr lang="en-US" dirty="0"/>
-              <a:t>left: work set right: relation</a:t>
-            </a:r>
+              <a:t>left: work set right: relation which we hope to make a </a:t>
+            </a:r>
+            <a:r>
+              <a:rPr lang="en-US" dirty="0" err="1"/>
+              <a:t>bisimulation</a:t>
+            </a:r>
+            <a:endParaRPr lang="en-US" dirty="0"/>
           </a:p>
         </p:txBody>
       </p:sp>
@@ -755,6 +761,12 @@
           <a:bodyPr/>
           <a:lstStyle/>
           <a:p>
+            <a:r>
+              <a:rPr lang="en-US" dirty="0"/>
+              <a:t>1: standard work set algorithm</a:t>
+            </a:r>
+          </a:p>
+          <a:p>
             <a:endParaRPr lang="en-US" dirty="0"/>
           </a:p>
         </p:txBody>
@@ -785,7 +797,7 @@
     </p:spTree>
     <p:extLst>
       <p:ext uri="{BB962C8B-B14F-4D97-AF65-F5344CB8AC3E}">
-        <p14:creationId xmlns:p14="http://schemas.microsoft.com/office/powerpoint/2010/main" val="1142687865"/>
+        <p14:creationId xmlns:p14="http://schemas.microsoft.com/office/powerpoint/2010/main" val="922902247"/>
       </p:ext>
     </p:extLst>
   </p:cSld>
@@ -841,11 +853,8 @@
           <a:p>
             <a:r>
               <a:rPr lang="en-US" dirty="0"/>
-              <a:t>1: standard work set algorithm</a:t>
-            </a:r>
-          </a:p>
-          <a:p>
-            <a:endParaRPr lang="en-US" dirty="0"/>
+              <a:t>It expects a while-condition, of course, that one is still missing.</a:t>
+            </a:r>
           </a:p>
         </p:txBody>
       </p:sp>
@@ -866,7 +875,7 @@
           <a:p>
             <a:fld id="{FAA32559-8951-4C46-A356-FBB9455D7E38}" type="slidenum">
               <a:rPr lang="de-DE" smtClean="0"/>
-              <a:t>13</a:t>
+              <a:t>12</a:t>
             </a:fld>
             <a:endParaRPr lang="de-DE"/>
           </a:p>
@@ -875,7 +884,7 @@
     </p:spTree>
     <p:extLst>
       <p:ext uri="{BB962C8B-B14F-4D97-AF65-F5344CB8AC3E}">
-        <p14:creationId xmlns:p14="http://schemas.microsoft.com/office/powerpoint/2010/main" val="922902247"/>
+        <p14:creationId xmlns:p14="http://schemas.microsoft.com/office/powerpoint/2010/main" val="1142687865"/>
       </p:ext>
     </p:extLst>
   </p:cSld>
@@ -931,37 +940,21 @@
           <a:p>
             <a:r>
               <a:rPr lang="en-US" dirty="0"/>
-              <a:t>so, for a position of the </a:t>
-            </a:r>
-            <a:r>
-              <a:rPr lang="en-US" dirty="0" err="1"/>
-              <a:t>subterms</a:t>
-            </a:r>
+              <a:t>These two cases are absolutely crucial to understand. If you want to, I can go back to the definition of </a:t>
+            </a:r>
+            <a:r>
+              <a:rPr lang="en-US" i="1" dirty="0" err="1"/>
+              <a:t>bisimulation</a:t>
+            </a:r>
+            <a:endParaRPr lang="en-US" i="1" dirty="0"/>
+          </a:p>
+          <a:p>
+            <a:endParaRPr lang="en-US" dirty="0"/>
+          </a:p>
+          <a:p>
             <a:r>
               <a:rPr lang="en-US" dirty="0"/>
-              <a:t> in the sequence … + … + … + … (</a:t>
-            </a:r>
-            <a:r>
-              <a:rPr lang="en-US" dirty="0" err="1"/>
-              <a:t>Wich</a:t>
-            </a:r>
-            <a:r>
-              <a:rPr lang="en-US" dirty="0"/>
-              <a:t> is a tree, but due to associativity we can transform into a list) to be uniquely determined, we can just define an arbitrary order on the topmost constructors. Then every </a:t>
-            </a:r>
-            <a:r>
-              <a:rPr lang="en-US" dirty="0" err="1"/>
-              <a:t>subterm</a:t>
-            </a:r>
-            <a:r>
-              <a:rPr lang="en-US" dirty="0"/>
-              <a:t> is already in the “correct section the a list” and then, its subparts get normed again.</a:t>
-            </a:r>
-          </a:p>
-          <a:p>
-            <a:r>
-              <a:rPr lang="en-US" dirty="0"/>
-              <a:t>Actually, the correct way is to work bottom up, but you get the idea.</a:t>
+              <a:t>Maybe define the “iterated derivate language” ^D_a1…an L = {w | a1…an @ w \in L}</a:t>
             </a:r>
           </a:p>
         </p:txBody>
@@ -983,7 +976,7 @@
           <a:p>
             <a:fld id="{FAA32559-8951-4C46-A356-FBB9455D7E38}" type="slidenum">
               <a:rPr lang="de-DE" smtClean="0"/>
-              <a:t>14</a:t>
+              <a:t>13</a:t>
             </a:fld>
             <a:endParaRPr lang="de-DE"/>
           </a:p>
@@ -992,7 +985,7 @@
     </p:spTree>
     <p:extLst>
       <p:ext uri="{BB962C8B-B14F-4D97-AF65-F5344CB8AC3E}">
-        <p14:creationId xmlns:p14="http://schemas.microsoft.com/office/powerpoint/2010/main" val="2615019396"/>
+        <p14:creationId xmlns:p14="http://schemas.microsoft.com/office/powerpoint/2010/main" val="2666065160"/>
       </p:ext>
     </p:extLst>
   </p:cSld>
@@ -1047,175 +1040,264 @@
           <a:lstStyle/>
           <a:p>
             <a:r>
-              <a:rPr lang="de-DE" dirty="0"/>
-              <a:t>…</a:t>
-            </a:r>
-            <a:r>
-              <a:rPr lang="de-DE" dirty="0" err="1"/>
-              <a:t>extended</a:t>
-            </a:r>
-            <a:r>
-              <a:rPr lang="de-DE" dirty="0"/>
-              <a:t> REs </a:t>
-            </a:r>
-            <a:r>
-              <a:rPr lang="de-DE" dirty="0" err="1"/>
-              <a:t>are</a:t>
-            </a:r>
-            <a:r>
-              <a:rPr lang="de-DE" dirty="0"/>
-              <a:t> not </a:t>
-            </a:r>
-            <a:r>
-              <a:rPr lang="de-DE" dirty="0" err="1"/>
-              <a:t>more</a:t>
-            </a:r>
-            <a:r>
-              <a:rPr lang="de-DE" dirty="0"/>
-              <a:t> expressive, but </a:t>
-            </a:r>
-            <a:r>
-              <a:rPr lang="de-DE" dirty="0" err="1"/>
-              <a:t>they</a:t>
-            </a:r>
-            <a:r>
-              <a:rPr lang="de-DE" dirty="0"/>
-              <a:t> </a:t>
-            </a:r>
-            <a:r>
-              <a:rPr lang="de-DE" dirty="0" err="1"/>
-              <a:t>can</a:t>
-            </a:r>
-            <a:r>
-              <a:rPr lang="de-DE" dirty="0"/>
-              <a:t> </a:t>
-            </a:r>
-            <a:r>
-              <a:rPr lang="de-DE" dirty="0" err="1"/>
-              <a:t>be</a:t>
-            </a:r>
-            <a:r>
-              <a:rPr lang="de-DE" dirty="0"/>
-              <a:t> </a:t>
-            </a:r>
-            <a:r>
-              <a:rPr lang="de-DE" dirty="0" err="1"/>
-              <a:t>much</a:t>
-            </a:r>
-            <a:r>
-              <a:rPr lang="de-DE" dirty="0"/>
-              <a:t> </a:t>
-            </a:r>
-            <a:r>
-              <a:rPr lang="de-DE" dirty="0" err="1"/>
-              <a:t>more</a:t>
-            </a:r>
-            <a:r>
-              <a:rPr lang="de-DE" dirty="0"/>
-              <a:t> </a:t>
-            </a:r>
-            <a:r>
-              <a:rPr lang="de-DE" dirty="0" err="1"/>
-              <a:t>succinct</a:t>
-            </a:r>
-            <a:endParaRPr lang="de-DE" dirty="0"/>
-          </a:p>
-          <a:p>
-            <a:endParaRPr lang="de-DE" dirty="0"/>
-          </a:p>
-          <a:p>
-            <a:r>
-              <a:rPr lang="de-DE" dirty="0"/>
-              <a:t>… and </a:t>
-            </a:r>
-            <a:r>
-              <a:rPr lang="de-DE" dirty="0" err="1"/>
-              <a:t>then</a:t>
-            </a:r>
-            <a:r>
-              <a:rPr lang="de-DE" dirty="0"/>
-              <a:t> </a:t>
-            </a:r>
-            <a:r>
-              <a:rPr lang="de-DE" dirty="0" err="1"/>
-              <a:t>we‘re</a:t>
-            </a:r>
-            <a:r>
-              <a:rPr lang="de-DE" dirty="0"/>
-              <a:t> </a:t>
-            </a:r>
-            <a:r>
-              <a:rPr lang="de-DE" dirty="0" err="1"/>
-              <a:t>done</a:t>
-            </a:r>
-            <a:r>
-              <a:rPr lang="de-DE" dirty="0"/>
-              <a:t> </a:t>
-            </a:r>
-            <a:r>
-              <a:rPr lang="de-DE" dirty="0" err="1"/>
-              <a:t>already</a:t>
-            </a:r>
-            <a:r>
-              <a:rPr lang="de-DE" dirty="0"/>
-              <a:t> </a:t>
-            </a:r>
-            <a:r>
-              <a:rPr lang="de-DE" dirty="0" err="1"/>
-              <a:t>for</a:t>
-            </a:r>
-            <a:r>
-              <a:rPr lang="de-DE" dirty="0"/>
-              <a:t> </a:t>
-            </a:r>
-            <a:r>
-              <a:rPr lang="de-DE" dirty="0" err="1"/>
-              <a:t>the</a:t>
-            </a:r>
-            <a:r>
-              <a:rPr lang="de-DE" dirty="0"/>
-              <a:t> </a:t>
-            </a:r>
-            <a:r>
-              <a:rPr lang="de-DE" dirty="0" err="1"/>
-              <a:t>soundness</a:t>
-            </a:r>
-            <a:r>
-              <a:rPr lang="de-DE" dirty="0"/>
-              <a:t>. </a:t>
-            </a:r>
-          </a:p>
-          <a:p>
-            <a:endParaRPr lang="de-DE" dirty="0"/>
-          </a:p>
-          <a:p>
-            <a:r>
-              <a:rPr lang="de-DE" dirty="0"/>
-              <a:t>As </a:t>
-            </a:r>
-            <a:r>
-              <a:rPr lang="de-DE" dirty="0" err="1"/>
-              <a:t>for</a:t>
-            </a:r>
-            <a:r>
-              <a:rPr lang="de-DE" dirty="0"/>
-              <a:t> </a:t>
-            </a:r>
-            <a:r>
-              <a:rPr lang="de-DE" dirty="0" err="1"/>
-              <a:t>the</a:t>
-            </a:r>
-            <a:r>
-              <a:rPr lang="de-DE" dirty="0"/>
-              <a:t> </a:t>
-            </a:r>
-            <a:r>
-              <a:rPr lang="de-DE" dirty="0" err="1"/>
-              <a:t>termination</a:t>
-            </a:r>
-            <a:r>
-              <a:rPr lang="de-DE" dirty="0"/>
-              <a:t> </a:t>
+              <a:rPr lang="pt-BR" dirty="0">
+                <a:latin typeface="Lucida Bright" panose="02040602050505020304" pitchFamily="18" charset="0"/>
+              </a:rPr>
+              <a:t>to-do: alternatively</a:t>
+            </a:r>
+          </a:p>
+          <a:p>
+            <a:r>
+              <a:rPr lang="pt-BR" dirty="0">
+                <a:latin typeface="Lucida Bright" panose="02040602050505020304" pitchFamily="18" charset="0"/>
+              </a:rPr>
+              <a:t>	L ((ε + a ⋅ b)* ⋅ (a + b)) = L ((a ⋅ b + ε)* ⋅ (a + b))</a:t>
+            </a:r>
+            <a:endParaRPr lang="en-US" dirty="0"/>
+          </a:p>
+        </p:txBody>
+      </p:sp>
+      <p:sp>
+        <p:nvSpPr>
+          <p:cNvPr id="4" name="Foliennummernplatzhalter 3"/>
+          <p:cNvSpPr>
+            <a:spLocks noGrp="1"/>
+          </p:cNvSpPr>
+          <p:nvPr>
+            <p:ph type="sldNum" sz="quarter" idx="10"/>
+          </p:nvPr>
+        </p:nvSpPr>
+        <p:spPr/>
+        <p:txBody>
+          <a:bodyPr/>
+          <a:lstStyle/>
+          <a:p>
+            <a:fld id="{FAA32559-8951-4C46-A356-FBB9455D7E38}" type="slidenum">
+              <a:rPr lang="de-DE" smtClean="0"/>
+              <a:t>14</a:t>
+            </a:fld>
+            <a:endParaRPr lang="de-DE"/>
+          </a:p>
+        </p:txBody>
+      </p:sp>
+    </p:spTree>
+    <p:extLst>
+      <p:ext uri="{BB962C8B-B14F-4D97-AF65-F5344CB8AC3E}">
+        <p14:creationId xmlns:p14="http://schemas.microsoft.com/office/powerpoint/2010/main" val="3561148988"/>
+      </p:ext>
+    </p:extLst>
+  </p:cSld>
+  <p:clrMapOvr>
+    <a:masterClrMapping/>
+  </p:clrMapOvr>
+</p:notes>
+</file>
+
+<file path=ppt/notesSlides/notesSlide15.xml><?xml version="1.0" encoding="utf-8"?>
+<p:notes xmlns:a="http://schemas.openxmlformats.org/drawingml/2006/main" xmlns:r="http://schemas.openxmlformats.org/officeDocument/2006/relationships" xmlns:p="http://schemas.openxmlformats.org/presentationml/2006/main">
+  <p:cSld>
+    <p:spTree>
+      <p:nvGrpSpPr>
+        <p:cNvPr id="1" name=""/>
+        <p:cNvGrpSpPr/>
+        <p:nvPr/>
+      </p:nvGrpSpPr>
+      <p:grpSpPr>
+        <a:xfrm>
+          <a:off x="0" y="0"/>
+          <a:ext cx="0" cy="0"/>
+          <a:chOff x="0" y="0"/>
+          <a:chExt cx="0" cy="0"/>
+        </a:xfrm>
+      </p:grpSpPr>
+      <p:sp>
+        <p:nvSpPr>
+          <p:cNvPr id="2" name="Folienbildplatzhalter 1"/>
+          <p:cNvSpPr>
+            <a:spLocks noGrp="1" noRot="1" noChangeAspect="1"/>
+          </p:cNvSpPr>
+          <p:nvPr>
+            <p:ph type="sldImg"/>
+          </p:nvPr>
+        </p:nvSpPr>
+        <p:spPr/>
+      </p:sp>
+      <p:sp>
+        <p:nvSpPr>
+          <p:cNvPr id="3" name="Notizenplatzhalter 2"/>
+          <p:cNvSpPr>
+            <a:spLocks noGrp="1"/>
+          </p:cNvSpPr>
+          <p:nvPr>
+            <p:ph type="body" idx="1"/>
+          </p:nvPr>
+        </p:nvSpPr>
+        <p:spPr/>
+        <p:txBody>
+          <a:bodyPr/>
+          <a:lstStyle/>
+          <a:p>
+            <a:r>
+              <a:rPr lang="en-US" dirty="0"/>
+              <a:t>meaning that two REs are ACI-equal </a:t>
+            </a:r>
+            <a:r>
+              <a:rPr lang="en-US" dirty="0" err="1"/>
+              <a:t>iff</a:t>
+            </a:r>
+            <a:r>
+              <a:rPr lang="en-US" dirty="0"/>
+              <a:t> they can be transformed using only these rules on the </a:t>
+            </a:r>
+            <a:r>
+              <a:rPr lang="en-US" dirty="0" err="1"/>
+              <a:t>subterms</a:t>
+            </a:r>
+            <a:endParaRPr lang="en-US" dirty="0"/>
+          </a:p>
+          <a:p>
+            <a:endParaRPr lang="en-US" dirty="0"/>
+          </a:p>
+          <a:p>
+            <a:r>
+              <a:rPr lang="en-US" dirty="0"/>
+              <a:t>We need to work bottom up, for star and concatenation, this might require a lexicographic ordering.</a:t>
+            </a:r>
+          </a:p>
+          <a:p>
+            <a:endParaRPr lang="en-US" dirty="0"/>
+          </a:p>
+          <a:p>
+            <a:r>
+              <a:rPr lang="en-US" dirty="0"/>
+              <a:t>3.3: this identifies SOME equivalent REs, but not all of them.</a:t>
+            </a:r>
+          </a:p>
+          <a:p>
+            <a:r>
+              <a:rPr lang="en-US" dirty="0"/>
+              <a:t>aa* is equivalent to a*a, but this technique cannot prove it, because there is no “+” in it to transform</a:t>
+            </a:r>
+          </a:p>
+          <a:p>
+            <a:endParaRPr lang="en-US" dirty="0"/>
+          </a:p>
+          <a:p>
+            <a:endParaRPr lang="en-US" dirty="0"/>
+          </a:p>
+        </p:txBody>
+      </p:sp>
+      <p:sp>
+        <p:nvSpPr>
+          <p:cNvPr id="4" name="Foliennummernplatzhalter 3"/>
+          <p:cNvSpPr>
+            <a:spLocks noGrp="1"/>
+          </p:cNvSpPr>
+          <p:nvPr>
+            <p:ph type="sldNum" sz="quarter" idx="10"/>
+          </p:nvPr>
+        </p:nvSpPr>
+        <p:spPr/>
+        <p:txBody>
+          <a:bodyPr/>
+          <a:lstStyle/>
+          <a:p>
+            <a:fld id="{FAA32559-8951-4C46-A356-FBB9455D7E38}" type="slidenum">
+              <a:rPr lang="de-DE" smtClean="0"/>
+              <a:t>15</a:t>
+            </a:fld>
+            <a:endParaRPr lang="de-DE"/>
+          </a:p>
+        </p:txBody>
+      </p:sp>
+    </p:spTree>
+    <p:extLst>
+      <p:ext uri="{BB962C8B-B14F-4D97-AF65-F5344CB8AC3E}">
+        <p14:creationId xmlns:p14="http://schemas.microsoft.com/office/powerpoint/2010/main" val="2615019396"/>
+      </p:ext>
+    </p:extLst>
+  </p:cSld>
+  <p:clrMapOvr>
+    <a:masterClrMapping/>
+  </p:clrMapOvr>
+</p:notes>
+</file>
+
+<file path=ppt/notesSlides/notesSlide16.xml><?xml version="1.0" encoding="utf-8"?>
+<p:notes xmlns:a="http://schemas.openxmlformats.org/drawingml/2006/main" xmlns:r="http://schemas.openxmlformats.org/officeDocument/2006/relationships" xmlns:p="http://schemas.openxmlformats.org/presentationml/2006/main">
+  <p:cSld>
+    <p:spTree>
+      <p:nvGrpSpPr>
+        <p:cNvPr id="1" name=""/>
+        <p:cNvGrpSpPr/>
+        <p:nvPr/>
+      </p:nvGrpSpPr>
+      <p:grpSpPr>
+        <a:xfrm>
+          <a:off x="0" y="0"/>
+          <a:ext cx="0" cy="0"/>
+          <a:chOff x="0" y="0"/>
+          <a:chExt cx="0" cy="0"/>
+        </a:xfrm>
+      </p:grpSpPr>
+      <p:sp>
+        <p:nvSpPr>
+          <p:cNvPr id="2" name="Folienbildplatzhalter 1"/>
+          <p:cNvSpPr>
+            <a:spLocks noGrp="1" noRot="1" noChangeAspect="1"/>
+          </p:cNvSpPr>
+          <p:nvPr>
+            <p:ph type="sldImg"/>
+          </p:nvPr>
+        </p:nvSpPr>
+        <p:spPr/>
+      </p:sp>
+      <p:sp>
+        <p:nvSpPr>
+          <p:cNvPr id="3" name="Notizenplatzhalter 2"/>
+          <p:cNvSpPr>
+            <a:spLocks noGrp="1"/>
+          </p:cNvSpPr>
+          <p:nvPr>
+            <p:ph type="body" idx="1"/>
+          </p:nvPr>
+        </p:nvSpPr>
+        <p:spPr/>
+        <p:txBody>
+          <a:bodyPr/>
+          <a:lstStyle/>
+          <a:p>
+            <a:r>
+              <a:rPr lang="en-US" dirty="0"/>
+              <a:t>In other words, there are only finitely many ACI-equivalence classes among equivalent </a:t>
+            </a:r>
+            <a:r>
+              <a:rPr lang="en-US" dirty="0" err="1"/>
+              <a:t>REs.</a:t>
+            </a:r>
+            <a:endParaRPr lang="en-US" dirty="0"/>
+          </a:p>
+          <a:p>
+            <a:endParaRPr lang="en-US" dirty="0"/>
+          </a:p>
+          <a:p>
+            <a:r>
+              <a:rPr lang="en-US" dirty="0"/>
+              <a:t>We are allowed to strengthen this filter: Remember that the goal was to apply the </a:t>
+            </a:r>
+            <a:r>
+              <a:rPr lang="en-US" dirty="0" err="1"/>
+              <a:t>bisimulation</a:t>
+            </a:r>
+            <a:r>
+              <a:rPr lang="en-US" dirty="0"/>
+              <a:t> lemma at the end. It worked on languages, and the language pair is already added I f </a:t>
+            </a:r>
+          </a:p>
+          <a:p>
+            <a:r>
+              <a:rPr lang="en-US" dirty="0"/>
+              <a:t>to-do: maybe swap formulation on the slides with the explanation?</a:t>
             </a:r>
           </a:p>
         </p:txBody>
@@ -1238,6 +1320,260 @@
             <a:fld id="{FAA32559-8951-4C46-A356-FBB9455D7E38}" type="slidenum">
               <a:rPr lang="de-DE" smtClean="0"/>
               <a:t>16</a:t>
+            </a:fld>
+            <a:endParaRPr lang="de-DE"/>
+          </a:p>
+        </p:txBody>
+      </p:sp>
+    </p:spTree>
+    <p:extLst>
+      <p:ext uri="{BB962C8B-B14F-4D97-AF65-F5344CB8AC3E}">
+        <p14:creationId xmlns:p14="http://schemas.microsoft.com/office/powerpoint/2010/main" val="176357657"/>
+      </p:ext>
+    </p:extLst>
+  </p:cSld>
+  <p:clrMapOvr>
+    <a:masterClrMapping/>
+  </p:clrMapOvr>
+</p:notes>
+</file>
+
+<file path=ppt/notesSlides/notesSlide17.xml><?xml version="1.0" encoding="utf-8"?>
+<p:notes xmlns:a="http://schemas.openxmlformats.org/drawingml/2006/main" xmlns:r="http://schemas.openxmlformats.org/officeDocument/2006/relationships" xmlns:p="http://schemas.openxmlformats.org/presentationml/2006/main">
+  <p:cSld>
+    <p:spTree>
+      <p:nvGrpSpPr>
+        <p:cNvPr id="1" name=""/>
+        <p:cNvGrpSpPr/>
+        <p:nvPr/>
+      </p:nvGrpSpPr>
+      <p:grpSpPr>
+        <a:xfrm>
+          <a:off x="0" y="0"/>
+          <a:ext cx="0" cy="0"/>
+          <a:chOff x="0" y="0"/>
+          <a:chExt cx="0" cy="0"/>
+        </a:xfrm>
+      </p:grpSpPr>
+      <p:sp>
+        <p:nvSpPr>
+          <p:cNvPr id="2" name="Folienbildplatzhalter 1"/>
+          <p:cNvSpPr>
+            <a:spLocks noGrp="1" noRot="1" noChangeAspect="1"/>
+          </p:cNvSpPr>
+          <p:nvPr>
+            <p:ph type="sldImg"/>
+          </p:nvPr>
+        </p:nvSpPr>
+        <p:spPr/>
+      </p:sp>
+      <p:sp>
+        <p:nvSpPr>
+          <p:cNvPr id="3" name="Notizenplatzhalter 2"/>
+          <p:cNvSpPr>
+            <a:spLocks noGrp="1"/>
+          </p:cNvSpPr>
+          <p:nvPr>
+            <p:ph type="body" idx="1"/>
+          </p:nvPr>
+        </p:nvSpPr>
+        <p:spPr/>
+        <p:txBody>
+          <a:bodyPr/>
+          <a:lstStyle/>
+          <a:p>
+            <a:r>
+              <a:rPr lang="de-DE" dirty="0"/>
+              <a:t>…</a:t>
+            </a:r>
+            <a:r>
+              <a:rPr lang="de-DE" dirty="0" err="1"/>
+              <a:t>extended</a:t>
+            </a:r>
+            <a:r>
+              <a:rPr lang="de-DE" dirty="0"/>
+              <a:t> REs </a:t>
+            </a:r>
+            <a:r>
+              <a:rPr lang="de-DE" dirty="0" err="1"/>
+              <a:t>are</a:t>
+            </a:r>
+            <a:r>
+              <a:rPr lang="de-DE" dirty="0"/>
+              <a:t> not </a:t>
+            </a:r>
+            <a:r>
+              <a:rPr lang="de-DE" dirty="0" err="1"/>
+              <a:t>more</a:t>
+            </a:r>
+            <a:r>
+              <a:rPr lang="de-DE" dirty="0"/>
+              <a:t> expressive, but </a:t>
+            </a:r>
+            <a:r>
+              <a:rPr lang="de-DE" dirty="0" err="1"/>
+              <a:t>they</a:t>
+            </a:r>
+            <a:r>
+              <a:rPr lang="de-DE" dirty="0"/>
+              <a:t> </a:t>
+            </a:r>
+            <a:r>
+              <a:rPr lang="de-DE" dirty="0" err="1"/>
+              <a:t>can</a:t>
+            </a:r>
+            <a:r>
+              <a:rPr lang="de-DE" dirty="0"/>
+              <a:t> </a:t>
+            </a:r>
+            <a:r>
+              <a:rPr lang="de-DE" dirty="0" err="1"/>
+              <a:t>be</a:t>
+            </a:r>
+            <a:r>
+              <a:rPr lang="de-DE" dirty="0"/>
+              <a:t> </a:t>
+            </a:r>
+            <a:r>
+              <a:rPr lang="de-DE" dirty="0" err="1"/>
+              <a:t>much</a:t>
+            </a:r>
+            <a:r>
+              <a:rPr lang="de-DE" dirty="0"/>
+              <a:t> </a:t>
+            </a:r>
+            <a:r>
+              <a:rPr lang="de-DE" dirty="0" err="1"/>
+              <a:t>more</a:t>
+            </a:r>
+            <a:r>
+              <a:rPr lang="de-DE" dirty="0"/>
+              <a:t> </a:t>
+            </a:r>
+            <a:r>
+              <a:rPr lang="de-DE" dirty="0" err="1"/>
+              <a:t>succinct</a:t>
+            </a:r>
+            <a:endParaRPr lang="de-DE" dirty="0"/>
+          </a:p>
+          <a:p>
+            <a:endParaRPr lang="de-DE" dirty="0"/>
+          </a:p>
+          <a:p>
+            <a:r>
+              <a:rPr lang="de-DE" dirty="0"/>
+              <a:t>… and </a:t>
+            </a:r>
+            <a:r>
+              <a:rPr lang="de-DE" dirty="0" err="1"/>
+              <a:t>then</a:t>
+            </a:r>
+            <a:r>
+              <a:rPr lang="de-DE" dirty="0"/>
+              <a:t> </a:t>
+            </a:r>
+            <a:r>
+              <a:rPr lang="de-DE" dirty="0" err="1"/>
+              <a:t>we‘re</a:t>
+            </a:r>
+            <a:r>
+              <a:rPr lang="de-DE" dirty="0"/>
+              <a:t> </a:t>
+            </a:r>
+            <a:r>
+              <a:rPr lang="de-DE" dirty="0" err="1"/>
+              <a:t>done</a:t>
+            </a:r>
+            <a:r>
+              <a:rPr lang="de-DE" dirty="0"/>
+              <a:t> </a:t>
+            </a:r>
+            <a:r>
+              <a:rPr lang="de-DE" dirty="0" err="1"/>
+              <a:t>already</a:t>
+            </a:r>
+            <a:r>
+              <a:rPr lang="de-DE" dirty="0"/>
+              <a:t> </a:t>
+            </a:r>
+            <a:r>
+              <a:rPr lang="de-DE" dirty="0" err="1"/>
+              <a:t>for</a:t>
+            </a:r>
+            <a:r>
+              <a:rPr lang="de-DE" dirty="0"/>
+              <a:t> </a:t>
+            </a:r>
+            <a:r>
+              <a:rPr lang="de-DE" dirty="0" err="1"/>
+              <a:t>the</a:t>
+            </a:r>
+            <a:r>
+              <a:rPr lang="de-DE" dirty="0"/>
+              <a:t> </a:t>
+            </a:r>
+            <a:r>
+              <a:rPr lang="de-DE" dirty="0" err="1"/>
+              <a:t>soundness</a:t>
+            </a:r>
+            <a:r>
+              <a:rPr lang="de-DE" dirty="0"/>
+              <a:t>. </a:t>
+            </a:r>
+          </a:p>
+          <a:p>
+            <a:endParaRPr lang="de-DE" dirty="0"/>
+          </a:p>
+          <a:p>
+            <a:r>
+              <a:rPr lang="de-DE" dirty="0"/>
+              <a:t>As </a:t>
+            </a:r>
+            <a:r>
+              <a:rPr lang="de-DE" dirty="0" err="1"/>
+              <a:t>for</a:t>
+            </a:r>
+            <a:r>
+              <a:rPr lang="de-DE" dirty="0"/>
+              <a:t> </a:t>
+            </a:r>
+            <a:r>
+              <a:rPr lang="de-DE" dirty="0" err="1"/>
+              <a:t>the</a:t>
+            </a:r>
+            <a:r>
+              <a:rPr lang="de-DE" dirty="0"/>
+              <a:t> </a:t>
+            </a:r>
+            <a:r>
+              <a:rPr lang="de-DE" dirty="0" err="1"/>
+              <a:t>termination</a:t>
+            </a:r>
+            <a:r>
+              <a:rPr lang="de-DE" dirty="0"/>
+              <a:t> </a:t>
+            </a:r>
+          </a:p>
+        </p:txBody>
+      </p:sp>
+      <p:sp>
+        <p:nvSpPr>
+          <p:cNvPr id="4" name="Foliennummernplatzhalter 3"/>
+          <p:cNvSpPr>
+            <a:spLocks noGrp="1"/>
+          </p:cNvSpPr>
+          <p:nvPr>
+            <p:ph type="sldNum" sz="quarter" idx="10"/>
+          </p:nvPr>
+        </p:nvSpPr>
+        <p:spPr/>
+        <p:txBody>
+          <a:bodyPr/>
+          <a:lstStyle/>
+          <a:p>
+            <a:fld id="{FAA32559-8951-4C46-A356-FBB9455D7E38}" type="slidenum">
+              <a:rPr lang="de-DE" smtClean="0"/>
+              <a:t>17</a:t>
             </a:fld>
             <a:endParaRPr lang="de-DE"/>
           </a:p>
@@ -1803,15 +2139,103 @@
           <a:p>
             <a:r>
               <a:rPr lang="en-US" dirty="0"/>
-              <a:t>Now the goal is to construct such a </a:t>
+              <a:t>To-do: </a:t>
             </a:r>
             <a:r>
               <a:rPr lang="en-US" dirty="0" err="1"/>
-              <a:t>ps</a:t>
+              <a:t>wirklich</a:t>
+            </a:r>
+            <a:r>
+              <a:rPr lang="en-US" dirty="0"/>
+              <a:t> relevant und </a:t>
+            </a:r>
+            <a:r>
+              <a:rPr lang="en-US" dirty="0" err="1"/>
+              <a:t>leicht</a:t>
             </a:r>
             <a:r>
               <a:rPr lang="en-US" dirty="0"/>
               <a:t> </a:t>
+            </a:r>
+            <a:r>
+              <a:rPr lang="en-US" dirty="0" err="1"/>
+              <a:t>genug</a:t>
+            </a:r>
+            <a:r>
+              <a:rPr lang="en-US" dirty="0"/>
+              <a:t> </a:t>
+            </a:r>
+            <a:r>
+              <a:rPr lang="en-US" dirty="0" err="1"/>
+              <a:t>verständlich</a:t>
+            </a:r>
+            <a:r>
+              <a:rPr lang="en-US" dirty="0"/>
+              <a:t>? </a:t>
+            </a:r>
+            <a:r>
+              <a:rPr lang="en-US" dirty="0" err="1"/>
+              <a:t>Evtl</a:t>
+            </a:r>
+            <a:r>
+              <a:rPr lang="en-US" dirty="0"/>
+              <a:t>. </a:t>
+            </a:r>
+            <a:r>
+              <a:rPr lang="en-US" dirty="0" err="1"/>
+              <a:t>besser</a:t>
+            </a:r>
+            <a:r>
+              <a:rPr lang="en-US" dirty="0"/>
+              <a:t> so </a:t>
+            </a:r>
+            <a:r>
+              <a:rPr lang="en-US" dirty="0" err="1"/>
+              <a:t>erklären</a:t>
+            </a:r>
+            <a:r>
+              <a:rPr lang="en-US" dirty="0"/>
+              <a:t> </a:t>
+            </a:r>
+            <a:r>
+              <a:rPr lang="en-US" dirty="0" err="1"/>
+              <a:t>wie</a:t>
+            </a:r>
+            <a:r>
+              <a:rPr lang="en-US" dirty="0"/>
+              <a:t> der </a:t>
+            </a:r>
+            <a:r>
+              <a:rPr lang="en-US" dirty="0" err="1"/>
+              <a:t>letzte</a:t>
+            </a:r>
+            <a:r>
+              <a:rPr lang="en-US" dirty="0"/>
+              <a:t> </a:t>
+            </a:r>
+            <a:r>
+              <a:rPr lang="en-US" dirty="0" err="1"/>
+              <a:t>Absatz</a:t>
+            </a:r>
+            <a:r>
+              <a:rPr lang="en-US" dirty="0"/>
+              <a:t> </a:t>
+            </a:r>
+            <a:r>
+              <a:rPr lang="en-US" dirty="0" err="1"/>
+              <a:t>vor</a:t>
+            </a:r>
+            <a:r>
+              <a:rPr lang="en-US" dirty="0"/>
+              <a:t> </a:t>
+            </a:r>
+            <a:r>
+              <a:rPr lang="en-US" dirty="0" err="1"/>
+              <a:t>Abschnitt</a:t>
+            </a:r>
+            <a:r>
+              <a:rPr lang="en-US" dirty="0"/>
+              <a:t> 1.1?</a:t>
             </a:r>
           </a:p>
         </p:txBody>
@@ -1842,7 +2266,7 @@
     </p:spTree>
     <p:extLst>
       <p:ext uri="{BB962C8B-B14F-4D97-AF65-F5344CB8AC3E}">
-        <p14:creationId xmlns:p14="http://schemas.microsoft.com/office/powerpoint/2010/main" val="1314377766"/>
+        <p14:creationId xmlns:p14="http://schemas.microsoft.com/office/powerpoint/2010/main" val="3558965081"/>
       </p:ext>
     </p:extLst>
   </p:cSld>
@@ -1897,105 +2321,44 @@
           <a:lstStyle/>
           <a:p>
             <a:r>
+              <a:rPr lang="en-US" dirty="0" err="1"/>
+              <a:t>ps</a:t>
+            </a:r>
+            <a:r>
               <a:rPr lang="en-US" dirty="0"/>
-              <a:t>To-do: </a:t>
+              <a:t> will </a:t>
+            </a:r>
+            <a:r>
+              <a:rPr lang="en-US"/>
+              <a:t>be relation, a </a:t>
+            </a:r>
+            <a:r>
+              <a:rPr lang="en-US" dirty="0"/>
+              <a:t>list of pairs (or set of pairs if you want)</a:t>
+            </a:r>
+          </a:p>
+          <a:p>
+            <a:endParaRPr lang="en-US" dirty="0"/>
+          </a:p>
+          <a:p>
+            <a:r>
+              <a:rPr lang="en-US" dirty="0"/>
+              <a:t>And we will only prove this direction</a:t>
+            </a:r>
+          </a:p>
+          <a:p>
+            <a:endParaRPr lang="en-US" dirty="0"/>
+          </a:p>
+          <a:p>
+            <a:r>
+              <a:rPr lang="en-US" dirty="0"/>
+              <a:t>Now the goal is to construct such a </a:t>
             </a:r>
             <a:r>
               <a:rPr lang="en-US" dirty="0" err="1"/>
-              <a:t>wirklich</a:t>
-            </a:r>
-            <a:r>
-              <a:rPr lang="en-US" dirty="0"/>
-              <a:t> relevant und </a:t>
-            </a:r>
-            <a:r>
-              <a:rPr lang="en-US" dirty="0" err="1"/>
-              <a:t>leicht</a:t>
-            </a:r>
-            <a:r>
-              <a:rPr lang="en-US" dirty="0"/>
-              <a:t> </a:t>
-            </a:r>
-            <a:r>
-              <a:rPr lang="en-US" dirty="0" err="1"/>
-              <a:t>genug</a:t>
-            </a:r>
-            <a:r>
-              <a:rPr lang="en-US" dirty="0"/>
-              <a:t> </a:t>
-            </a:r>
-            <a:r>
-              <a:rPr lang="en-US" dirty="0" err="1"/>
-              <a:t>verständlich</a:t>
-            </a:r>
-            <a:r>
-              <a:rPr lang="en-US" dirty="0"/>
-              <a:t>? </a:t>
-            </a:r>
-            <a:r>
-              <a:rPr lang="en-US" dirty="0" err="1"/>
-              <a:t>Evtl</a:t>
-            </a:r>
-            <a:r>
-              <a:rPr lang="en-US" dirty="0"/>
-              <a:t>. </a:t>
-            </a:r>
-            <a:r>
-              <a:rPr lang="en-US" dirty="0" err="1"/>
-              <a:t>besser</a:t>
-            </a:r>
-            <a:r>
-              <a:rPr lang="en-US" dirty="0"/>
-              <a:t> so </a:t>
-            </a:r>
-            <a:r>
-              <a:rPr lang="en-US" dirty="0" err="1"/>
-              <a:t>erklären</a:t>
-            </a:r>
-            <a:r>
-              <a:rPr lang="en-US" dirty="0"/>
-              <a:t> </a:t>
-            </a:r>
-            <a:r>
-              <a:rPr lang="en-US" dirty="0" err="1"/>
-              <a:t>wie</a:t>
-            </a:r>
-            <a:r>
-              <a:rPr lang="en-US" dirty="0"/>
-              <a:t> der </a:t>
-            </a:r>
-            <a:r>
-              <a:rPr lang="en-US" dirty="0" err="1"/>
-              <a:t>letzte</a:t>
-            </a:r>
-            <a:r>
-              <a:rPr lang="en-US" dirty="0"/>
-              <a:t> </a:t>
-            </a:r>
-            <a:r>
-              <a:rPr lang="en-US" dirty="0" err="1"/>
-              <a:t>Absatz</a:t>
-            </a:r>
-            <a:r>
-              <a:rPr lang="en-US" dirty="0"/>
-              <a:t> </a:t>
-            </a:r>
-            <a:r>
-              <a:rPr lang="en-US" dirty="0" err="1"/>
-              <a:t>vor</a:t>
-            </a:r>
-            <a:r>
-              <a:rPr lang="en-US" dirty="0"/>
-              <a:t> </a:t>
-            </a:r>
-            <a:r>
-              <a:rPr lang="en-US" dirty="0" err="1"/>
-              <a:t>Abschnitt</a:t>
-            </a:r>
-            <a:r>
-              <a:rPr lang="en-US" dirty="0"/>
-              <a:t> 1.1?</a:t>
-            </a:r>
+              <a:t>ps</a:t>
+            </a:r>
+            <a:endParaRPr lang="en-US" dirty="0"/>
           </a:p>
         </p:txBody>
       </p:sp>
@@ -2025,7 +2388,7 @@
     </p:spTree>
     <p:extLst>
       <p:ext uri="{BB962C8B-B14F-4D97-AF65-F5344CB8AC3E}">
-        <p14:creationId xmlns:p14="http://schemas.microsoft.com/office/powerpoint/2010/main" val="3558965081"/>
+        <p14:creationId xmlns:p14="http://schemas.microsoft.com/office/powerpoint/2010/main" val="1314377766"/>
       </p:ext>
     </p:extLst>
   </p:cSld>
@@ -2181,7 +2544,7 @@
             </a:r>
             <a:r>
               <a:rPr lang="en-US" dirty="0" err="1"/>
-              <a:t>Bisiumlation</a:t>
+              <a:t>Bisimulation</a:t>
             </a:r>
             <a:r>
               <a:rPr lang="en-US" dirty="0"/>
@@ -6295,56 +6658,64 @@
             </a:pPr>
             <a:r>
               <a:rPr lang="en-US" dirty="0"/>
-              <a:t>Assume a definition</a:t>
-            </a:r>
+              <a:t>Assume we have a function that iterates a step </a:t>
+            </a:r>
+            <a:r>
+              <a:rPr lang="en-US" dirty="0">
+                <a:latin typeface="Lucida Bright" panose="02040602050505020304" pitchFamily="18" charset="0"/>
+              </a:rPr>
+              <a:t>s</a:t>
+            </a:r>
+            <a:r>
+              <a:rPr lang="en-US" dirty="0"/>
+              <a:t> until a test </a:t>
+            </a:r>
+            <a:r>
+              <a:rPr lang="en-US" dirty="0">
+                <a:latin typeface="Lucida Bright" panose="02040602050505020304" pitchFamily="18" charset="0"/>
+              </a:rPr>
+              <a:t>t</a:t>
+            </a:r>
+            <a:r>
+              <a:rPr lang="en-US" dirty="0"/>
+              <a:t> fails:</a:t>
+            </a:r>
+            <a:endParaRPr lang="en-GB" sz="2400" dirty="0"/>
           </a:p>
           <a:p>
             <a:pPr marL="0" indent="0">
               <a:buNone/>
             </a:pPr>
-            <a:r>
-              <a:rPr lang="en-GB" dirty="0"/>
+            <a:br>
+              <a:rPr lang="en-GB" sz="2400" dirty="0"/>
+            </a:br>
+            <a:r>
+              <a:rPr lang="en-GB" sz="2400" dirty="0">
+                <a:latin typeface="Lucida Bright" panose="02040602050505020304" pitchFamily="18" charset="0"/>
+              </a:rPr>
               <a:t>fun </a:t>
             </a:r>
             <a:r>
-              <a:rPr lang="en-GB" dirty="0">
+              <a:rPr lang="en-GB" sz="2400" i="1" dirty="0">
                 <a:latin typeface="Lucida Bright" panose="02040602050505020304" pitchFamily="18" charset="0"/>
               </a:rPr>
               <a:t>while</a:t>
             </a:r>
             <a:r>
-              <a:rPr lang="en-GB" dirty="0"/>
-              <a:t> where </a:t>
-            </a:r>
-            <a:r>
-              <a:rPr lang="en-GB" dirty="0">
+              <a:rPr lang="en-GB" sz="2400" dirty="0">
                 <a:latin typeface="Lucida Bright" panose="02040602050505020304" pitchFamily="18" charset="0"/>
               </a:rPr>
-              <a:t>while </a:t>
-            </a:r>
-            <a:r>
-              <a:rPr lang="en-GB" dirty="0" err="1">
+              <a:t> where</a:t>
+            </a:r>
+            <a:r>
+              <a:rPr lang="en-GB" sz="2400" dirty="0"/>
+              <a:t> </a:t>
+            </a:r>
+            <a:r>
+              <a:rPr lang="en-GB" sz="2400" i="1" dirty="0">
                 <a:latin typeface="Lucida Bright" panose="02040602050505020304" pitchFamily="18" charset="0"/>
               </a:rPr>
-              <a:t>tst</a:t>
-            </a:r>
-            <a:r>
-              <a:rPr lang="en-GB" dirty="0">
-                <a:latin typeface="Lucida Bright" panose="02040602050505020304" pitchFamily="18" charset="0"/>
-              </a:rPr>
-              <a:t> </a:t>
-            </a:r>
-            <a:r>
-              <a:rPr lang="en-GB" dirty="0" err="1">
-                <a:latin typeface="Lucida Bright" panose="02040602050505020304" pitchFamily="18" charset="0"/>
-              </a:rPr>
-              <a:t>stp</a:t>
-            </a:r>
-            <a:r>
-              <a:rPr lang="en-GB" dirty="0">
-                <a:latin typeface="Lucida Bright" panose="02040602050505020304" pitchFamily="18" charset="0"/>
-              </a:rPr>
-              <a:t> state =</a:t>
+              <a:t>while t s state =</a:t>
             </a:r>
           </a:p>
           <a:p>
@@ -6352,67 +6723,11 @@
               <a:buNone/>
             </a:pPr>
             <a:r>
-              <a:rPr lang="en-GB" dirty="0">
+              <a:rPr lang="en-GB" i="1" dirty="0">
                 <a:latin typeface="Lucida Bright" panose="02040602050505020304" pitchFamily="18" charset="0"/>
               </a:rPr>
-              <a:t>	(if </a:t>
-            </a:r>
-            <a:r>
-              <a:rPr lang="en-GB" dirty="0" err="1">
-                <a:latin typeface="Lucida Bright" panose="02040602050505020304" pitchFamily="18" charset="0"/>
-              </a:rPr>
-              <a:t>tst</a:t>
-            </a:r>
-            <a:r>
-              <a:rPr lang="en-GB" dirty="0">
-                <a:latin typeface="Lucida Bright" panose="02040602050505020304" pitchFamily="18" charset="0"/>
-              </a:rPr>
-              <a:t> state then while </a:t>
-            </a:r>
-            <a:r>
-              <a:rPr lang="en-GB" dirty="0" err="1">
-                <a:latin typeface="Lucida Bright" panose="02040602050505020304" pitchFamily="18" charset="0"/>
-              </a:rPr>
-              <a:t>tst</a:t>
-            </a:r>
-            <a:r>
-              <a:rPr lang="en-GB" dirty="0">
-                <a:latin typeface="Lucida Bright" panose="02040602050505020304" pitchFamily="18" charset="0"/>
-              </a:rPr>
-              <a:t> </a:t>
-            </a:r>
-            <a:r>
-              <a:rPr lang="en-GB" dirty="0" err="1">
-                <a:latin typeface="Lucida Bright" panose="02040602050505020304" pitchFamily="18" charset="0"/>
-              </a:rPr>
-              <a:t>stp</a:t>
-            </a:r>
-            <a:r>
-              <a:rPr lang="en-GB" dirty="0">
-                <a:latin typeface="Lucida Bright" panose="02040602050505020304" pitchFamily="18" charset="0"/>
-              </a:rPr>
-              <a:t> (</a:t>
-            </a:r>
-            <a:r>
-              <a:rPr lang="en-GB" dirty="0" err="1">
-                <a:latin typeface="Lucida Bright" panose="02040602050505020304" pitchFamily="18" charset="0"/>
-              </a:rPr>
-              <a:t>stp</a:t>
-            </a:r>
-            <a:r>
-              <a:rPr lang="en-GB" dirty="0">
-                <a:latin typeface="Lucida Bright" panose="02040602050505020304" pitchFamily="18" charset="0"/>
-              </a:rPr>
-              <a:t> state) else state)</a:t>
-            </a:r>
-          </a:p>
-          <a:p>
-            <a:pPr marL="457200" lvl="1" indent="0">
-              <a:buNone/>
-            </a:pPr>
-            <a:endParaRPr lang="en-GB" dirty="0">
-              <a:latin typeface="Lucida Bright" panose="02040602050505020304" pitchFamily="18" charset="0"/>
-            </a:endParaRPr>
+              <a:t>	(if t s then while t s (s state) else state)</a:t>
+            </a:r>
           </a:p>
           <a:p>
             <a:pPr marL="0" indent="0">
@@ -6429,7 +6744,7 @@
               <a:t>In our case, </a:t>
             </a:r>
             <a:r>
-              <a:rPr lang="en-US" dirty="0">
+              <a:rPr lang="en-US" i="1" dirty="0">
                 <a:latin typeface="Lucida Bright" panose="02040602050505020304" pitchFamily="18" charset="0"/>
               </a:rPr>
               <a:t>state</a:t>
@@ -6448,55 +6763,108 @@
               <a:t>	</a:t>
             </a:r>
             <a:r>
-              <a:rPr lang="en-US" dirty="0">
+              <a:rPr lang="en-US" i="1" dirty="0">
                 <a:latin typeface="Lucida Bright" panose="02040602050505020304" pitchFamily="18" charset="0"/>
               </a:rPr>
-              <a:t>('a </a:t>
-            </a:r>
-            <a:r>
-              <a:rPr lang="en-US" dirty="0" err="1">
+              <a:t>(</a:t>
+            </a:r>
+            <a:r>
+              <a:rPr lang="el-GR" sz="3200" i="1" dirty="0">
+                <a:latin typeface="Times New Roman" panose="02020603050405020304" pitchFamily="18" charset="0"/>
+                <a:cs typeface="Times New Roman" panose="02020603050405020304" pitchFamily="18" charset="0"/>
+              </a:rPr>
+              <a:t>α</a:t>
+            </a:r>
+            <a:r>
+              <a:rPr lang="en-US" i="1" dirty="0">
+                <a:latin typeface="Lucida Bright" panose="02040602050505020304" pitchFamily="18" charset="0"/>
+              </a:rPr>
+              <a:t> </a:t>
+            </a:r>
+            <a:r>
+              <a:rPr lang="en-US" i="1" dirty="0" err="1">
                 <a:latin typeface="Lucida Bright" panose="02040602050505020304" pitchFamily="18" charset="0"/>
               </a:rPr>
               <a:t>rexp</a:t>
             </a:r>
             <a:r>
-              <a:rPr lang="en-US" dirty="0">
+              <a:rPr lang="en-US" i="1" dirty="0">
                 <a:latin typeface="Lucida Bright" panose="02040602050505020304" pitchFamily="18" charset="0"/>
               </a:rPr>
-              <a:t> × 'a </a:t>
-            </a:r>
-            <a:r>
-              <a:rPr lang="en-US" dirty="0" err="1">
+              <a:t> × </a:t>
+            </a:r>
+            <a:r>
+              <a:rPr lang="el-GR" sz="3200" i="1" dirty="0">
+                <a:latin typeface="Times New Roman" panose="02020603050405020304" pitchFamily="18" charset="0"/>
+                <a:cs typeface="Times New Roman" panose="02020603050405020304" pitchFamily="18" charset="0"/>
+              </a:rPr>
+              <a:t>α</a:t>
+            </a:r>
+            <a:r>
+              <a:rPr lang="en-US" i="1" dirty="0">
+                <a:latin typeface="Lucida Bright" panose="02040602050505020304" pitchFamily="18" charset="0"/>
+              </a:rPr>
+              <a:t> </a:t>
+            </a:r>
+            <a:r>
+              <a:rPr lang="en-US" i="1" dirty="0" err="1">
                 <a:latin typeface="Lucida Bright" panose="02040602050505020304" pitchFamily="18" charset="0"/>
               </a:rPr>
               <a:t>rexp</a:t>
             </a:r>
             <a:r>
-              <a:rPr lang="en-US" dirty="0">
+              <a:rPr lang="en-US" i="1" dirty="0">
                 <a:latin typeface="Lucida Bright" panose="02040602050505020304" pitchFamily="18" charset="0"/>
               </a:rPr>
-              <a:t>) list × ('a </a:t>
-            </a:r>
-            <a:r>
-              <a:rPr lang="en-US" dirty="0" err="1">
+              <a:t>) list × (</a:t>
+            </a:r>
+            <a:r>
+              <a:rPr lang="el-GR" sz="3200" i="1" dirty="0">
+                <a:latin typeface="Times New Roman" panose="02020603050405020304" pitchFamily="18" charset="0"/>
+                <a:cs typeface="Times New Roman" panose="02020603050405020304" pitchFamily="18" charset="0"/>
+              </a:rPr>
+              <a:t>α</a:t>
+            </a:r>
+            <a:r>
+              <a:rPr lang="de-DE" i="1" dirty="0">
+                <a:latin typeface="Times New Roman" panose="02020603050405020304" pitchFamily="18" charset="0"/>
+                <a:cs typeface="Times New Roman" panose="02020603050405020304" pitchFamily="18" charset="0"/>
+              </a:rPr>
+              <a:t> </a:t>
+            </a:r>
+            <a:r>
+              <a:rPr lang="en-US" i="1" dirty="0" err="1">
                 <a:latin typeface="Lucida Bright" panose="02040602050505020304" pitchFamily="18" charset="0"/>
               </a:rPr>
               <a:t>rexp</a:t>
             </a:r>
             <a:r>
-              <a:rPr lang="en-US" dirty="0">
+              <a:rPr lang="en-US" i="1" dirty="0">
                 <a:latin typeface="Lucida Bright" panose="02040602050505020304" pitchFamily="18" charset="0"/>
               </a:rPr>
-              <a:t> × 'a </a:t>
-            </a:r>
-            <a:r>
-              <a:rPr lang="en-US" dirty="0" err="1">
+              <a:t> × </a:t>
+            </a:r>
+            <a:r>
+              <a:rPr lang="el-GR" sz="3200" i="1" dirty="0">
+                <a:latin typeface="Times New Roman" panose="02020603050405020304" pitchFamily="18" charset="0"/>
+                <a:cs typeface="Times New Roman" panose="02020603050405020304" pitchFamily="18" charset="0"/>
+              </a:rPr>
+              <a:t>α</a:t>
+            </a:r>
+            <a:r>
+              <a:rPr lang="en-US" i="1" dirty="0">
+                <a:latin typeface="Lucida Bright" panose="02040602050505020304" pitchFamily="18" charset="0"/>
+              </a:rPr>
+              <a:t> </a:t>
+            </a:r>
+            <a:r>
+              <a:rPr lang="en-US" i="1" dirty="0" err="1">
                 <a:latin typeface="Lucida Bright" panose="02040602050505020304" pitchFamily="18" charset="0"/>
               </a:rPr>
               <a:t>rexp</a:t>
             </a:r>
             <a:r>
-              <a:rPr lang="en-US" dirty="0">
+              <a:rPr lang="en-US" i="1" dirty="0">
                 <a:latin typeface="Lucida Bright" panose="02040602050505020304" pitchFamily="18" charset="0"/>
               </a:rPr>
               <a:t>) list</a:t>
@@ -6539,7 +6907,7 @@
           <p:cNvPr id="2" name="Titel 1">
             <a:extLst>
               <a:ext uri="{FF2B5EF4-FFF2-40B4-BE49-F238E27FC236}">
-                <a16:creationId xmlns:a16="http://schemas.microsoft.com/office/drawing/2014/main" id="{ACA67C1E-2545-499C-967A-F415723CDE4C}"/>
+                <a16:creationId xmlns:a16="http://schemas.microsoft.com/office/drawing/2014/main" id="{6308764C-5A53-4A40-86AB-AFF027DC3399}"/>
               </a:ext>
             </a:extLst>
           </p:cNvPr>
@@ -6557,359 +6925,285 @@
           <a:p>
             <a:r>
               <a:rPr lang="en-US" dirty="0"/>
-              <a:t>Step and Test</a:t>
-            </a:r>
-          </a:p>
-        </p:txBody>
-      </p:sp>
-      <p:sp>
-        <p:nvSpPr>
-          <p:cNvPr id="3" name="Inhaltsplatzhalter 2">
-            <a:extLst>
-              <a:ext uri="{FF2B5EF4-FFF2-40B4-BE49-F238E27FC236}">
-                <a16:creationId xmlns:a16="http://schemas.microsoft.com/office/drawing/2014/main" id="{5347057A-69F6-409A-ACFA-8AB16AFEBA07}"/>
-              </a:ext>
-            </a:extLst>
-          </p:cNvPr>
-          <p:cNvSpPr>
-            <a:spLocks noGrp="1"/>
-          </p:cNvSpPr>
-          <p:nvPr>
-            <p:ph idx="1"/>
-          </p:nvPr>
-        </p:nvSpPr>
-        <p:spPr/>
-        <p:txBody>
-          <a:bodyPr>
-            <a:normAutofit fontScale="92500"/>
-          </a:bodyPr>
-          <a:lstStyle/>
-          <a:p>
-            <a:pPr marL="0" indent="0">
-              <a:buNone/>
-            </a:pPr>
-            <a:r>
-              <a:rPr lang="en-GB" dirty="0"/>
-              <a:t>fun </a:t>
-            </a:r>
-            <a:r>
-              <a:rPr lang="en-GB" dirty="0" err="1">
-                <a:latin typeface="Lucida Bright" panose="02040602050505020304" pitchFamily="18" charset="0"/>
-              </a:rPr>
-              <a:t>stp</a:t>
-            </a:r>
-            <a:r>
-              <a:rPr lang="en-GB" dirty="0"/>
-              <a:t> where </a:t>
-            </a:r>
-            <a:r>
-              <a:rPr lang="en-GB" dirty="0" err="1">
-                <a:latin typeface="Lucida Bright" panose="02040602050505020304" pitchFamily="18" charset="0"/>
-              </a:rPr>
-              <a:t>stp</a:t>
-            </a:r>
-            <a:r>
-              <a:rPr lang="en-GB" dirty="0">
-                <a:latin typeface="Lucida Bright" panose="02040602050505020304" pitchFamily="18" charset="0"/>
-              </a:rPr>
-              <a:t> as (</a:t>
-            </a:r>
-            <a:r>
-              <a:rPr lang="en-GB" dirty="0" err="1">
-                <a:latin typeface="Lucida Bright" panose="02040602050505020304" pitchFamily="18" charset="0"/>
-              </a:rPr>
-              <a:t>ws</a:t>
-            </a:r>
-            <a:r>
-              <a:rPr lang="en-GB" dirty="0">
-                <a:latin typeface="Lucida Bright" panose="02040602050505020304" pitchFamily="18" charset="0"/>
-              </a:rPr>
-              <a:t>, </a:t>
-            </a:r>
-            <a:r>
-              <a:rPr lang="en-GB" dirty="0" err="1">
-                <a:latin typeface="Lucida Bright" panose="02040602050505020304" pitchFamily="18" charset="0"/>
-              </a:rPr>
-              <a:t>ps</a:t>
-            </a:r>
-            <a:r>
-              <a:rPr lang="en-GB" dirty="0">
-                <a:latin typeface="Lucida Bright" panose="02040602050505020304" pitchFamily="18" charset="0"/>
-              </a:rPr>
-              <a:t>) =</a:t>
-            </a:r>
-          </a:p>
-          <a:p>
-            <a:pPr marL="0" indent="0">
-              <a:buNone/>
-            </a:pPr>
-            <a:r>
-              <a:rPr lang="en-GB" dirty="0">
-                <a:latin typeface="Lucida Bright" panose="02040602050505020304" pitchFamily="18" charset="0"/>
-              </a:rPr>
-              <a:t>  (let </a:t>
-            </a:r>
-            <a:r>
-              <a:rPr lang="en-GB" dirty="0" err="1">
-                <a:latin typeface="Lucida Bright" panose="02040602050505020304" pitchFamily="18" charset="0"/>
-              </a:rPr>
-              <a:t>ps'</a:t>
-            </a:r>
-            <a:r>
-              <a:rPr lang="en-GB" dirty="0">
-                <a:latin typeface="Lucida Bright" panose="02040602050505020304" pitchFamily="18" charset="0"/>
-              </a:rPr>
-              <a:t> = </a:t>
-            </a:r>
-            <a:r>
-              <a:rPr lang="en-GB" dirty="0" err="1">
-                <a:latin typeface="Lucida Bright" panose="02040602050505020304" pitchFamily="18" charset="0"/>
-              </a:rPr>
-              <a:t>hd</a:t>
-            </a:r>
-            <a:r>
-              <a:rPr lang="en-GB" dirty="0">
-                <a:latin typeface="Lucida Bright" panose="02040602050505020304" pitchFamily="18" charset="0"/>
-              </a:rPr>
-              <a:t> </a:t>
-            </a:r>
-            <a:r>
-              <a:rPr lang="en-GB" dirty="0" err="1">
-                <a:latin typeface="Lucida Bright" panose="02040602050505020304" pitchFamily="18" charset="0"/>
-              </a:rPr>
-              <a:t>ws</a:t>
-            </a:r>
-            <a:r>
-              <a:rPr lang="en-GB" dirty="0">
-                <a:latin typeface="Lucida Bright" panose="02040602050505020304" pitchFamily="18" charset="0"/>
-              </a:rPr>
-              <a:t> # </a:t>
-            </a:r>
-            <a:r>
-              <a:rPr lang="en-GB" dirty="0" err="1">
-                <a:latin typeface="Lucida Bright" panose="02040602050505020304" pitchFamily="18" charset="0"/>
-              </a:rPr>
-              <a:t>ps</a:t>
-            </a:r>
-            <a:r>
-              <a:rPr lang="en-GB" dirty="0">
-                <a:latin typeface="Lucida Bright" panose="02040602050505020304" pitchFamily="18" charset="0"/>
-              </a:rPr>
-              <a:t>;</a:t>
-            </a:r>
-          </a:p>
-          <a:p>
-            <a:pPr marL="0" indent="0">
-              <a:buNone/>
-            </a:pPr>
-            <a:r>
-              <a:rPr lang="en-GB" dirty="0">
-                <a:latin typeface="Lucida Bright" panose="02040602050505020304" pitchFamily="18" charset="0"/>
-              </a:rPr>
-              <a:t>    new = [</a:t>
-            </a:r>
-            <a:r>
-              <a:rPr lang="en-GB" dirty="0" err="1">
-                <a:latin typeface="Lucida Bright" panose="02040602050505020304" pitchFamily="18" charset="0"/>
-              </a:rPr>
-              <a:t>p←succs</a:t>
-            </a:r>
-            <a:r>
-              <a:rPr lang="en-GB" dirty="0">
-                <a:latin typeface="Lucida Bright" panose="02040602050505020304" pitchFamily="18" charset="0"/>
-              </a:rPr>
-              <a:t> as (</a:t>
-            </a:r>
-            <a:r>
-              <a:rPr lang="en-GB" dirty="0" err="1">
-                <a:latin typeface="Lucida Bright" panose="02040602050505020304" pitchFamily="18" charset="0"/>
-              </a:rPr>
-              <a:t>hd</a:t>
-            </a:r>
-            <a:r>
-              <a:rPr lang="en-GB" dirty="0">
-                <a:latin typeface="Lucida Bright" panose="02040602050505020304" pitchFamily="18" charset="0"/>
-              </a:rPr>
-              <a:t> </a:t>
-            </a:r>
-            <a:r>
-              <a:rPr lang="en-GB" dirty="0" err="1">
-                <a:latin typeface="Lucida Bright" panose="02040602050505020304" pitchFamily="18" charset="0"/>
-              </a:rPr>
-              <a:t>ws</a:t>
-            </a:r>
-            <a:r>
-              <a:rPr lang="en-GB" dirty="0">
-                <a:latin typeface="Lucida Bright" panose="02040602050505020304" pitchFamily="18" charset="0"/>
-              </a:rPr>
-              <a:t>) . p ∉ set </a:t>
-            </a:r>
-            <a:r>
-              <a:rPr lang="en-GB" dirty="0" err="1">
-                <a:latin typeface="Lucida Bright" panose="02040602050505020304" pitchFamily="18" charset="0"/>
-              </a:rPr>
-              <a:t>ps'</a:t>
-            </a:r>
-            <a:r>
-              <a:rPr lang="en-GB" dirty="0">
-                <a:latin typeface="Lucida Bright" panose="02040602050505020304" pitchFamily="18" charset="0"/>
-              </a:rPr>
-              <a:t> ∪ set </a:t>
-            </a:r>
-            <a:r>
-              <a:rPr lang="en-GB" dirty="0" err="1">
-                <a:latin typeface="Lucida Bright" panose="02040602050505020304" pitchFamily="18" charset="0"/>
-              </a:rPr>
-              <a:t>ws</a:t>
-            </a:r>
-            <a:r>
-              <a:rPr lang="en-GB" dirty="0">
-                <a:latin typeface="Lucida Bright" panose="02040602050505020304" pitchFamily="18" charset="0"/>
-              </a:rPr>
-              <a:t>]</a:t>
-            </a:r>
-          </a:p>
-          <a:p>
-            <a:pPr marL="0" indent="0">
-              <a:buNone/>
-            </a:pPr>
-            <a:r>
-              <a:rPr lang="en-GB" dirty="0">
-                <a:latin typeface="Lucida Bright" panose="02040602050505020304" pitchFamily="18" charset="0"/>
-              </a:rPr>
-              <a:t>  in (new @ </a:t>
-            </a:r>
-            <a:r>
-              <a:rPr lang="en-GB" dirty="0" err="1">
-                <a:latin typeface="Lucida Bright" panose="02040602050505020304" pitchFamily="18" charset="0"/>
-              </a:rPr>
-              <a:t>tl</a:t>
-            </a:r>
-            <a:r>
-              <a:rPr lang="en-GB" dirty="0">
-                <a:latin typeface="Lucida Bright" panose="02040602050505020304" pitchFamily="18" charset="0"/>
-              </a:rPr>
-              <a:t> </a:t>
-            </a:r>
-            <a:r>
-              <a:rPr lang="en-GB" dirty="0" err="1">
-                <a:latin typeface="Lucida Bright" panose="02040602050505020304" pitchFamily="18" charset="0"/>
-              </a:rPr>
-              <a:t>ws</a:t>
-            </a:r>
-            <a:r>
-              <a:rPr lang="en-GB" dirty="0">
-                <a:latin typeface="Lucida Bright" panose="02040602050505020304" pitchFamily="18" charset="0"/>
-              </a:rPr>
-              <a:t>, </a:t>
-            </a:r>
-            <a:r>
-              <a:rPr lang="en-GB" dirty="0" err="1">
-                <a:latin typeface="Lucida Bright" panose="02040602050505020304" pitchFamily="18" charset="0"/>
-              </a:rPr>
-              <a:t>ps'</a:t>
-            </a:r>
-            <a:r>
-              <a:rPr lang="en-GB" dirty="0">
-                <a:latin typeface="Lucida Bright" panose="02040602050505020304" pitchFamily="18" charset="0"/>
-              </a:rPr>
-              <a:t>))</a:t>
-            </a:r>
-            <a:endParaRPr lang="en-GB" dirty="0"/>
-          </a:p>
-          <a:p>
-            <a:pPr marL="0" indent="0">
-              <a:buNone/>
-            </a:pPr>
-            <a:endParaRPr lang="en-US" dirty="0"/>
-          </a:p>
-          <a:p>
-            <a:pPr marL="0" indent="0">
-              <a:buNone/>
-            </a:pPr>
-            <a:r>
-              <a:rPr lang="en-US" dirty="0"/>
-              <a:t>…where </a:t>
-            </a:r>
-            <a:r>
-              <a:rPr lang="pt-BR" dirty="0">
-                <a:latin typeface="Lucida Bright" panose="02040602050505020304" pitchFamily="18" charset="0"/>
-              </a:rPr>
-              <a:t>succs as (r, s) = map (λa. (nderiv a r, nderiv a s)) as</a:t>
-            </a:r>
-          </a:p>
-          <a:p>
-            <a:pPr marL="0" indent="0">
-              <a:buNone/>
-            </a:pPr>
-            <a:endParaRPr lang="pt-BR" dirty="0">
-              <a:latin typeface="+mj-lt"/>
-            </a:endParaRPr>
-          </a:p>
-          <a:p>
-            <a:pPr marL="0" indent="0">
-              <a:buNone/>
-            </a:pPr>
-            <a:r>
-              <a:rPr lang="en-US" dirty="0">
-                <a:latin typeface="Lucida Bright" panose="02040602050505020304" pitchFamily="18" charset="0"/>
-              </a:rPr>
-              <a:t>test (</a:t>
-            </a:r>
-            <a:r>
-              <a:rPr lang="en-US" dirty="0" err="1">
-                <a:latin typeface="Lucida Bright" panose="02040602050505020304" pitchFamily="18" charset="0"/>
-              </a:rPr>
-              <a:t>ws</a:t>
-            </a:r>
-            <a:r>
-              <a:rPr lang="en-US" dirty="0">
-                <a:latin typeface="Lucida Bright" panose="02040602050505020304" pitchFamily="18" charset="0"/>
-              </a:rPr>
-              <a:t>,_) ⟷</a:t>
-            </a:r>
-          </a:p>
-          <a:p>
-            <a:pPr marL="0" indent="0">
-              <a:buNone/>
-            </a:pPr>
-            <a:r>
-              <a:rPr lang="en-US" dirty="0">
-                <a:latin typeface="Lucida Bright" panose="02040602050505020304" pitchFamily="18" charset="0"/>
-              </a:rPr>
-              <a:t>	(case </a:t>
-            </a:r>
-            <a:r>
-              <a:rPr lang="en-US" dirty="0" err="1">
-                <a:latin typeface="Lucida Bright" panose="02040602050505020304" pitchFamily="18" charset="0"/>
-              </a:rPr>
-              <a:t>ws</a:t>
-            </a:r>
-            <a:r>
-              <a:rPr lang="en-US" dirty="0">
-                <a:latin typeface="Lucida Bright" panose="02040602050505020304" pitchFamily="18" charset="0"/>
-              </a:rPr>
-              <a:t> of [] ⇒ False | (p, q)#vs ⇒ nullable p ⟷ nullable q)</a:t>
-            </a:r>
-          </a:p>
-          <a:p>
-            <a:pPr marL="0" indent="0">
-              <a:buNone/>
-            </a:pPr>
-            <a:endParaRPr lang="en-US" dirty="0"/>
-          </a:p>
-          <a:p>
-            <a:pPr marL="0" indent="0">
-              <a:buNone/>
-            </a:pPr>
-            <a:endParaRPr lang="en-US" dirty="0"/>
-          </a:p>
-        </p:txBody>
-      </p:sp>
+              <a:t>step</a:t>
+            </a:r>
+          </a:p>
+        </p:txBody>
+      </p:sp>
+      <mc:AlternateContent xmlns:mc="http://schemas.openxmlformats.org/markup-compatibility/2006">
+        <mc:Choice xmlns:a14="http://schemas.microsoft.com/office/drawing/2010/main" Requires="a14">
+          <p:sp>
+            <p:nvSpPr>
+              <p:cNvPr id="3" name="Inhaltsplatzhalter 2">
+                <a:extLst>
+                  <a:ext uri="{FF2B5EF4-FFF2-40B4-BE49-F238E27FC236}">
+                    <a16:creationId xmlns:a16="http://schemas.microsoft.com/office/drawing/2014/main" id="{95585F86-E91B-4947-B7FD-2870701F8929}"/>
+                  </a:ext>
+                </a:extLst>
+              </p:cNvPr>
+              <p:cNvSpPr>
+                <a:spLocks noGrp="1"/>
+              </p:cNvSpPr>
+              <p:nvPr>
+                <p:ph idx="1"/>
+              </p:nvPr>
+            </p:nvSpPr>
+            <p:spPr/>
+            <p:txBody>
+              <a:bodyPr/>
+              <a:lstStyle/>
+              <a:p>
+                <a:r>
+                  <a:rPr lang="en-US" dirty="0"/>
+                  <a:t>A pair</a:t>
+                </a:r>
+                <a:r>
+                  <a:rPr lang="de-DE" i="1" dirty="0">
+                    <a:latin typeface="Cambria Math" panose="02040503050406030204" pitchFamily="18" charset="0"/>
+                    <a:ea typeface="Cambria Math" panose="02040503050406030204" pitchFamily="18" charset="0"/>
+                  </a:rPr>
+                  <a:t>(r, s) </a:t>
+                </a:r>
+                <a:r>
+                  <a:rPr lang="en-US" dirty="0"/>
+                  <a:t>from the work set is processed</a:t>
+                </a:r>
+              </a:p>
+              <a:p>
+                <a:r>
+                  <a:rPr lang="en-US" dirty="0"/>
+                  <a:t>All pairs that are missing for the </a:t>
+                </a:r>
+                <a:r>
+                  <a:rPr lang="en-US" dirty="0" err="1"/>
+                  <a:t>bisimulation</a:t>
+                </a:r>
+                <a:r>
+                  <a:rPr lang="en-US" dirty="0"/>
+                  <a:t> property</a:t>
+                </a:r>
+              </a:p>
+              <a:p>
+                <a:pPr marL="0" indent="0">
+                  <a:buNone/>
+                </a:pPr>
+                <a:r>
+                  <a:rPr lang="pt-BR" dirty="0"/>
+                  <a:t>		∀a∈set as. </a:t>
+                </a:r>
+                <a:r>
+                  <a:rPr lang="de-DE" i="1" dirty="0">
+                    <a:latin typeface="Cambria Math" panose="02040503050406030204" pitchFamily="18" charset="0"/>
+                    <a:ea typeface="Cambria Math" panose="02040503050406030204" pitchFamily="18" charset="0"/>
+                  </a:rPr>
+                  <a:t>(</a:t>
+                </a:r>
+                <a14:m>
+                  <m:oMath xmlns:m="http://schemas.openxmlformats.org/officeDocument/2006/math">
+                    <m:sSub>
+                      <m:sSubPr>
+                        <m:ctrlPr>
+                          <a:rPr lang="en-US" i="1">
+                            <a:latin typeface="Cambria Math" panose="02040503050406030204" pitchFamily="18" charset="0"/>
+                            <a:ea typeface="Cambria Math" panose="02040503050406030204" pitchFamily="18" charset="0"/>
+                          </a:rPr>
+                        </m:ctrlPr>
+                      </m:sSubPr>
+                      <m:e>
+                        <m:r>
+                          <a:rPr lang="de-DE" i="1">
+                            <a:latin typeface="Cambria Math" panose="02040503050406030204" pitchFamily="18" charset="0"/>
+                            <a:ea typeface="Cambria Math" panose="02040503050406030204" pitchFamily="18" charset="0"/>
+                          </a:rPr>
+                          <m:t>𝑑</m:t>
+                        </m:r>
+                      </m:e>
+                      <m:sub>
+                        <m:r>
+                          <a:rPr lang="de-DE" i="1">
+                            <a:latin typeface="Cambria Math" panose="02040503050406030204" pitchFamily="18" charset="0"/>
+                            <a:ea typeface="Cambria Math" panose="02040503050406030204" pitchFamily="18" charset="0"/>
+                          </a:rPr>
+                          <m:t>𝑎</m:t>
+                        </m:r>
+                      </m:sub>
+                    </m:sSub>
+                  </m:oMath>
+                </a14:m>
+                <a:r>
+                  <a:rPr lang="en-US" i="1" dirty="0">
+                    <a:latin typeface="Cambria Math" panose="02040503050406030204" pitchFamily="18" charset="0"/>
+                    <a:ea typeface="Cambria Math" panose="02040503050406030204" pitchFamily="18" charset="0"/>
+                  </a:rPr>
+                  <a:t> (r</a:t>
+                </a:r>
+                <a:r>
+                  <a:rPr lang="de-DE" i="1" dirty="0">
+                    <a:latin typeface="Cambria Math" panose="02040503050406030204" pitchFamily="18" charset="0"/>
+                    <a:ea typeface="Cambria Math" panose="02040503050406030204" pitchFamily="18" charset="0"/>
+                  </a:rPr>
+                  <a:t>)</a:t>
+                </a:r>
+                <a:r>
+                  <a:rPr lang="en-US" i="1" dirty="0">
+                    <a:latin typeface="Cambria Math" panose="02040503050406030204" pitchFamily="18" charset="0"/>
+                    <a:ea typeface="Cambria Math" panose="02040503050406030204" pitchFamily="18" charset="0"/>
+                  </a:rPr>
+                  <a:t> </a:t>
+                </a:r>
+                <a:r>
+                  <a:rPr lang="pt-BR" dirty="0"/>
+                  <a:t>, </a:t>
+                </a:r>
+                <a14:m>
+                  <m:oMath xmlns:m="http://schemas.openxmlformats.org/officeDocument/2006/math">
+                    <m:sSub>
+                      <m:sSubPr>
+                        <m:ctrlPr>
+                          <a:rPr lang="en-US" i="1">
+                            <a:latin typeface="Cambria Math" panose="02040503050406030204" pitchFamily="18" charset="0"/>
+                            <a:ea typeface="Cambria Math" panose="02040503050406030204" pitchFamily="18" charset="0"/>
+                          </a:rPr>
+                        </m:ctrlPr>
+                      </m:sSubPr>
+                      <m:e>
+                        <m:r>
+                          <a:rPr lang="de-DE" i="1">
+                            <a:latin typeface="Cambria Math" panose="02040503050406030204" pitchFamily="18" charset="0"/>
+                            <a:ea typeface="Cambria Math" panose="02040503050406030204" pitchFamily="18" charset="0"/>
+                          </a:rPr>
+                          <m:t>𝑑</m:t>
+                        </m:r>
+                      </m:e>
+                      <m:sub>
+                        <m:r>
+                          <a:rPr lang="de-DE" i="1">
+                            <a:latin typeface="Cambria Math" panose="02040503050406030204" pitchFamily="18" charset="0"/>
+                            <a:ea typeface="Cambria Math" panose="02040503050406030204" pitchFamily="18" charset="0"/>
+                          </a:rPr>
+                          <m:t>𝑎</m:t>
+                        </m:r>
+                      </m:sub>
+                    </m:sSub>
+                  </m:oMath>
+                </a14:m>
+                <a:r>
+                  <a:rPr lang="en-US" i="1" dirty="0">
+                    <a:latin typeface="Cambria Math" panose="02040503050406030204" pitchFamily="18" charset="0"/>
+                    <a:ea typeface="Cambria Math" panose="02040503050406030204" pitchFamily="18" charset="0"/>
+                  </a:rPr>
+                  <a:t> (</a:t>
+                </a:r>
+                <a:r>
+                  <a:rPr lang="de-DE" i="1" dirty="0">
+                    <a:latin typeface="Cambria Math" panose="02040503050406030204" pitchFamily="18" charset="0"/>
+                    <a:ea typeface="Cambria Math" panose="02040503050406030204" pitchFamily="18" charset="0"/>
+                  </a:rPr>
+                  <a:t>s))</a:t>
+                </a:r>
+                <a:r>
+                  <a:rPr lang="pt-BR" dirty="0"/>
+                  <a:t> ∈ R</a:t>
+                </a:r>
+                <a:r>
+                  <a:rPr lang="de-DE" i="1" dirty="0">
+                    <a:latin typeface="Cambria Math" panose="02040503050406030204" pitchFamily="18" charset="0"/>
+                    <a:ea typeface="Cambria Math" panose="02040503050406030204" pitchFamily="18" charset="0"/>
+                  </a:rPr>
+                  <a:t>)</a:t>
+                </a:r>
+                <a:endParaRPr lang="pt-BR" dirty="0"/>
+              </a:p>
+              <a:p>
+                <a:pPr marL="0" indent="0">
+                  <a:buNone/>
+                </a:pPr>
+                <a:r>
+                  <a:rPr lang="pt-BR" dirty="0"/>
+                  <a:t>	are added to the work set.</a:t>
+                </a:r>
+              </a:p>
+              <a:p>
+                <a:pPr marL="0" indent="0">
+                  <a:buNone/>
+                </a:pPr>
+                <a:endParaRPr lang="pt-BR" dirty="0"/>
+              </a:p>
+              <a:p>
+                <a:pPr marL="0" indent="0">
+                  <a:buNone/>
+                </a:pPr>
+                <a:r>
+                  <a:rPr lang="pt-BR" i="1" dirty="0">
+                    <a:latin typeface="Cambria Math" panose="02040503050406030204" pitchFamily="18" charset="0"/>
+                    <a:ea typeface="Cambria Math" panose="02040503050406030204" pitchFamily="18" charset="0"/>
+                  </a:rPr>
+                  <a:t>a</a:t>
+                </a:r>
+                <a:r>
+                  <a:rPr lang="de-DE" i="1" dirty="0">
+                    <a:latin typeface="Cambria Math" panose="02040503050406030204" pitchFamily="18" charset="0"/>
+                    <a:ea typeface="Cambria Math" panose="02040503050406030204" pitchFamily="18" charset="0"/>
+                  </a:rPr>
+                  <a:t>s </a:t>
+                </a:r>
+                <a:r>
+                  <a:rPr lang="pt-BR" dirty="0"/>
+                  <a:t>will be the set of atoms in the original expressions (this does not change during </a:t>
+                </a:r>
+                <a:r>
+                  <a:rPr lang="pt-BR"/>
+                  <a:t>execution).</a:t>
+                </a:r>
+                <a:endParaRPr lang="en-US" dirty="0"/>
+              </a:p>
+            </p:txBody>
+          </p:sp>
+        </mc:Choice>
+        <mc:Fallback>
+          <p:sp>
+            <p:nvSpPr>
+              <p:cNvPr id="3" name="Inhaltsplatzhalter 2">
+                <a:extLst>
+                  <a:ext uri="{FF2B5EF4-FFF2-40B4-BE49-F238E27FC236}">
+                    <a16:creationId xmlns:a16="http://schemas.microsoft.com/office/drawing/2014/main" id="{95585F86-E91B-4947-B7FD-2870701F8929}"/>
+                  </a:ext>
+                </a:extLst>
+              </p:cNvPr>
+              <p:cNvSpPr>
+                <a:spLocks noGrp="1" noRot="1" noChangeAspect="1" noMove="1" noResize="1" noEditPoints="1" noAdjustHandles="1" noChangeArrowheads="1" noChangeShapeType="1" noTextEdit="1"/>
+              </p:cNvSpPr>
+              <p:nvPr>
+                <p:ph idx="1"/>
+              </p:nvPr>
+            </p:nvSpPr>
+            <p:spPr>
+              <a:blipFill>
+                <a:blip r:embed="rId3"/>
+                <a:stretch>
+                  <a:fillRect l="-1217" t="-2661"/>
+                </a:stretch>
+              </a:blipFill>
+            </p:spPr>
+            <p:txBody>
+              <a:bodyPr/>
+              <a:lstStyle/>
+              <a:p>
+                <a:r>
+                  <a:rPr lang="en-US">
+                    <a:noFill/>
+                  </a:rPr>
+                  <a:t> </a:t>
+                </a:r>
+              </a:p>
+            </p:txBody>
+          </p:sp>
+        </mc:Fallback>
+      </mc:AlternateContent>
     </p:spTree>
     <p:extLst>
       <p:ext uri="{BB962C8B-B14F-4D97-AF65-F5344CB8AC3E}">
-        <p14:creationId xmlns:p14="http://schemas.microsoft.com/office/powerpoint/2010/main" val="1518317521"/>
+        <p14:creationId xmlns:p14="http://schemas.microsoft.com/office/powerpoint/2010/main" val="398589950"/>
       </p:ext>
     </p:extLst>
   </p:cSld>
@@ -6941,7 +7235,7 @@
           <p:cNvPr id="2" name="Titel 1">
             <a:extLst>
               <a:ext uri="{FF2B5EF4-FFF2-40B4-BE49-F238E27FC236}">
-                <a16:creationId xmlns:a16="http://schemas.microsoft.com/office/drawing/2014/main" id="{D5D50EB3-B325-43FD-A071-2E053FCA58D5}"/>
+                <a16:creationId xmlns:a16="http://schemas.microsoft.com/office/drawing/2014/main" id="{ACA67C1E-2545-499C-967A-F415723CDE4C}"/>
               </a:ext>
             </a:extLst>
           </p:cNvPr>
@@ -6959,85 +7253,497 @@
           <a:p>
             <a:r>
               <a:rPr lang="en-US" dirty="0"/>
-              <a:t>Example</a:t>
-            </a:r>
-          </a:p>
-        </p:txBody>
-      </p:sp>
-      <p:sp>
-        <p:nvSpPr>
-          <p:cNvPr id="3" name="Inhaltsplatzhalter 2">
-            <a:extLst>
-              <a:ext uri="{FF2B5EF4-FFF2-40B4-BE49-F238E27FC236}">
-                <a16:creationId xmlns:a16="http://schemas.microsoft.com/office/drawing/2014/main" id="{13A3184E-D790-4B2E-BAE6-6BA74D9824B9}"/>
-              </a:ext>
-            </a:extLst>
-          </p:cNvPr>
-          <p:cNvSpPr>
-            <a:spLocks noGrp="1"/>
-          </p:cNvSpPr>
-          <p:nvPr>
-            <p:ph idx="1"/>
-          </p:nvPr>
-        </p:nvSpPr>
-        <p:spPr/>
-        <p:txBody>
-          <a:bodyPr/>
-          <a:lstStyle/>
-          <a:p>
-            <a:pPr marL="0" indent="0">
-              <a:buNone/>
-            </a:pPr>
-            <a:r>
-              <a:rPr lang="en-US" dirty="0"/>
-              <a:t>&lt;on the board&gt;</a:t>
-            </a:r>
-          </a:p>
-          <a:p>
-            <a:pPr marL="0" indent="0">
-              <a:buNone/>
-            </a:pPr>
-            <a:endParaRPr lang="en-US" dirty="0"/>
-          </a:p>
-          <a:p>
-            <a:pPr marL="0" indent="0">
-              <a:buNone/>
-            </a:pPr>
-            <a:r>
-              <a:rPr lang="en-US" dirty="0"/>
-              <a:t>result</a:t>
-            </a:r>
-          </a:p>
-          <a:p>
-            <a:pPr marL="0" indent="0">
-              <a:buNone/>
-            </a:pPr>
-            <a:endParaRPr lang="en-US" dirty="0"/>
-          </a:p>
-          <a:p>
-            <a:pPr marL="0" indent="0">
-              <a:buNone/>
-            </a:pPr>
-            <a:r>
-              <a:rPr lang="en-US" dirty="0"/>
-              <a:t>	</a:t>
-            </a:r>
-            <a:r>
-              <a:rPr lang="pt-BR" dirty="0">
-                <a:latin typeface="Lucida Bright" panose="02040602050505020304" pitchFamily="18" charset="0"/>
-              </a:rPr>
-              <a:t>L ((ε + a ⋅ b)* ⋅ (a + b)) = L ((a ⋅ b + ε)* ⋅ (a + b))</a:t>
-            </a:r>
-            <a:endParaRPr lang="en-US" dirty="0">
-              <a:latin typeface="Lucida Bright" panose="02040602050505020304" pitchFamily="18" charset="0"/>
-            </a:endParaRPr>
-          </a:p>
-        </p:txBody>
-      </p:sp>
+              <a:t>step</a:t>
+            </a:r>
+          </a:p>
+        </p:txBody>
+      </p:sp>
+      <mc:AlternateContent xmlns:mc="http://schemas.openxmlformats.org/markup-compatibility/2006">
+        <mc:Choice xmlns:a14="http://schemas.microsoft.com/office/drawing/2010/main" Requires="a14">
+          <p:sp>
+            <p:nvSpPr>
+              <p:cNvPr id="3" name="Inhaltsplatzhalter 2">
+                <a:extLst>
+                  <a:ext uri="{FF2B5EF4-FFF2-40B4-BE49-F238E27FC236}">
+                    <a16:creationId xmlns:a16="http://schemas.microsoft.com/office/drawing/2014/main" id="{5347057A-69F6-409A-ACFA-8AB16AFEBA07}"/>
+                  </a:ext>
+                </a:extLst>
+              </p:cNvPr>
+              <p:cNvSpPr>
+                <a:spLocks noGrp="1"/>
+              </p:cNvSpPr>
+              <p:nvPr>
+                <p:ph idx="1"/>
+              </p:nvPr>
+            </p:nvSpPr>
+            <p:spPr/>
+            <p:txBody>
+              <a:bodyPr>
+                <a:normAutofit fontScale="92500" lnSpcReduction="20000"/>
+              </a:bodyPr>
+              <a:lstStyle/>
+              <a:p>
+                <a:pPr marL="0" indent="0">
+                  <a:buNone/>
+                </a:pPr>
+                <a:r>
+                  <a:rPr lang="en-GB" dirty="0">
+                    <a:latin typeface="Lucida Bright" panose="02040602050505020304" pitchFamily="18" charset="0"/>
+                  </a:rPr>
+                  <a:t>fun step where</a:t>
+                </a:r>
+                <a:r>
+                  <a:rPr lang="en-GB" dirty="0"/>
+                  <a:t> </a:t>
+                </a:r>
+                <a:r>
+                  <a:rPr lang="en-GB" dirty="0">
+                    <a:latin typeface="Lucida Bright" panose="02040602050505020304" pitchFamily="18" charset="0"/>
+                  </a:rPr>
+                  <a:t>step as (</a:t>
+                </a:r>
+                <a:r>
+                  <a:rPr lang="en-GB" dirty="0" err="1">
+                    <a:latin typeface="Lucida Bright" panose="02040602050505020304" pitchFamily="18" charset="0"/>
+                  </a:rPr>
+                  <a:t>ws</a:t>
+                </a:r>
+                <a:r>
+                  <a:rPr lang="en-GB" dirty="0">
+                    <a:latin typeface="Lucida Bright" panose="02040602050505020304" pitchFamily="18" charset="0"/>
+                  </a:rPr>
+                  <a:t>, </a:t>
+                </a:r>
+                <a:r>
+                  <a:rPr lang="en-GB" dirty="0" err="1">
+                    <a:latin typeface="Lucida Bright" panose="02040602050505020304" pitchFamily="18" charset="0"/>
+                  </a:rPr>
+                  <a:t>ps</a:t>
+                </a:r>
+                <a:r>
+                  <a:rPr lang="en-GB" dirty="0">
+                    <a:latin typeface="Lucida Bright" panose="02040602050505020304" pitchFamily="18" charset="0"/>
+                  </a:rPr>
+                  <a:t>) =</a:t>
+                </a:r>
+              </a:p>
+              <a:p>
+                <a:pPr marL="0" indent="0">
+                  <a:buNone/>
+                </a:pPr>
+                <a:r>
+                  <a:rPr lang="en-GB" dirty="0">
+                    <a:latin typeface="Lucida Bright" panose="02040602050505020304" pitchFamily="18" charset="0"/>
+                  </a:rPr>
+                  <a:t>  (let</a:t>
+                </a:r>
+              </a:p>
+              <a:p>
+                <a:pPr marL="0" indent="0">
+                  <a:buNone/>
+                </a:pPr>
+                <a:r>
+                  <a:rPr lang="en-GB" dirty="0">
+                    <a:latin typeface="Lucida Bright" panose="02040602050505020304" pitchFamily="18" charset="0"/>
+                  </a:rPr>
+                  <a:t>    </a:t>
+                </a:r>
+                <a:r>
+                  <a:rPr lang="en-GB" dirty="0" err="1">
+                    <a:latin typeface="Lucida Bright" panose="02040602050505020304" pitchFamily="18" charset="0"/>
+                  </a:rPr>
+                  <a:t>new_p</a:t>
+                </a:r>
+                <a:r>
+                  <a:rPr lang="en-GB" dirty="0">
+                    <a:latin typeface="Lucida Bright" panose="02040602050505020304" pitchFamily="18" charset="0"/>
+                  </a:rPr>
+                  <a:t> = </a:t>
+                </a:r>
+                <a:r>
+                  <a:rPr lang="en-GB" dirty="0" err="1">
+                    <a:latin typeface="Lucida Bright" panose="02040602050505020304" pitchFamily="18" charset="0"/>
+                  </a:rPr>
+                  <a:t>hd</a:t>
+                </a:r>
+                <a:r>
+                  <a:rPr lang="en-GB" dirty="0">
+                    <a:latin typeface="Lucida Bright" panose="02040602050505020304" pitchFamily="18" charset="0"/>
+                  </a:rPr>
+                  <a:t> </a:t>
+                </a:r>
+                <a:r>
+                  <a:rPr lang="en-GB" dirty="0" err="1">
+                    <a:latin typeface="Lucida Bright" panose="02040602050505020304" pitchFamily="18" charset="0"/>
+                  </a:rPr>
+                  <a:t>ws</a:t>
+                </a:r>
+                <a:r>
+                  <a:rPr lang="en-GB" dirty="0">
+                    <a:latin typeface="Lucida Bright" panose="02040602050505020304" pitchFamily="18" charset="0"/>
+                  </a:rPr>
+                  <a:t>;</a:t>
+                </a:r>
+              </a:p>
+              <a:p>
+                <a:pPr marL="0" indent="0">
+                  <a:buNone/>
+                </a:pPr>
+                <a:r>
+                  <a:rPr lang="en-GB" dirty="0">
+                    <a:latin typeface="Lucida Bright" panose="02040602050505020304" pitchFamily="18" charset="0"/>
+                  </a:rPr>
+                  <a:t>    </a:t>
+                </a:r>
+                <a:r>
+                  <a:rPr lang="en-GB" dirty="0" err="1">
+                    <a:latin typeface="Lucida Bright" panose="02040602050505020304" pitchFamily="18" charset="0"/>
+                  </a:rPr>
+                  <a:t>ps’</a:t>
+                </a:r>
+                <a:r>
+                  <a:rPr lang="en-GB" dirty="0">
+                    <a:latin typeface="Lucida Bright" panose="02040602050505020304" pitchFamily="18" charset="0"/>
+                  </a:rPr>
+                  <a:t> = p # </a:t>
+                </a:r>
+                <a:r>
+                  <a:rPr lang="en-GB" dirty="0" err="1">
+                    <a:latin typeface="Lucida Bright" panose="02040602050505020304" pitchFamily="18" charset="0"/>
+                  </a:rPr>
+                  <a:t>ps</a:t>
+                </a:r>
+                <a:r>
+                  <a:rPr lang="en-GB" dirty="0">
+                    <a:latin typeface="Lucida Bright" panose="02040602050505020304" pitchFamily="18" charset="0"/>
+                  </a:rPr>
+                  <a:t>;</a:t>
+                </a:r>
+              </a:p>
+              <a:p>
+                <a:pPr marL="0" indent="0">
+                  <a:buNone/>
+                </a:pPr>
+                <a:r>
+                  <a:rPr lang="en-GB" dirty="0">
+                    <a:latin typeface="Lucida Bright" panose="02040602050505020304" pitchFamily="18" charset="0"/>
+                  </a:rPr>
+                  <a:t>    new = [p ← </a:t>
+                </a:r>
+                <a:r>
+                  <a:rPr lang="en-GB" dirty="0" err="1">
+                    <a:latin typeface="Lucida Bright" panose="02040602050505020304" pitchFamily="18" charset="0"/>
+                  </a:rPr>
+                  <a:t>succs</a:t>
+                </a:r>
+                <a:r>
+                  <a:rPr lang="en-GB" dirty="0">
+                    <a:latin typeface="Lucida Bright" panose="02040602050505020304" pitchFamily="18" charset="0"/>
+                  </a:rPr>
+                  <a:t> as </a:t>
+                </a:r>
+                <a:r>
+                  <a:rPr lang="en-GB" dirty="0" err="1">
+                    <a:latin typeface="Lucida Bright" panose="02040602050505020304" pitchFamily="18" charset="0"/>
+                  </a:rPr>
+                  <a:t>new_p</a:t>
+                </a:r>
+                <a:r>
+                  <a:rPr lang="en-GB" dirty="0">
+                    <a:latin typeface="Lucida Bright" panose="02040602050505020304" pitchFamily="18" charset="0"/>
+                  </a:rPr>
+                  <a:t> . p ∉ set </a:t>
+                </a:r>
+                <a:r>
+                  <a:rPr lang="en-GB" dirty="0" err="1">
+                    <a:latin typeface="Lucida Bright" panose="02040602050505020304" pitchFamily="18" charset="0"/>
+                  </a:rPr>
+                  <a:t>ps'</a:t>
+                </a:r>
+                <a:r>
+                  <a:rPr lang="en-GB" dirty="0">
+                    <a:latin typeface="Lucida Bright" panose="02040602050505020304" pitchFamily="18" charset="0"/>
+                  </a:rPr>
+                  <a:t> ∪ set </a:t>
+                </a:r>
+                <a:r>
+                  <a:rPr lang="en-GB" dirty="0" err="1">
+                    <a:latin typeface="Lucida Bright" panose="02040602050505020304" pitchFamily="18" charset="0"/>
+                  </a:rPr>
+                  <a:t>ws</a:t>
+                </a:r>
+                <a:r>
+                  <a:rPr lang="en-GB" dirty="0">
+                    <a:latin typeface="Lucida Bright" panose="02040602050505020304" pitchFamily="18" charset="0"/>
+                  </a:rPr>
+                  <a:t>]</a:t>
+                </a:r>
+              </a:p>
+              <a:p>
+                <a:pPr marL="0" indent="0">
+                  <a:buNone/>
+                </a:pPr>
+                <a:r>
+                  <a:rPr lang="en-GB" dirty="0">
+                    <a:latin typeface="Lucida Bright" panose="02040602050505020304" pitchFamily="18" charset="0"/>
+                  </a:rPr>
+                  <a:t>  in (new @ </a:t>
+                </a:r>
+                <a:r>
+                  <a:rPr lang="en-GB" dirty="0" err="1">
+                    <a:latin typeface="Lucida Bright" panose="02040602050505020304" pitchFamily="18" charset="0"/>
+                  </a:rPr>
+                  <a:t>tl</a:t>
+                </a:r>
+                <a:r>
+                  <a:rPr lang="en-GB" dirty="0">
+                    <a:latin typeface="Lucida Bright" panose="02040602050505020304" pitchFamily="18" charset="0"/>
+                  </a:rPr>
+                  <a:t> </a:t>
+                </a:r>
+                <a:r>
+                  <a:rPr lang="en-GB" dirty="0" err="1">
+                    <a:latin typeface="Lucida Bright" panose="02040602050505020304" pitchFamily="18" charset="0"/>
+                  </a:rPr>
+                  <a:t>ws</a:t>
+                </a:r>
+                <a:r>
+                  <a:rPr lang="en-GB" dirty="0">
+                    <a:latin typeface="Lucida Bright" panose="02040602050505020304" pitchFamily="18" charset="0"/>
+                  </a:rPr>
+                  <a:t>, </a:t>
+                </a:r>
+                <a:r>
+                  <a:rPr lang="en-GB" dirty="0" err="1">
+                    <a:latin typeface="Lucida Bright" panose="02040602050505020304" pitchFamily="18" charset="0"/>
+                  </a:rPr>
+                  <a:t>ps'</a:t>
+                </a:r>
+                <a:r>
+                  <a:rPr lang="en-GB" dirty="0">
+                    <a:latin typeface="Lucida Bright" panose="02040602050505020304" pitchFamily="18" charset="0"/>
+                  </a:rPr>
+                  <a:t>))</a:t>
+                </a:r>
+                <a:endParaRPr lang="en-GB" dirty="0"/>
+              </a:p>
+              <a:p>
+                <a:pPr marL="0" indent="0">
+                  <a:buNone/>
+                </a:pPr>
+                <a:endParaRPr lang="en-US" dirty="0"/>
+              </a:p>
+              <a:p>
+                <a:pPr marL="0" indent="0">
+                  <a:buNone/>
+                </a:pPr>
+                <a:r>
+                  <a:rPr lang="en-US" dirty="0"/>
+                  <a:t>…where </a:t>
+                </a:r>
+                <a:r>
+                  <a:rPr lang="pt-BR" dirty="0">
+                    <a:latin typeface="Lucida Bright" panose="02040602050505020304" pitchFamily="18" charset="0"/>
+                  </a:rPr>
+                  <a:t>succs as (r, s) = map </a:t>
+                </a:r>
+                <a:r>
+                  <a:rPr lang="pt-BR" i="1" dirty="0">
+                    <a:latin typeface="Lucida Bright" panose="02040602050505020304" pitchFamily="18" charset="0"/>
+                  </a:rPr>
+                  <a:t>(λa. (</a:t>
+                </a:r>
+                <a14:m>
+                  <m:oMath xmlns:m="http://schemas.openxmlformats.org/officeDocument/2006/math">
+                    <m:sSub>
+                      <m:sSubPr>
+                        <m:ctrlPr>
+                          <a:rPr lang="en-US" i="1">
+                            <a:latin typeface="Cambria Math" panose="02040503050406030204" pitchFamily="18" charset="0"/>
+                            <a:ea typeface="Cambria Math" panose="02040503050406030204" pitchFamily="18" charset="0"/>
+                          </a:rPr>
+                        </m:ctrlPr>
+                      </m:sSubPr>
+                      <m:e>
+                        <m:r>
+                          <a:rPr lang="de-DE" i="1">
+                            <a:latin typeface="Cambria Math" panose="02040503050406030204" pitchFamily="18" charset="0"/>
+                            <a:ea typeface="Cambria Math" panose="02040503050406030204" pitchFamily="18" charset="0"/>
+                          </a:rPr>
+                          <m:t>𝑑</m:t>
+                        </m:r>
+                      </m:e>
+                      <m:sub>
+                        <m:r>
+                          <a:rPr lang="de-DE" i="1">
+                            <a:latin typeface="Cambria Math" panose="02040503050406030204" pitchFamily="18" charset="0"/>
+                            <a:ea typeface="Cambria Math" panose="02040503050406030204" pitchFamily="18" charset="0"/>
+                          </a:rPr>
+                          <m:t>𝑎</m:t>
+                        </m:r>
+                      </m:sub>
+                    </m:sSub>
+                    <m:r>
+                      <a:rPr lang="de-DE" i="1">
+                        <a:latin typeface="Cambria Math" panose="02040503050406030204" pitchFamily="18" charset="0"/>
+                        <a:ea typeface="Cambria Math" panose="02040503050406030204" pitchFamily="18" charset="0"/>
+                      </a:rPr>
+                      <m:t> </m:t>
+                    </m:r>
+                  </m:oMath>
+                </a14:m>
+                <a:r>
+                  <a:rPr lang="pt-BR" i="1" dirty="0">
+                    <a:latin typeface="Cambria Math" panose="02040503050406030204" pitchFamily="18" charset="0"/>
+                    <a:ea typeface="Cambria Math" panose="02040503050406030204" pitchFamily="18" charset="0"/>
+                  </a:rPr>
+                  <a:t>(r) </a:t>
+                </a:r>
+                <a:r>
+                  <a:rPr lang="pt-BR" i="1" dirty="0">
+                    <a:latin typeface="Lucida Bright" panose="02040602050505020304" pitchFamily="18" charset="0"/>
+                  </a:rPr>
+                  <a:t>, </a:t>
+                </a:r>
+                <a14:m>
+                  <m:oMath xmlns:m="http://schemas.openxmlformats.org/officeDocument/2006/math">
+                    <m:sSub>
+                      <m:sSubPr>
+                        <m:ctrlPr>
+                          <a:rPr lang="en-US" i="1">
+                            <a:latin typeface="Cambria Math" panose="02040503050406030204" pitchFamily="18" charset="0"/>
+                            <a:ea typeface="Cambria Math" panose="02040503050406030204" pitchFamily="18" charset="0"/>
+                          </a:rPr>
+                        </m:ctrlPr>
+                      </m:sSubPr>
+                      <m:e>
+                        <m:r>
+                          <a:rPr lang="de-DE" i="1">
+                            <a:latin typeface="Cambria Math" panose="02040503050406030204" pitchFamily="18" charset="0"/>
+                            <a:ea typeface="Cambria Math" panose="02040503050406030204" pitchFamily="18" charset="0"/>
+                          </a:rPr>
+                          <m:t>𝑑</m:t>
+                        </m:r>
+                      </m:e>
+                      <m:sub>
+                        <m:r>
+                          <a:rPr lang="de-DE" i="1">
+                            <a:latin typeface="Cambria Math" panose="02040503050406030204" pitchFamily="18" charset="0"/>
+                            <a:ea typeface="Cambria Math" panose="02040503050406030204" pitchFamily="18" charset="0"/>
+                          </a:rPr>
+                          <m:t>𝑎</m:t>
+                        </m:r>
+                      </m:sub>
+                    </m:sSub>
+                    <m:r>
+                      <a:rPr lang="de-DE" i="1">
+                        <a:latin typeface="Cambria Math" panose="02040503050406030204" pitchFamily="18" charset="0"/>
+                        <a:ea typeface="Cambria Math" panose="02040503050406030204" pitchFamily="18" charset="0"/>
+                      </a:rPr>
+                      <m:t> </m:t>
+                    </m:r>
+                  </m:oMath>
+                </a14:m>
+                <a:r>
+                  <a:rPr lang="pt-BR" i="1" dirty="0">
+                    <a:latin typeface="Cambria Math" panose="02040503050406030204" pitchFamily="18" charset="0"/>
+                    <a:ea typeface="Cambria Math" panose="02040503050406030204" pitchFamily="18" charset="0"/>
+                  </a:rPr>
+                  <a:t>(s) </a:t>
+                </a:r>
+                <a:r>
+                  <a:rPr lang="pt-BR" i="1" dirty="0">
+                    <a:latin typeface="Lucida Bright" panose="02040602050505020304" pitchFamily="18" charset="0"/>
+                  </a:rPr>
+                  <a:t>)) </a:t>
+                </a:r>
+                <a:r>
+                  <a:rPr lang="pt-BR" dirty="0">
+                    <a:latin typeface="Lucida Bright" panose="02040602050505020304" pitchFamily="18" charset="0"/>
+                  </a:rPr>
+                  <a:t>as</a:t>
+                </a:r>
+              </a:p>
+              <a:p>
+                <a:pPr marL="0" indent="0">
+                  <a:buNone/>
+                </a:pPr>
+                <a:endParaRPr lang="en-US" dirty="0">
+                  <a:latin typeface="Lucida Bright" panose="02040602050505020304" pitchFamily="18" charset="0"/>
+                </a:endParaRPr>
+              </a:p>
+              <a:p>
+                <a:pPr marL="0" indent="0">
+                  <a:buNone/>
+                </a:pPr>
+                <a:r>
+                  <a:rPr lang="en-US" dirty="0"/>
+                  <a:t>We will iterate this step using the </a:t>
+                </a:r>
+                <a:r>
+                  <a:rPr lang="en-GB" dirty="0">
+                    <a:latin typeface="Lucida Bright" panose="02040602050505020304" pitchFamily="18" charset="0"/>
+                  </a:rPr>
+                  <a:t>while </a:t>
+                </a:r>
+                <a:r>
+                  <a:rPr lang="en-US" dirty="0"/>
+                  <a:t>function.</a:t>
+                </a:r>
+              </a:p>
+              <a:p>
+                <a:pPr marL="0" indent="0">
+                  <a:buNone/>
+                </a:pPr>
+                <a:endParaRPr lang="en-US" dirty="0"/>
+              </a:p>
+            </p:txBody>
+          </p:sp>
+        </mc:Choice>
+        <mc:Fallback>
+          <p:sp>
+            <p:nvSpPr>
+              <p:cNvPr id="3" name="Inhaltsplatzhalter 2">
+                <a:extLst>
+                  <a:ext uri="{FF2B5EF4-FFF2-40B4-BE49-F238E27FC236}">
+                    <a16:creationId xmlns:a16="http://schemas.microsoft.com/office/drawing/2014/main" id="{5347057A-69F6-409A-ACFA-8AB16AFEBA07}"/>
+                  </a:ext>
+                </a:extLst>
+              </p:cNvPr>
+              <p:cNvSpPr>
+                <a:spLocks noGrp="1" noRot="1" noChangeAspect="1" noMove="1" noResize="1" noEditPoints="1" noAdjustHandles="1" noChangeArrowheads="1" noChangeShapeType="1" noTextEdit="1"/>
+              </p:cNvSpPr>
+              <p:nvPr>
+                <p:ph idx="1"/>
+              </p:nvPr>
+            </p:nvSpPr>
+            <p:spPr>
+              <a:blipFill>
+                <a:blip r:embed="rId3"/>
+                <a:stretch>
+                  <a:fillRect l="-1043" t="-3922"/>
+                </a:stretch>
+              </a:blipFill>
+            </p:spPr>
+            <p:txBody>
+              <a:bodyPr/>
+              <a:lstStyle/>
+              <a:p>
+                <a:r>
+                  <a:rPr lang="en-US">
+                    <a:noFill/>
+                  </a:rPr>
+                  <a:t> </a:t>
+                </a:r>
+              </a:p>
+            </p:txBody>
+          </p:sp>
+        </mc:Fallback>
+      </mc:AlternateContent>
     </p:spTree>
     <p:extLst>
       <p:ext uri="{BB962C8B-B14F-4D97-AF65-F5344CB8AC3E}">
-        <p14:creationId xmlns:p14="http://schemas.microsoft.com/office/powerpoint/2010/main" val="790305600"/>
+        <p14:creationId xmlns:p14="http://schemas.microsoft.com/office/powerpoint/2010/main" val="1518317521"/>
       </p:ext>
     </p:extLst>
   </p:cSld>
@@ -7069,7 +7775,7 @@
           <p:cNvPr id="2" name="Titel 1">
             <a:extLst>
               <a:ext uri="{FF2B5EF4-FFF2-40B4-BE49-F238E27FC236}">
-                <a16:creationId xmlns:a16="http://schemas.microsoft.com/office/drawing/2014/main" id="{6308764C-5A53-4A40-86AB-AFF027DC3399}"/>
+                <a16:creationId xmlns:a16="http://schemas.microsoft.com/office/drawing/2014/main" id="{7E545568-004C-4426-9618-E5B4001137F9}"/>
               </a:ext>
             </a:extLst>
           </p:cNvPr>
@@ -7087,7 +7793,7 @@
           <a:p>
             <a:r>
               <a:rPr lang="en-US" dirty="0"/>
-              <a:t>In each step</a:t>
+              <a:t>test</a:t>
             </a:r>
           </a:p>
         </p:txBody>
@@ -7097,7 +7803,7 @@
           <p:cNvPr id="3" name="Inhaltsplatzhalter 2">
             <a:extLst>
               <a:ext uri="{FF2B5EF4-FFF2-40B4-BE49-F238E27FC236}">
-                <a16:creationId xmlns:a16="http://schemas.microsoft.com/office/drawing/2014/main" id="{95585F86-E91B-4947-B7FD-2870701F8929}"/>
+                <a16:creationId xmlns:a16="http://schemas.microsoft.com/office/drawing/2014/main" id="{586033B4-AF90-4560-A2E5-9FB163B244C7}"/>
               </a:ext>
             </a:extLst>
           </p:cNvPr>
@@ -7113,24 +7819,41 @@
           <a:bodyPr/>
           <a:lstStyle/>
           <a:p>
-            <a:r>
-              <a:rPr lang="en-US" dirty="0"/>
-              <a:t>A pair from the work set is processed</a:t>
-            </a:r>
-          </a:p>
-          <a:p>
-            <a:r>
-              <a:rPr lang="en-US" dirty="0"/>
-              <a:t>All pairs missing for the property</a:t>
-            </a:r>
+            <a:endParaRPr lang="en-US" dirty="0"/>
           </a:p>
           <a:p>
             <a:pPr marL="0" indent="0">
               <a:buNone/>
             </a:pPr>
             <a:r>
-              <a:rPr lang="pt-BR" dirty="0"/>
-              <a:t>		∀a∈set as. (―r, nderiv a s) ∈ R)</a:t>
+              <a:rPr lang="en-US" dirty="0">
+                <a:latin typeface="Lucida Bright" panose="02040602050505020304" pitchFamily="18" charset="0"/>
+              </a:rPr>
+              <a:t>test (</a:t>
+            </a:r>
+            <a:r>
+              <a:rPr lang="en-US" dirty="0" err="1">
+                <a:latin typeface="Lucida Bright" panose="02040602050505020304" pitchFamily="18" charset="0"/>
+              </a:rPr>
+              <a:t>ws</a:t>
+            </a:r>
+            <a:r>
+              <a:rPr lang="en-US" dirty="0">
+                <a:latin typeface="Lucida Bright" panose="02040602050505020304" pitchFamily="18" charset="0"/>
+              </a:rPr>
+              <a:t>,_) ⟷ (case </a:t>
+            </a:r>
+            <a:r>
+              <a:rPr lang="en-US" dirty="0" err="1">
+                <a:latin typeface="Lucida Bright" panose="02040602050505020304" pitchFamily="18" charset="0"/>
+              </a:rPr>
+              <a:t>ws</a:t>
+            </a:r>
+            <a:r>
+              <a:rPr lang="en-US" dirty="0">
+                <a:latin typeface="Lucida Bright" panose="02040602050505020304" pitchFamily="18" charset="0"/>
+              </a:rPr>
+              <a:t> of</a:t>
             </a:r>
           </a:p>
           <a:p>
@@ -7138,32 +7861,77 @@
               <a:buNone/>
             </a:pPr>
             <a:r>
-              <a:rPr lang="pt-BR" dirty="0"/>
-              <a:t>	are added to the work set</a:t>
+              <a:rPr lang="en-US" dirty="0">
+                <a:latin typeface="Lucida Bright" panose="02040602050505020304" pitchFamily="18" charset="0"/>
+              </a:rPr>
+              <a:t>	[] ⇒ False |</a:t>
             </a:r>
           </a:p>
           <a:p>
             <a:pPr marL="0" indent="0">
               <a:buNone/>
             </a:pPr>
-            <a:endParaRPr lang="pt-BR" dirty="0"/>
+            <a:r>
+              <a:rPr lang="en-US" dirty="0">
+                <a:latin typeface="Lucida Bright" panose="02040602050505020304" pitchFamily="18" charset="0"/>
+              </a:rPr>
+              <a:t>	(p, q)#_ ⇒ nullable p ⟷ nullable q</a:t>
+            </a:r>
           </a:p>
           <a:p>
             <a:pPr marL="0" indent="0">
               <a:buNone/>
             </a:pPr>
             <a:r>
-              <a:rPr lang="pt-BR" dirty="0"/>
-              <a:t>“as” will be the set of atoms in the expressions (this does not change during execution)</a:t>
-            </a:r>
+              <a:rPr lang="en-US" dirty="0">
+                <a:latin typeface="Lucida Bright" panose="02040602050505020304" pitchFamily="18" charset="0"/>
+              </a:rPr>
+              <a:t>)</a:t>
+            </a:r>
+          </a:p>
+          <a:p>
+            <a:pPr marL="0" indent="0">
+              <a:buNone/>
+            </a:pPr>
             <a:endParaRPr lang="en-US" dirty="0"/>
+          </a:p>
+          <a:p>
+            <a:pPr marL="0" indent="0">
+              <a:buNone/>
+            </a:pPr>
+            <a:r>
+              <a:rPr lang="en-US" dirty="0"/>
+              <a:t>The loop terminates if either</a:t>
+            </a:r>
+          </a:p>
+          <a:p>
+            <a:pPr lvl="1"/>
+            <a:r>
+              <a:rPr lang="en-US" dirty="0"/>
+              <a:t>the work set is empty (</a:t>
+            </a:r>
+            <a:r>
+              <a:rPr lang="en-US" dirty="0" err="1"/>
+              <a:t>bisimulation</a:t>
+            </a:r>
+            <a:r>
+              <a:rPr lang="en-US" dirty="0"/>
+              <a:t> constructed)</a:t>
+            </a:r>
+          </a:p>
+          <a:p>
+            <a:pPr lvl="1"/>
+            <a:r>
+              <a:rPr lang="en-US" dirty="0"/>
+              <a:t>a nonequivalent pair of REs is to be processed (counterexample found)</a:t>
+            </a:r>
           </a:p>
         </p:txBody>
       </p:sp>
     </p:spTree>
     <p:extLst>
       <p:ext uri="{BB962C8B-B14F-4D97-AF65-F5344CB8AC3E}">
-        <p14:creationId xmlns:p14="http://schemas.microsoft.com/office/powerpoint/2010/main" val="398589950"/>
+        <p14:creationId xmlns:p14="http://schemas.microsoft.com/office/powerpoint/2010/main" val="1786495179"/>
       </p:ext>
     </p:extLst>
   </p:cSld>
@@ -7195,7 +7963,7 @@
           <p:cNvPr id="2" name="Titel 1">
             <a:extLst>
               <a:ext uri="{FF2B5EF4-FFF2-40B4-BE49-F238E27FC236}">
-                <a16:creationId xmlns:a16="http://schemas.microsoft.com/office/drawing/2014/main" id="{D55CD077-9E2B-43F3-83A0-334C38F85C7C}"/>
+                <a16:creationId xmlns:a16="http://schemas.microsoft.com/office/drawing/2014/main" id="{D5D50EB3-B325-43FD-A071-2E053FCA58D5}"/>
               </a:ext>
             </a:extLst>
           </p:cNvPr>
@@ -7213,7 +7981,7 @@
           <a:p>
             <a:r>
               <a:rPr lang="en-US" dirty="0"/>
-              <a:t>ACI</a:t>
+              <a:t>Example</a:t>
             </a:r>
           </a:p>
         </p:txBody>
@@ -7223,7 +7991,7 @@
           <p:cNvPr id="3" name="Inhaltsplatzhalter 2">
             <a:extLst>
               <a:ext uri="{FF2B5EF4-FFF2-40B4-BE49-F238E27FC236}">
-                <a16:creationId xmlns:a16="http://schemas.microsoft.com/office/drawing/2014/main" id="{EABB337D-AA1F-4919-A75D-7EF7AE0BF98B}"/>
+                <a16:creationId xmlns:a16="http://schemas.microsoft.com/office/drawing/2014/main" id="{13A3184E-D790-4B2E-BAE6-6BA74D9824B9}"/>
               </a:ext>
             </a:extLst>
           </p:cNvPr>
@@ -7244,75 +8012,54 @@
             </a:pPr>
             <a:r>
               <a:rPr lang="en-US" dirty="0"/>
-              <a:t>associativity, commutativity and idempotence of </a:t>
-            </a:r>
-            <a:r>
-              <a:rPr lang="en-US" i="1" dirty="0"/>
-              <a:t>+</a:t>
-            </a:r>
-          </a:p>
-          <a:p>
-            <a:r>
-              <a:rPr lang="en-US" dirty="0"/>
-              <a:t>the auxiliary function </a:t>
-            </a:r>
-            <a:r>
-              <a:rPr lang="en-US" i="1" dirty="0"/>
-              <a:t>norm</a:t>
-            </a:r>
-            <a:r>
-              <a:rPr lang="en-US" dirty="0"/>
-              <a:t> establishes a normal form</a:t>
+              <a:t>&lt;on the board&gt;</a:t>
             </a:r>
           </a:p>
           <a:p>
             <a:pPr marL="0" indent="0">
               <a:buNone/>
             </a:pPr>
+            <a:endParaRPr lang="en-US" dirty="0"/>
+          </a:p>
+          <a:p>
+            <a:pPr marL="0" indent="0">
+              <a:buNone/>
+            </a:pPr>
+            <a:r>
+              <a:rPr lang="en-US" dirty="0"/>
+              <a:t>result</a:t>
+            </a:r>
+          </a:p>
+          <a:p>
+            <a:pPr marL="0" indent="0">
+              <a:buNone/>
+            </a:pPr>
+            <a:endParaRPr lang="en-US" dirty="0"/>
+          </a:p>
+          <a:p>
+            <a:pPr marL="0" indent="0">
+              <a:buNone/>
+            </a:pPr>
             <a:r>
               <a:rPr lang="en-US" dirty="0"/>
               <a:t>	</a:t>
             </a:r>
             <a:r>
-              <a:rPr lang="en-US" dirty="0">
-                <a:sym typeface="Wingdings" panose="05000000000000000000" pitchFamily="2" charset="2"/>
+              <a:rPr lang="pt-BR" dirty="0">
+                <a:latin typeface="Lucida Bright" panose="02040602050505020304" pitchFamily="18" charset="0"/>
               </a:rPr>
-              <a:t> </a:t>
-            </a:r>
-            <a:r>
-              <a:rPr lang="en-US" dirty="0"/>
-              <a:t>ACI-equal terms are identified at that step already</a:t>
-            </a:r>
-          </a:p>
-          <a:p>
-            <a:r>
-              <a:rPr lang="en-US" dirty="0"/>
-              <a:t>to verify this, one would have to state ACI-equivalence formally.</a:t>
-            </a:r>
-          </a:p>
-          <a:p>
-            <a:endParaRPr lang="en-US" dirty="0"/>
-          </a:p>
-          <a:p>
-            <a:r>
-              <a:rPr lang="en-US" dirty="0"/>
-              <a:t>the REs in the (emergent) </a:t>
-            </a:r>
-            <a:r>
-              <a:rPr lang="en-US" dirty="0" err="1"/>
-              <a:t>bisimulation</a:t>
-            </a:r>
-            <a:r>
-              <a:rPr lang="en-US" dirty="0"/>
-              <a:t> are kept in this normal form, as an invariant</a:t>
-            </a:r>
+              <a:t>L ((ε + a)* ⋅ a) = L (a ⋅ (a + ε)*)</a:t>
+            </a:r>
+            <a:endParaRPr lang="en-US" dirty="0">
+              <a:latin typeface="Lucida Bright" panose="02040602050505020304" pitchFamily="18" charset="0"/>
+            </a:endParaRPr>
           </a:p>
         </p:txBody>
       </p:sp>
     </p:spTree>
     <p:extLst>
       <p:ext uri="{BB962C8B-B14F-4D97-AF65-F5344CB8AC3E}">
-        <p14:creationId xmlns:p14="http://schemas.microsoft.com/office/powerpoint/2010/main" val="3250996410"/>
+        <p14:creationId xmlns:p14="http://schemas.microsoft.com/office/powerpoint/2010/main" val="790305600"/>
       </p:ext>
     </p:extLst>
   </p:cSld>
@@ -7344,7 +8091,7 @@
           <p:cNvPr id="2" name="Titel 1">
             <a:extLst>
               <a:ext uri="{FF2B5EF4-FFF2-40B4-BE49-F238E27FC236}">
-                <a16:creationId xmlns:a16="http://schemas.microsoft.com/office/drawing/2014/main" id="{7E545568-004C-4426-9618-E5B4001137F9}"/>
+                <a16:creationId xmlns:a16="http://schemas.microsoft.com/office/drawing/2014/main" id="{D55CD077-9E2B-43F3-83A0-334C38F85C7C}"/>
               </a:ext>
             </a:extLst>
           </p:cNvPr>
@@ -7362,7 +8109,7 @@
           <a:p>
             <a:r>
               <a:rPr lang="en-US" dirty="0"/>
-              <a:t>Closure computation</a:t>
+              <a:t>ACI</a:t>
             </a:r>
           </a:p>
         </p:txBody>
@@ -7372,7 +8119,7 @@
           <p:cNvPr id="3" name="Inhaltsplatzhalter 2">
             <a:extLst>
               <a:ext uri="{FF2B5EF4-FFF2-40B4-BE49-F238E27FC236}">
-                <a16:creationId xmlns:a16="http://schemas.microsoft.com/office/drawing/2014/main" id="{586033B4-AF90-4560-A2E5-9FB163B244C7}"/>
+                <a16:creationId xmlns:a16="http://schemas.microsoft.com/office/drawing/2014/main" id="{EABB337D-AA1F-4919-A75D-7EF7AE0BF98B}"/>
               </a:ext>
             </a:extLst>
           </p:cNvPr>
@@ -7385,43 +8132,146 @@
         </p:nvSpPr>
         <p:spPr/>
         <p:txBody>
-          <a:bodyPr/>
+          <a:bodyPr>
+            <a:normAutofit/>
+          </a:bodyPr>
           <a:lstStyle/>
           <a:p>
+            <a:pPr marL="0" indent="0">
+              <a:buNone/>
+            </a:pPr>
+            <a:r>
+              <a:rPr lang="en-US" dirty="0"/>
+              <a:t>equality modulo </a:t>
+            </a:r>
+            <a:r>
+              <a:rPr lang="en-US" i="1" dirty="0"/>
+              <a:t>associativity</a:t>
+            </a:r>
+            <a:r>
+              <a:rPr lang="en-US" dirty="0"/>
+              <a:t>, </a:t>
+            </a:r>
+            <a:r>
+              <a:rPr lang="en-US" i="1" dirty="0"/>
+              <a:t>commutativity</a:t>
+            </a:r>
+            <a:r>
+              <a:rPr lang="en-US" dirty="0"/>
+              <a:t> and </a:t>
+            </a:r>
+            <a:r>
+              <a:rPr lang="en-US" i="1" dirty="0"/>
+              <a:t>idempotence</a:t>
+            </a:r>
+            <a:r>
+              <a:rPr lang="en-US" dirty="0"/>
+              <a:t> of </a:t>
+            </a:r>
+            <a:r>
+              <a:rPr lang="en-US" i="1" dirty="0"/>
+              <a:t>+</a:t>
+            </a:r>
             <a:endParaRPr lang="en-US" dirty="0"/>
           </a:p>
           <a:p>
             <a:endParaRPr lang="en-US" dirty="0"/>
           </a:p>
           <a:p>
-            <a:endParaRPr lang="en-US" dirty="0"/>
-          </a:p>
-          <a:p>
             <a:r>
               <a:rPr lang="en-US" dirty="0"/>
-              <a:t>terminates if either</a:t>
-            </a:r>
-          </a:p>
-          <a:p>
-            <a:pPr lvl="1"/>
+              <a:t>ACI-equality of two REs can be reduced to equality by recursively sorting </a:t>
+            </a:r>
+            <a:r>
+              <a:rPr lang="en-US" dirty="0" err="1"/>
+              <a:t>subterms</a:t>
+            </a:r>
             <a:r>
               <a:rPr lang="en-US" dirty="0"/>
-              <a:t>the work set is empty (</a:t>
-            </a:r>
-            <a:r>
-              <a:rPr lang="en-US" dirty="0" err="1"/>
-              <a:t>bisimulation</a:t>
-            </a:r>
+              <a:t> of nested + terms, and eliminating duplicates</a:t>
+            </a:r>
+          </a:p>
+          <a:p>
+            <a:pPr lvl="1">
+              <a:buFont typeface="Wingdings" panose="05000000000000000000" pitchFamily="2" charset="2"/>
+              <a:buChar char="à"/>
+            </a:pPr>
+            <a:r>
+              <a:rPr lang="en-US" dirty="0">
+                <a:sym typeface="Wingdings" panose="05000000000000000000" pitchFamily="2" charset="2"/>
+              </a:rPr>
+              <a:t>Use some arbitrary order on the constructors: </a:t>
+            </a:r>
+            <a:r>
+              <a:rPr lang="pt-BR" b="1" i="1" dirty="0">
+                <a:latin typeface="Lucida Bright" panose="02040602050505020304" pitchFamily="18" charset="0"/>
+              </a:rPr>
+              <a:t>∅</a:t>
+            </a:r>
+            <a:r>
+              <a:rPr lang="en-US" dirty="0">
+                <a:sym typeface="Wingdings" panose="05000000000000000000" pitchFamily="2" charset="2"/>
+              </a:rPr>
+              <a:t>  &lt; </a:t>
+            </a:r>
+            <a:r>
+              <a:rPr lang="el-GR" i="1" dirty="0"/>
+              <a:t>ε</a:t>
+            </a:r>
+            <a:r>
+              <a:rPr lang="de-DE" i="1" dirty="0"/>
+              <a:t> &lt; a &lt;</a:t>
+            </a:r>
+            <a:r>
+              <a:rPr lang="pt-BR" b="1" i="1" dirty="0">
+                <a:latin typeface="Lucida Bright" panose="02040602050505020304" pitchFamily="18" charset="0"/>
+              </a:rPr>
+              <a:t> </a:t>
+            </a:r>
+            <a:r>
+              <a:rPr lang="en-US" dirty="0">
+                <a:sym typeface="Wingdings" panose="05000000000000000000" pitchFamily="2" charset="2"/>
+              </a:rPr>
+              <a:t>(_)* &lt; (_</a:t>
+            </a:r>
+            <a:r>
+              <a:rPr lang="en-GB" i="1" dirty="0">
+                <a:latin typeface="Cambria Math" panose="02040503050406030204" pitchFamily="18" charset="0"/>
+                <a:ea typeface="Cambria Math" panose="02040503050406030204" pitchFamily="18" charset="0"/>
+              </a:rPr>
+              <a:t>⋅ </a:t>
+            </a:r>
+            <a:r>
+              <a:rPr lang="en-US" dirty="0">
+                <a:sym typeface="Wingdings" panose="05000000000000000000" pitchFamily="2" charset="2"/>
+              </a:rPr>
+              <a:t>_)</a:t>
+            </a:r>
+          </a:p>
+          <a:p>
+            <a:pPr lvl="1">
+              <a:buFont typeface="Wingdings" panose="05000000000000000000" pitchFamily="2" charset="2"/>
+              <a:buChar char="à"/>
+            </a:pPr>
             <a:r>
               <a:rPr lang="en-US" dirty="0"/>
-              <a:t> constructed)</a:t>
-            </a:r>
-          </a:p>
-          <a:p>
-            <a:pPr lvl="1"/>
+              <a:t>The calls also make lists out of nested +’s.</a:t>
+            </a:r>
+          </a:p>
+          <a:p>
+            <a:pPr lvl="1">
+              <a:buFont typeface="Wingdings" panose="05000000000000000000" pitchFamily="2" charset="2"/>
+              <a:buChar char="à"/>
+            </a:pPr>
             <a:r>
               <a:rPr lang="en-US" dirty="0"/>
-              <a:t>a nonequivalent pair of REs is to be processed (counterexample found)</a:t>
+              <a:t>Afterwards, check for equality.</a:t>
+            </a:r>
+          </a:p>
+          <a:p>
+            <a:r>
+              <a:rPr lang="en-US" dirty="0"/>
+              <a:t>alternative: keep the REs in this normal form, as an invariant</a:t>
             </a:r>
           </a:p>
         </p:txBody>
@@ -7429,7 +8279,7 @@
     </p:spTree>
     <p:extLst>
       <p:ext uri="{BB962C8B-B14F-4D97-AF65-F5344CB8AC3E}">
-        <p14:creationId xmlns:p14="http://schemas.microsoft.com/office/powerpoint/2010/main" val="1786495179"/>
+        <p14:creationId xmlns:p14="http://schemas.microsoft.com/office/powerpoint/2010/main" val="3250996410"/>
       </p:ext>
     </p:extLst>
   </p:cSld>
@@ -7440,6 +8290,233 @@
 </file>
 
 <file path=ppt/slides/slide16.xml><?xml version="1.0" encoding="utf-8"?>
+<p:sld xmlns:a="http://schemas.openxmlformats.org/drawingml/2006/main" xmlns:r="http://schemas.openxmlformats.org/officeDocument/2006/relationships" xmlns:p="http://schemas.openxmlformats.org/presentationml/2006/main">
+  <p:cSld>
+    <p:spTree>
+      <p:nvGrpSpPr>
+        <p:cNvPr id="1" name=""/>
+        <p:cNvGrpSpPr/>
+        <p:nvPr/>
+      </p:nvGrpSpPr>
+      <p:grpSpPr>
+        <a:xfrm>
+          <a:off x="0" y="0"/>
+          <a:ext cx="0" cy="0"/>
+          <a:chOff x="0" y="0"/>
+          <a:chExt cx="0" cy="0"/>
+        </a:xfrm>
+      </p:grpSpPr>
+      <p:sp>
+        <p:nvSpPr>
+          <p:cNvPr id="2" name="Titel 1">
+            <a:extLst>
+              <a:ext uri="{FF2B5EF4-FFF2-40B4-BE49-F238E27FC236}">
+                <a16:creationId xmlns:a16="http://schemas.microsoft.com/office/drawing/2014/main" id="{A24B41B1-888F-48DC-BD41-15D6CE619CD0}"/>
+              </a:ext>
+            </a:extLst>
+          </p:cNvPr>
+          <p:cNvSpPr>
+            <a:spLocks noGrp="1"/>
+          </p:cNvSpPr>
+          <p:nvPr>
+            <p:ph type="title"/>
+          </p:nvPr>
+        </p:nvSpPr>
+        <p:spPr/>
+        <p:txBody>
+          <a:bodyPr/>
+          <a:lstStyle/>
+          <a:p>
+            <a:r>
+              <a:rPr lang="en-US" dirty="0" err="1"/>
+              <a:t>Brzozowki’s</a:t>
+            </a:r>
+            <a:r>
+              <a:rPr lang="en-US" dirty="0"/>
+              <a:t> result about termination</a:t>
+            </a:r>
+          </a:p>
+        </p:txBody>
+      </p:sp>
+      <p:sp>
+        <p:nvSpPr>
+          <p:cNvPr id="3" name="Inhaltsplatzhalter 2">
+            <a:extLst>
+              <a:ext uri="{FF2B5EF4-FFF2-40B4-BE49-F238E27FC236}">
+                <a16:creationId xmlns:a16="http://schemas.microsoft.com/office/drawing/2014/main" id="{740A271E-5A51-4AB1-95AC-89ACD35231C5}"/>
+              </a:ext>
+            </a:extLst>
+          </p:cNvPr>
+          <p:cNvSpPr>
+            <a:spLocks noGrp="1"/>
+          </p:cNvSpPr>
+          <p:nvPr>
+            <p:ph idx="1"/>
+          </p:nvPr>
+        </p:nvSpPr>
+        <p:spPr/>
+        <p:txBody>
+          <a:bodyPr/>
+          <a:lstStyle/>
+          <a:p>
+            <a:pPr marL="0" indent="0">
+              <a:buNone/>
+            </a:pPr>
+            <a:r>
+              <a:rPr lang="en-GB" dirty="0"/>
+              <a:t>In each step, we add the following to the work set:</a:t>
+            </a:r>
+          </a:p>
+          <a:p>
+            <a:pPr marL="0" indent="0">
+              <a:buNone/>
+            </a:pPr>
+            <a:endParaRPr lang="en-GB" dirty="0"/>
+          </a:p>
+          <a:p>
+            <a:pPr marL="0" indent="0">
+              <a:buNone/>
+            </a:pPr>
+            <a:r>
+              <a:rPr lang="en-GB" dirty="0">
+                <a:latin typeface="Lucida Bright" panose="02040602050505020304" pitchFamily="18" charset="0"/>
+              </a:rPr>
+              <a:t>[p ← </a:t>
+            </a:r>
+            <a:r>
+              <a:rPr lang="en-GB" dirty="0" err="1">
+                <a:latin typeface="Lucida Bright" panose="02040602050505020304" pitchFamily="18" charset="0"/>
+              </a:rPr>
+              <a:t>succs</a:t>
+            </a:r>
+            <a:r>
+              <a:rPr lang="en-GB" dirty="0">
+                <a:latin typeface="Lucida Bright" panose="02040602050505020304" pitchFamily="18" charset="0"/>
+              </a:rPr>
+              <a:t> as (</a:t>
+            </a:r>
+            <a:r>
+              <a:rPr lang="en-GB" dirty="0" err="1">
+                <a:latin typeface="Lucida Bright" panose="02040602050505020304" pitchFamily="18" charset="0"/>
+              </a:rPr>
+              <a:t>hd</a:t>
+            </a:r>
+            <a:r>
+              <a:rPr lang="en-GB" dirty="0">
+                <a:latin typeface="Lucida Bright" panose="02040602050505020304" pitchFamily="18" charset="0"/>
+              </a:rPr>
+              <a:t> </a:t>
+            </a:r>
+            <a:r>
+              <a:rPr lang="en-GB" dirty="0" err="1">
+                <a:latin typeface="Lucida Bright" panose="02040602050505020304" pitchFamily="18" charset="0"/>
+              </a:rPr>
+              <a:t>ws</a:t>
+            </a:r>
+            <a:r>
+              <a:rPr lang="en-GB" dirty="0">
+                <a:latin typeface="Lucida Bright" panose="02040602050505020304" pitchFamily="18" charset="0"/>
+              </a:rPr>
+              <a:t>) . p ∉ set </a:t>
+            </a:r>
+            <a:r>
+              <a:rPr lang="en-GB" dirty="0" err="1">
+                <a:latin typeface="Lucida Bright" panose="02040602050505020304" pitchFamily="18" charset="0"/>
+              </a:rPr>
+              <a:t>ps'</a:t>
+            </a:r>
+            <a:r>
+              <a:rPr lang="en-GB" dirty="0">
+                <a:latin typeface="Lucida Bright" panose="02040602050505020304" pitchFamily="18" charset="0"/>
+              </a:rPr>
+              <a:t> ∪ set </a:t>
+            </a:r>
+            <a:r>
+              <a:rPr lang="en-GB" dirty="0" err="1">
+                <a:latin typeface="Lucida Bright" panose="02040602050505020304" pitchFamily="18" charset="0"/>
+              </a:rPr>
+              <a:t>ws</a:t>
+            </a:r>
+            <a:r>
+              <a:rPr lang="en-GB" dirty="0">
+                <a:latin typeface="Lucida Bright" panose="02040602050505020304" pitchFamily="18" charset="0"/>
+              </a:rPr>
+              <a:t>]</a:t>
+            </a:r>
+          </a:p>
+          <a:p>
+            <a:pPr marL="0" indent="0">
+              <a:buNone/>
+            </a:pPr>
+            <a:endParaRPr lang="en-US" dirty="0"/>
+          </a:p>
+          <a:p>
+            <a:pPr marL="0" indent="0" algn="ctr">
+              <a:buNone/>
+            </a:pPr>
+            <a:r>
+              <a:rPr lang="en-GB" i="1" dirty="0"/>
+              <a:t>If the </a:t>
+            </a:r>
+            <a:r>
+              <a:rPr lang="en-GB" i="1" dirty="0">
+                <a:latin typeface="Lucida Bright" panose="02040602050505020304" pitchFamily="18" charset="0"/>
+              </a:rPr>
+              <a:t>∉ </a:t>
+            </a:r>
+            <a:r>
+              <a:rPr lang="en-GB" i="1" dirty="0"/>
+              <a:t>filter also considers ACI-equivalent REs to be equal,</a:t>
+            </a:r>
+          </a:p>
+          <a:p>
+            <a:pPr marL="0" indent="0" algn="ctr">
+              <a:buNone/>
+            </a:pPr>
+            <a:r>
+              <a:rPr lang="en-GB" i="1" dirty="0"/>
+              <a:t>then the computation terminates.</a:t>
+            </a:r>
+          </a:p>
+          <a:p>
+            <a:pPr marL="0" indent="0" algn="ctr">
+              <a:buNone/>
+            </a:pPr>
+            <a:endParaRPr lang="en-GB" dirty="0"/>
+          </a:p>
+          <a:p>
+            <a:pPr marL="0" indent="0">
+              <a:buNone/>
+            </a:pPr>
+            <a:r>
+              <a:rPr lang="en-GB" dirty="0"/>
+              <a:t>The resulting relation will still be a </a:t>
+            </a:r>
+            <a:r>
+              <a:rPr lang="en-GB" dirty="0" err="1"/>
+              <a:t>bisimulation</a:t>
+            </a:r>
+            <a:r>
+              <a:rPr lang="en-GB" dirty="0"/>
+              <a:t>.</a:t>
+            </a:r>
+          </a:p>
+        </p:txBody>
+      </p:sp>
+    </p:spTree>
+    <p:extLst>
+      <p:ext uri="{BB962C8B-B14F-4D97-AF65-F5344CB8AC3E}">
+        <p14:creationId xmlns:p14="http://schemas.microsoft.com/office/powerpoint/2010/main" val="1811828584"/>
+      </p:ext>
+    </p:extLst>
+  </p:cSld>
+  <p:clrMapOvr>
+    <a:masterClrMapping/>
+  </p:clrMapOvr>
+</p:sld>
+</file>
+
+<file path=ppt/slides/slide17.xml><?xml version="1.0" encoding="utf-8"?>
 <p:sld xmlns:a="http://schemas.openxmlformats.org/drawingml/2006/main" xmlns:r="http://schemas.openxmlformats.org/officeDocument/2006/relationships" xmlns:p="http://schemas.openxmlformats.org/presentationml/2006/main">
   <p:cSld>
     <p:spTree>
@@ -7983,7 +9060,7 @@
 </p:sld>
 </file>
 
-<file path=ppt/slides/slide17.xml><?xml version="1.0" encoding="utf-8"?>
+<file path=ppt/slides/slide18.xml><?xml version="1.0" encoding="utf-8"?>
 <p:sld xmlns:a="http://schemas.openxmlformats.org/drawingml/2006/main" xmlns:r="http://schemas.openxmlformats.org/officeDocument/2006/relationships" xmlns:p="http://schemas.openxmlformats.org/presentationml/2006/main">
   <p:cSld>
     <p:spTree>
@@ -8151,11 +9228,11 @@
           </a:p>
           <a:p>
             <a:r>
-              <a:rPr lang="en-US" dirty="0"/>
+              <a:rPr lang="en-US" i="1" dirty="0"/>
               <a:t>a</a:t>
             </a:r>
             <a:r>
-              <a:rPr lang="en-US" noProof="0" dirty="0" err="1"/>
+              <a:rPr lang="en-US" i="1" noProof="0" dirty="0" err="1"/>
               <a:t>utomatic</a:t>
             </a:r>
             <a:r>
@@ -8165,8 +9242,12 @@
           </a:p>
           <a:p>
             <a:r>
+              <a:rPr lang="en-US" i="1" noProof="0" dirty="0"/>
+              <a:t>complete</a:t>
+            </a:r>
+            <a:r>
               <a:rPr lang="en-US" noProof="0" dirty="0"/>
-              <a:t>complete</a:t>
+              <a:t>: if r </a:t>
             </a:r>
           </a:p>
           <a:p>
@@ -8235,7 +9316,7 @@
           <p:cNvPr id="2" name="Titel 1">
             <a:extLst>
               <a:ext uri="{FF2B5EF4-FFF2-40B4-BE49-F238E27FC236}">
-                <a16:creationId xmlns:a16="http://schemas.microsoft.com/office/drawing/2014/main" id="{FF9ADB34-2AF9-4877-B402-3DDCAD702750}"/>
+                <a16:creationId xmlns:a16="http://schemas.microsoft.com/office/drawing/2014/main" id="{A929FFEB-97F9-4AAE-81C1-11B5DC6850B7}"/>
               </a:ext>
             </a:extLst>
           </p:cNvPr>
@@ -8253,7 +9334,7 @@
           <a:p>
             <a:r>
               <a:rPr lang="en-US" dirty="0"/>
-              <a:t>Correctness Statement</a:t>
+              <a:t>Shortcuts compared to the textbook method</a:t>
             </a:r>
           </a:p>
         </p:txBody>
@@ -8263,7 +9344,7 @@
           <p:cNvPr id="3" name="Inhaltsplatzhalter 2">
             <a:extLst>
               <a:ext uri="{FF2B5EF4-FFF2-40B4-BE49-F238E27FC236}">
-                <a16:creationId xmlns:a16="http://schemas.microsoft.com/office/drawing/2014/main" id="{76B9DF96-D467-4401-BFBB-446ABE98C79F}"/>
+                <a16:creationId xmlns:a16="http://schemas.microsoft.com/office/drawing/2014/main" id="{CB6452AB-3B3D-4DAE-9DC0-92C5D524D106}"/>
               </a:ext>
             </a:extLst>
           </p:cNvPr>
@@ -8278,47 +9359,45 @@
         <p:txBody>
           <a:bodyPr/>
           <a:lstStyle/>
+          <a:p>
+            <a:pPr marL="0" indent="0">
+              <a:buNone/>
+            </a:pPr>
+            <a:r>
+              <a:rPr lang="en-US" dirty="0"/>
+              <a:t>Avoid having to formalize and prove correct the automata</a:t>
+            </a:r>
+          </a:p>
+          <a:p>
+            <a:r>
+              <a:rPr lang="en-US" dirty="0"/>
+              <a:t>construction (notation!)</a:t>
+            </a:r>
+          </a:p>
+          <a:p>
+            <a:r>
+              <a:rPr lang="en-US" dirty="0"/>
+              <a:t>determinization</a:t>
+            </a:r>
+          </a:p>
+          <a:p>
+            <a:r>
+              <a:rPr lang="en-US" dirty="0"/>
+              <a:t>minimization</a:t>
+            </a:r>
+          </a:p>
           <a:p>
             <a:pPr marL="0" indent="0">
               <a:buNone/>
             </a:pPr>
             <a:endParaRPr lang="en-US" dirty="0"/>
           </a:p>
-          <a:p>
-            <a:pPr marL="0" indent="0">
-              <a:buNone/>
-            </a:pPr>
-            <a:r>
-              <a:rPr lang="en-US" dirty="0" err="1"/>
-              <a:t>is_bisimulation</a:t>
-            </a:r>
-            <a:r>
-              <a:rPr lang="en-US" dirty="0"/>
-              <a:t> as </a:t>
-            </a:r>
-            <a:r>
-              <a:rPr lang="en-US" dirty="0" err="1"/>
-              <a:t>ps</a:t>
-            </a:r>
-            <a:r>
-              <a:rPr lang="en-US" dirty="0"/>
-              <a:t> ⟹ (r, s) ∈ </a:t>
-            </a:r>
-            <a:r>
-              <a:rPr lang="en-US" dirty="0" err="1"/>
-              <a:t>ps</a:t>
-            </a:r>
-            <a:r>
-              <a:rPr lang="en-US" dirty="0"/>
-              <a:t> ⟹ L r = L s</a:t>
-            </a:r>
-          </a:p>
         </p:txBody>
       </p:sp>
     </p:spTree>
     <p:extLst>
       <p:ext uri="{BB962C8B-B14F-4D97-AF65-F5344CB8AC3E}">
-        <p14:creationId xmlns:p14="http://schemas.microsoft.com/office/powerpoint/2010/main" val="3235657987"/>
+        <p14:creationId xmlns:p14="http://schemas.microsoft.com/office/powerpoint/2010/main" val="4220785108"/>
       </p:ext>
     </p:extLst>
   </p:cSld>
@@ -8350,7 +9429,7 @@
           <p:cNvPr id="2" name="Titel 1">
             <a:extLst>
               <a:ext uri="{FF2B5EF4-FFF2-40B4-BE49-F238E27FC236}">
-                <a16:creationId xmlns:a16="http://schemas.microsoft.com/office/drawing/2014/main" id="{A929FFEB-97F9-4AAE-81C1-11B5DC6850B7}"/>
+                <a16:creationId xmlns:a16="http://schemas.microsoft.com/office/drawing/2014/main" id="{FF9ADB34-2AF9-4877-B402-3DDCAD702750}"/>
               </a:ext>
             </a:extLst>
           </p:cNvPr>
@@ -8368,7 +9447,7 @@
           <a:p>
             <a:r>
               <a:rPr lang="en-US" dirty="0"/>
-              <a:t>Shortcuts</a:t>
+              <a:t>Correctness Statement</a:t>
             </a:r>
           </a:p>
         </p:txBody>
@@ -8378,7 +9457,7 @@
           <p:cNvPr id="3" name="Inhaltsplatzhalter 2">
             <a:extLst>
               <a:ext uri="{FF2B5EF4-FFF2-40B4-BE49-F238E27FC236}">
-                <a16:creationId xmlns:a16="http://schemas.microsoft.com/office/drawing/2014/main" id="{CB6452AB-3B3D-4DAE-9DC0-92C5D524D106}"/>
+                <a16:creationId xmlns:a16="http://schemas.microsoft.com/office/drawing/2014/main" id="{76B9DF96-D467-4401-BFBB-446ABE98C79F}"/>
               </a:ext>
             </a:extLst>
           </p:cNvPr>
@@ -8393,45 +9472,74 @@
         <p:txBody>
           <a:bodyPr/>
           <a:lstStyle/>
-          <a:p>
-            <a:pPr marL="0" indent="0">
-              <a:buNone/>
-            </a:pPr>
-            <a:r>
-              <a:rPr lang="en-US" dirty="0"/>
-              <a:t>Avoid having to formalize and prove correct the automata</a:t>
-            </a:r>
-          </a:p>
-          <a:p>
-            <a:r>
-              <a:rPr lang="en-US" dirty="0"/>
-              <a:t>construction (notation!)</a:t>
-            </a:r>
-          </a:p>
-          <a:p>
-            <a:r>
-              <a:rPr lang="en-US" dirty="0"/>
-              <a:t>determinization</a:t>
-            </a:r>
-          </a:p>
-          <a:p>
-            <a:r>
-              <a:rPr lang="en-US" dirty="0"/>
-              <a:t>minimization</a:t>
-            </a:r>
-          </a:p>
           <a:p>
             <a:pPr marL="0" indent="0">
               <a:buNone/>
             </a:pPr>
             <a:endParaRPr lang="en-US" dirty="0"/>
           </a:p>
+          <a:p>
+            <a:pPr marL="0" indent="0">
+              <a:buNone/>
+            </a:pPr>
+            <a:r>
+              <a:rPr lang="en-US" i="1" dirty="0" err="1">
+                <a:latin typeface="Cambria Math" panose="02040503050406030204" pitchFamily="18" charset="0"/>
+                <a:ea typeface="Cambria Math" panose="02040503050406030204" pitchFamily="18" charset="0"/>
+              </a:rPr>
+              <a:t>is_bisimulation</a:t>
+            </a:r>
+            <a:r>
+              <a:rPr lang="en-US" i="1" dirty="0">
+                <a:latin typeface="Cambria Math" panose="02040503050406030204" pitchFamily="18" charset="0"/>
+                <a:ea typeface="Cambria Math" panose="02040503050406030204" pitchFamily="18" charset="0"/>
+              </a:rPr>
+              <a:t> as </a:t>
+            </a:r>
+            <a:r>
+              <a:rPr lang="en-US" i="1" dirty="0" err="1">
+                <a:latin typeface="Cambria Math" panose="02040503050406030204" pitchFamily="18" charset="0"/>
+                <a:ea typeface="Cambria Math" panose="02040503050406030204" pitchFamily="18" charset="0"/>
+              </a:rPr>
+              <a:t>ps</a:t>
+            </a:r>
+            <a:endParaRPr lang="en-US" i="1" dirty="0">
+              <a:latin typeface="Cambria Math" panose="02040503050406030204" pitchFamily="18" charset="0"/>
+              <a:ea typeface="Cambria Math" panose="02040503050406030204" pitchFamily="18" charset="0"/>
+            </a:endParaRPr>
+          </a:p>
+          <a:p>
+            <a:pPr marL="0" indent="0">
+              <a:buNone/>
+            </a:pPr>
+            <a:r>
+              <a:rPr lang="en-US" i="1" dirty="0">
+                <a:latin typeface="Cambria Math" panose="02040503050406030204" pitchFamily="18" charset="0"/>
+                <a:ea typeface="Cambria Math" panose="02040503050406030204" pitchFamily="18" charset="0"/>
+              </a:rPr>
+              <a:t>	⟹ (r, s) ∈ </a:t>
+            </a:r>
+            <a:r>
+              <a:rPr lang="en-US" i="1" dirty="0" err="1">
+                <a:latin typeface="Cambria Math" panose="02040503050406030204" pitchFamily="18" charset="0"/>
+                <a:ea typeface="Cambria Math" panose="02040503050406030204" pitchFamily="18" charset="0"/>
+              </a:rPr>
+              <a:t>ps</a:t>
+            </a:r>
+            <a:r>
+              <a:rPr lang="en-US" i="1" dirty="0">
+                <a:latin typeface="Cambria Math" panose="02040503050406030204" pitchFamily="18" charset="0"/>
+                <a:ea typeface="Cambria Math" panose="02040503050406030204" pitchFamily="18" charset="0"/>
+              </a:rPr>
+              <a:t> ⟹ L (r) = L (s)</a:t>
+            </a:r>
+          </a:p>
         </p:txBody>
       </p:sp>
     </p:spTree>
     <p:extLst>
       <p:ext uri="{BB962C8B-B14F-4D97-AF65-F5344CB8AC3E}">
-        <p14:creationId xmlns:p14="http://schemas.microsoft.com/office/powerpoint/2010/main" val="4220785108"/>
+        <p14:creationId xmlns:p14="http://schemas.microsoft.com/office/powerpoint/2010/main" val="3235657987"/>
       </p:ext>
     </p:extLst>
   </p:cSld>
@@ -8722,14 +9830,14 @@
           <a:p>
             <a:r>
               <a:rPr lang="en-US" dirty="0" err="1"/>
-              <a:t>Bisimulations</a:t>
+              <a:t>Bisimulation</a:t>
             </a:r>
             <a:endParaRPr lang="en-US" dirty="0"/>
           </a:p>
         </p:txBody>
       </p:sp>
-      <mc:AlternateContent xmlns:mc="http://schemas.openxmlformats.org/markup-compatibility/2006" xmlns:a14="http://schemas.microsoft.com/office/drawing/2010/main">
-        <mc:Choice Requires="a14">
+      <mc:AlternateContent xmlns:mc="http://schemas.openxmlformats.org/markup-compatibility/2006">
+        <mc:Choice xmlns:a14="http://schemas.microsoft.com/office/drawing/2010/main" Requires="a14">
           <p:sp>
             <p:nvSpPr>
               <p:cNvPr id="3" name="Inhaltsplatzhalter 2">
@@ -8758,10 +9866,13 @@
                 </a:pPr>
                 <a:r>
                   <a:rPr lang="en-US" dirty="0"/>
-                  <a:t>Definition</a:t>
+                  <a:t>Definition:</a:t>
                 </a:r>
               </a:p>
               <a:p>
+                <a:pPr marL="0" indent="0">
+                  <a:buNone/>
+                </a:pPr>
                 <a:r>
                   <a:rPr lang="en-GB" dirty="0"/>
                   <a:t>for all </a:t>
@@ -8782,69 +9893,118 @@
                   </a:rPr>
                   <a:t>B</a:t>
                 </a:r>
-                <a:endParaRPr lang="en-GB" dirty="0"/>
+                <a:r>
+                  <a:rPr lang="en-GB" dirty="0"/>
+                  <a:t>, if </a:t>
+                </a:r>
+                <a:r>
+                  <a:rPr lang="en-GB" i="1" dirty="0">
+                    <a:latin typeface="Lucida Bright" panose="02040602050505020304" pitchFamily="18" charset="0"/>
+                  </a:rPr>
+                  <a:t>A ∼ B</a:t>
+                </a:r>
+                <a:r>
+                  <a:rPr lang="en-GB" dirty="0"/>
+                  <a:t>, then</a:t>
+                </a:r>
+                <a:endParaRPr lang="en-GB" sz="2400" dirty="0"/>
+              </a:p>
+              <a:p>
+                <a:pPr marL="0" indent="0">
+                  <a:buNone/>
+                </a:pPr>
+                <a:r>
+                  <a:rPr lang="en-GB" sz="2400" i="1" dirty="0">
+                    <a:latin typeface="Lucida Bright" panose="02040602050505020304" pitchFamily="18" charset="0"/>
+                  </a:rPr>
+                  <a:t>	[] ∈ A ⟷ [] ∈ B</a:t>
+                </a:r>
+              </a:p>
+              <a:p>
+                <a:pPr marL="0" indent="0">
+                  <a:buNone/>
+                </a:pPr>
+                <a:r>
+                  <a:rPr lang="en-GB" dirty="0"/>
+                  <a:t>   and</a:t>
+                </a:r>
               </a:p>
               <a:p>
                 <a:pPr marL="457200" lvl="1" indent="0">
                   <a:buNone/>
                 </a:pPr>
                 <a:r>
+                  <a:rPr lang="pt-BR" dirty="0">
+                    <a:ea typeface="Cambria Math" panose="02040503050406030204" pitchFamily="18" charset="0"/>
+                  </a:rPr>
+                  <a:t>       </a:t>
+                </a:r>
+                <a14:m>
+                  <m:oMath xmlns:m="http://schemas.openxmlformats.org/officeDocument/2006/math">
+                    <m:sSub>
+                      <m:sSubPr>
+                        <m:ctrlPr>
+                          <a:rPr lang="pt-BR" i="1">
+                            <a:latin typeface="Cambria Math" panose="02040503050406030204" pitchFamily="18" charset="0"/>
+                            <a:ea typeface="Cambria Math" panose="02040503050406030204" pitchFamily="18" charset="0"/>
+                          </a:rPr>
+                        </m:ctrlPr>
+                      </m:sSubPr>
+                      <m:e>
+                        <m:r>
+                          <a:rPr lang="pt-BR" i="1">
+                            <a:latin typeface="Cambria Math" panose="02040503050406030204" pitchFamily="18" charset="0"/>
+                            <a:ea typeface="Cambria Math" panose="02040503050406030204" pitchFamily="18" charset="0"/>
+                          </a:rPr>
+                          <m:t>∀</m:t>
+                        </m:r>
+                        <m:r>
+                          <a:rPr lang="de-DE" b="0" i="1" smtClean="0">
+                            <a:latin typeface="Cambria Math" panose="02040503050406030204" pitchFamily="18" charset="0"/>
+                            <a:ea typeface="Cambria Math" panose="02040503050406030204" pitchFamily="18" charset="0"/>
+                          </a:rPr>
+                          <m:t>𝑥</m:t>
+                        </m:r>
+                        <m:r>
+                          <a:rPr lang="de-DE" b="0" i="1" smtClean="0">
+                            <a:latin typeface="Cambria Math" panose="02040503050406030204" pitchFamily="18" charset="0"/>
+                            <a:ea typeface="Cambria Math" panose="02040503050406030204" pitchFamily="18" charset="0"/>
+                          </a:rPr>
+                          <m:t>. </m:t>
+                        </m:r>
+                        <m:r>
+                          <a:rPr lang="de-DE" i="1">
+                            <a:latin typeface="Cambria Math" panose="02040503050406030204" pitchFamily="18" charset="0"/>
+                            <a:ea typeface="Cambria Math" panose="02040503050406030204" pitchFamily="18" charset="0"/>
+                          </a:rPr>
+                          <m:t>𝐷</m:t>
+                        </m:r>
+                      </m:e>
+                      <m:sub>
+                        <m:r>
+                          <a:rPr lang="de-DE" i="1">
+                            <a:latin typeface="Cambria Math" panose="02040503050406030204" pitchFamily="18" charset="0"/>
+                            <a:ea typeface="Cambria Math" panose="02040503050406030204" pitchFamily="18" charset="0"/>
+                          </a:rPr>
+                          <m:t>𝑥</m:t>
+                        </m:r>
+                      </m:sub>
+                    </m:sSub>
+                  </m:oMath>
+                </a14:m>
+                <a:r>
+                  <a:rPr lang="pt-BR" i="1" dirty="0">
+                    <a:latin typeface="Lucida Bright" panose="02040602050505020304" pitchFamily="18" charset="0"/>
+                    <a:ea typeface="Cambria Math" panose="02040503050406030204" pitchFamily="18" charset="0"/>
+                    <a:cs typeface="Times New Roman" panose="02020603050405020304" pitchFamily="18" charset="0"/>
+                  </a:rPr>
+                  <a:t> (A)</a:t>
+                </a:r>
+                <a:r>
                   <a:rPr lang="en-GB" i="1" dirty="0">
                     <a:latin typeface="Lucida Bright" panose="02040602050505020304" pitchFamily="18" charset="0"/>
                   </a:rPr>
-                  <a:t>A ∼ B ⟹ [] ∈ A ⟷ [] ∈ B</a:t>
-                </a:r>
-              </a:p>
-              <a:p>
-                <a:r>
-                  <a:rPr lang="en-GB" dirty="0"/>
-                  <a:t>for all </a:t>
-                </a:r>
-                <a:r>
-                  <a:rPr lang="en-GB" i="1" dirty="0">
-                    <a:latin typeface="Lucida Bright" panose="02040602050505020304" pitchFamily="18" charset="0"/>
-                    <a:ea typeface="Cambria Math" panose="02040503050406030204" pitchFamily="18" charset="0"/>
-                  </a:rPr>
-                  <a:t>A</a:t>
-                </a:r>
-                <a:r>
-                  <a:rPr lang="en-GB" dirty="0"/>
-                  <a:t> and </a:t>
-                </a:r>
-                <a:r>
-                  <a:rPr lang="en-GB" i="1" dirty="0">
-                    <a:latin typeface="Lucida Bright" panose="02040602050505020304" pitchFamily="18" charset="0"/>
-                  </a:rPr>
-                  <a:t>B</a:t>
-                </a:r>
-                <a:r>
-                  <a:rPr lang="en-GB" i="1" dirty="0">
-                    <a:latin typeface="Cambria Math" panose="02040503050406030204" pitchFamily="18" charset="0"/>
-                    <a:ea typeface="Cambria Math" panose="02040503050406030204" pitchFamily="18" charset="0"/>
-                  </a:rPr>
-                  <a:t> </a:t>
-                </a:r>
-                <a:r>
-                  <a:rPr lang="en-GB" dirty="0"/>
-                  <a:t>and </a:t>
-                </a:r>
-                <a:r>
-                  <a:rPr lang="en-GB" i="1" dirty="0">
-                    <a:latin typeface="Lucida Bright" panose="02040602050505020304" pitchFamily="18" charset="0"/>
-                  </a:rPr>
-                  <a:t>x</a:t>
-                </a:r>
-                <a:endParaRPr lang="en-GB" dirty="0"/>
-              </a:p>
-              <a:p>
-                <a:pPr marL="457200" lvl="1" indent="0">
-                  <a:buNone/>
-                </a:pPr>
-                <a:r>
-                  <a:rPr lang="en-GB" i="1" dirty="0">
-                    <a:latin typeface="Lucida Bright" panose="02040602050505020304" pitchFamily="18" charset="0"/>
-                  </a:rPr>
-                  <a:t>A ∼ B ⟹ </a:t>
+                  <a:t> ∼ </a:t>
                 </a:r>
                 <a14:m>
                   <m:oMath xmlns:m="http://schemas.openxmlformats.org/officeDocument/2006/math">
@@ -8884,52 +10044,6 @@
                     <a:ea typeface="Cambria Math" panose="02040503050406030204" pitchFamily="18" charset="0"/>
                     <a:cs typeface="Times New Roman" panose="02020603050405020304" pitchFamily="18" charset="0"/>
                   </a:rPr>
-                  <a:t> (A)</a:t>
-                </a:r>
-                <a:r>
-                  <a:rPr lang="en-GB" i="1" dirty="0">
-                    <a:latin typeface="Lucida Bright" panose="02040602050505020304" pitchFamily="18" charset="0"/>
-                  </a:rPr>
-                  <a:t> ∼ </a:t>
-                </a:r>
-                <a14:m>
-                  <m:oMath xmlns:m="http://schemas.openxmlformats.org/officeDocument/2006/math">
-                    <m:sSub>
-                      <m:sSubPr>
-                        <m:ctrlPr>
-                          <a:rPr lang="pt-BR" i="1">
-                            <a:latin typeface="Cambria Math" panose="02040503050406030204" pitchFamily="18" charset="0"/>
-                            <a:ea typeface="Cambria Math" panose="02040503050406030204" pitchFamily="18" charset="0"/>
-                          </a:rPr>
-                        </m:ctrlPr>
-                      </m:sSubPr>
-                      <m:e>
-                        <m:r>
-                          <a:rPr lang="de-DE" i="1">
-                            <a:latin typeface="Cambria Math" panose="02040503050406030204" pitchFamily="18" charset="0"/>
-                            <a:ea typeface="Cambria Math" panose="02040503050406030204" pitchFamily="18" charset="0"/>
-                          </a:rPr>
-                          <m:t>𝐷</m:t>
-                        </m:r>
-                      </m:e>
-                      <m:sub>
-                        <m:r>
-                          <a:rPr lang="de-DE" i="1">
-                            <a:latin typeface="Cambria Math" panose="02040503050406030204" pitchFamily="18" charset="0"/>
-                            <a:ea typeface="Cambria Math" panose="02040503050406030204" pitchFamily="18" charset="0"/>
-                          </a:rPr>
-                          <m:t>𝑥</m:t>
-                        </m:r>
-                      </m:sub>
-                    </m:sSub>
-                  </m:oMath>
-                </a14:m>
-                <a:r>
-                  <a:rPr lang="pt-BR" i="1" dirty="0">
-                    <a:latin typeface="Lucida Bright" panose="02040602050505020304" pitchFamily="18" charset="0"/>
-                    <a:ea typeface="Cambria Math" panose="02040503050406030204" pitchFamily="18" charset="0"/>
-                    <a:cs typeface="Times New Roman" panose="02020603050405020304" pitchFamily="18" charset="0"/>
-                  </a:rPr>
                   <a:t> (B)</a:t>
                 </a:r>
                 <a:r>
@@ -9004,7 +10118,7 @@
             </p:txBody>
           </p:sp>
         </mc:Choice>
-        <mc:Fallback xmlns="">
+        <mc:Fallback>
           <p:sp>
             <p:nvSpPr>
               <p:cNvPr id="3" name="Inhaltsplatzhalter 2">
@@ -9996,8 +11110,8 @@
           </a:p>
         </p:txBody>
       </p:sp>
-      <mc:AlternateContent xmlns:mc="http://schemas.openxmlformats.org/markup-compatibility/2006" xmlns:a14="http://schemas.microsoft.com/office/drawing/2010/main">
-        <mc:Choice Requires="a14">
+      <mc:AlternateContent xmlns:mc="http://schemas.openxmlformats.org/markup-compatibility/2006">
+        <mc:Choice xmlns:a14="http://schemas.microsoft.com/office/drawing/2010/main" Requires="a14">
           <p:sp>
             <p:nvSpPr>
               <p:cNvPr id="3" name="Inhaltsplatzhalter 2">
@@ -10035,33 +11149,27 @@
                       </m:sSubPr>
                       <m:e>
                         <m:r>
-                          <m:rPr>
-                            <m:sty m:val="p"/>
-                          </m:rPr>
-                          <a:rPr lang="de-DE" i="0">
+                          <a:rPr lang="de-DE" i="1">
                             <a:latin typeface="Cambria Math" panose="02040503050406030204" pitchFamily="18" charset="0"/>
                             <a:ea typeface="Cambria Math" panose="02040503050406030204" pitchFamily="18" charset="0"/>
                           </a:rPr>
-                          <m:t>d</m:t>
+                          <m:t>𝑑</m:t>
                         </m:r>
                       </m:e>
                       <m:sub>
                         <m:r>
-                          <m:rPr>
-                            <m:sty m:val="p"/>
-                          </m:rPr>
-                          <a:rPr lang="de-DE" i="0">
+                          <a:rPr lang="de-DE" i="1">
                             <a:latin typeface="Cambria Math" panose="02040503050406030204" pitchFamily="18" charset="0"/>
                             <a:ea typeface="Cambria Math" panose="02040503050406030204" pitchFamily="18" charset="0"/>
                           </a:rPr>
-                          <m:t>a</m:t>
+                          <m:t>𝑎</m:t>
                         </m:r>
                       </m:sub>
                     </m:sSub>
                   </m:oMath>
                 </a14:m>
                 <a:r>
-                  <a:rPr lang="en-GB" dirty="0">
+                  <a:rPr lang="en-GB" i="1" dirty="0">
                     <a:latin typeface="Cambria Math" panose="02040503050406030204" pitchFamily="18" charset="0"/>
                     <a:ea typeface="Cambria Math" panose="02040503050406030204" pitchFamily="18" charset="0"/>
                   </a:rPr>
@@ -10073,7 +11181,7 @@
                   <a:buNone/>
                 </a:pPr>
                 <a:r>
-                  <a:rPr lang="en-GB" dirty="0">
+                  <a:rPr lang="en-GB" i="1" dirty="0">
                     <a:latin typeface="Cambria Math" panose="02040503050406030204" pitchFamily="18" charset="0"/>
                     <a:ea typeface="Cambria Math" panose="02040503050406030204" pitchFamily="18" charset="0"/>
                   </a:rPr>
@@ -10138,25 +11246,11 @@
                   <a:buNone/>
                 </a:pPr>
                 <a:r>
-                  <a:rPr lang="en-GB" dirty="0">
-                    <a:latin typeface="Cambria Math" panose="02040503050406030204" pitchFamily="18" charset="0"/>
-                    <a:ea typeface="Cambria Math" panose="02040503050406030204" pitchFamily="18" charset="0"/>
-                  </a:rPr>
-                  <a:t>		in if </a:t>
-                </a:r>
-                <a:r>
                   <a:rPr lang="en-GB" i="1" dirty="0">
                     <a:latin typeface="Cambria Math" panose="02040503050406030204" pitchFamily="18" charset="0"/>
                     <a:ea typeface="Cambria Math" panose="02040503050406030204" pitchFamily="18" charset="0"/>
                   </a:rPr>
-                  <a:t>nullable r</a:t>
-                </a:r>
-                <a:r>
-                  <a:rPr lang="en-GB" dirty="0">
-                    <a:latin typeface="Cambria Math" panose="02040503050406030204" pitchFamily="18" charset="0"/>
-                    <a:ea typeface="Cambria Math" panose="02040503050406030204" pitchFamily="18" charset="0"/>
-                  </a:rPr>
-                  <a:t>  then </a:t>
+                  <a:t>		in if nullable r  then </a:t>
                 </a:r>
                 <a:r>
                   <a:rPr lang="en-GB" i="1" dirty="0" err="1">
@@ -10209,14 +11303,7 @@
                     <a:latin typeface="Cambria Math" panose="02040503050406030204" pitchFamily="18" charset="0"/>
                     <a:ea typeface="Cambria Math" panose="02040503050406030204" pitchFamily="18" charset="0"/>
                   </a:rPr>
-                  <a:t> (s) </a:t>
-                </a:r>
-                <a:r>
-                  <a:rPr lang="en-GB" dirty="0">
-                    <a:latin typeface="Cambria Math" panose="02040503050406030204" pitchFamily="18" charset="0"/>
-                    <a:ea typeface="Cambria Math" panose="02040503050406030204" pitchFamily="18" charset="0"/>
-                  </a:rPr>
-                  <a:t>else </a:t>
+                  <a:t> (s) else </a:t>
                 </a:r>
                 <a:r>
                   <a:rPr lang="en-GB" i="1" dirty="0" err="1">
@@ -10226,7 +11313,7 @@
                   <a:t>drs</a:t>
                 </a:r>
                 <a:r>
-                  <a:rPr lang="en-GB" dirty="0">
+                  <a:rPr lang="en-GB" i="1" dirty="0">
                     <a:latin typeface="Cambria Math" panose="02040503050406030204" pitchFamily="18" charset="0"/>
                     <a:ea typeface="Cambria Math" panose="02040503050406030204" pitchFamily="18" charset="0"/>
                   </a:rPr>
@@ -10256,31 +11343,25 @@
                       </m:sSubPr>
                       <m:e>
                         <m:r>
-                          <m:rPr>
-                            <m:sty m:val="p"/>
-                          </m:rPr>
-                          <a:rPr lang="de-DE" i="0">
+                          <a:rPr lang="de-DE" i="1">
                             <a:latin typeface="Cambria Math" panose="02040503050406030204" pitchFamily="18" charset="0"/>
                             <a:ea typeface="Cambria Math" panose="02040503050406030204" pitchFamily="18" charset="0"/>
                           </a:rPr>
-                          <m:t>d</m:t>
+                          <m:t>𝑑</m:t>
                         </m:r>
                       </m:e>
                       <m:sub>
                         <m:r>
-                          <m:rPr>
-                            <m:sty m:val="p"/>
-                          </m:rPr>
-                          <a:rPr lang="de-DE" i="0">
+                          <a:rPr lang="de-DE" i="1">
                             <a:latin typeface="Cambria Math" panose="02040503050406030204" pitchFamily="18" charset="0"/>
                             <a:ea typeface="Cambria Math" panose="02040503050406030204" pitchFamily="18" charset="0"/>
                           </a:rPr>
-                          <m:t>a</m:t>
+                          <m:t>𝑎</m:t>
                         </m:r>
                       </m:sub>
                     </m:sSub>
                     <m:r>
-                      <a:rPr lang="de-DE" i="0">
+                      <a:rPr lang="de-DE" i="1">
                         <a:latin typeface="Cambria Math" panose="02040503050406030204" pitchFamily="18" charset="0"/>
                         <a:ea typeface="Cambria Math" panose="02040503050406030204" pitchFamily="18" charset="0"/>
                       </a:rPr>
@@ -10289,7 +11370,7 @@
                   </m:oMath>
                 </a14:m>
                 <a:r>
-                  <a:rPr lang="pt-BR" dirty="0">
+                  <a:rPr lang="pt-BR" i="1" dirty="0">
                     <a:latin typeface="Cambria Math" panose="02040503050406030204" pitchFamily="18" charset="0"/>
                     <a:ea typeface="Cambria Math" panose="02040503050406030204" pitchFamily="18" charset="0"/>
                   </a:rPr>
@@ -10308,61 +11389,48 @@
                       </m:sSubPr>
                       <m:e>
                         <m:r>
-                          <m:rPr>
-                            <m:sty m:val="p"/>
-                          </m:rPr>
-                          <a:rPr lang="de-DE" i="0">
+                          <a:rPr lang="de-DE" i="1">
                             <a:latin typeface="Cambria Math" panose="02040503050406030204" pitchFamily="18" charset="0"/>
                             <a:ea typeface="Cambria Math" panose="02040503050406030204" pitchFamily="18" charset="0"/>
                           </a:rPr>
-                          <m:t>d</m:t>
+                          <m:t>𝑑</m:t>
                         </m:r>
                       </m:e>
                       <m:sub>
                         <m:r>
-                          <m:rPr>
-                            <m:sty m:val="p"/>
-                          </m:rPr>
-                          <a:rPr lang="de-DE" i="0">
+                          <a:rPr lang="de-DE" i="1">
                             <a:latin typeface="Cambria Math" panose="02040503050406030204" pitchFamily="18" charset="0"/>
                             <a:ea typeface="Cambria Math" panose="02040503050406030204" pitchFamily="18" charset="0"/>
                           </a:rPr>
-                          <m:t>a</m:t>
+                          <m:t>𝑎</m:t>
                         </m:r>
                       </m:sub>
                     </m:sSub>
                     <m:r>
-                      <a:rPr lang="de-DE" i="0">
+                      <a:rPr lang="de-DE" i="1">
                         <a:latin typeface="Cambria Math" panose="02040503050406030204" pitchFamily="18" charset="0"/>
                         <a:ea typeface="Cambria Math" panose="02040503050406030204" pitchFamily="18" charset="0"/>
                       </a:rPr>
                       <m:t> </m:t>
                     </m:r>
-                    <m:r>
-                      <a:rPr lang="de-DE" b="0" i="0" smtClean="0">
-                        <a:latin typeface="Cambria Math" panose="02040503050406030204" pitchFamily="18" charset="0"/>
-                        <a:ea typeface="Cambria Math" panose="02040503050406030204" pitchFamily="18" charset="0"/>
-                      </a:rPr>
-                      <m:t>(</m:t>
-                    </m:r>
                   </m:oMath>
                 </a14:m>
                 <a:r>
-                  <a:rPr lang="pt-BR" dirty="0">
+                  <a:rPr lang="pt-BR" i="1" dirty="0">
                     <a:latin typeface="Cambria Math" panose="02040503050406030204" pitchFamily="18" charset="0"/>
                     <a:ea typeface="Cambria Math" panose="02040503050406030204" pitchFamily="18" charset="0"/>
                   </a:rPr>
-                  <a:t>r) </a:t>
-                </a:r>
-                <a:r>
-                  <a:rPr lang="en-GB" dirty="0">
+                  <a:t>(r) </a:t>
+                </a:r>
+                <a:r>
+                  <a:rPr lang="en-GB" i="1" dirty="0">
                     <a:latin typeface="Cambria Math" panose="02040503050406030204" pitchFamily="18" charset="0"/>
                     <a:ea typeface="Cambria Math" panose="02040503050406030204" pitchFamily="18" charset="0"/>
                   </a:rPr>
                   <a:t>⋅</a:t>
                 </a:r>
                 <a:r>
-                  <a:rPr lang="pt-BR" dirty="0">
+                  <a:rPr lang="pt-BR" i="1" dirty="0">
                     <a:latin typeface="Cambria Math" panose="02040503050406030204" pitchFamily="18" charset="0"/>
                     <a:ea typeface="Cambria Math" panose="02040503050406030204" pitchFamily="18" charset="0"/>
                   </a:rPr>
@@ -10387,7 +11455,7 @@
                     <a:latin typeface="Cambria Math" panose="02040503050406030204" pitchFamily="18" charset="0"/>
                     <a:ea typeface="Cambria Math" panose="02040503050406030204" pitchFamily="18" charset="0"/>
                   </a:rPr>
-                  <a:t>	―</a:t>
+                  <a:t>	</a:t>
                 </a:r>
               </a:p>
               <a:p>
@@ -10548,12 +11616,12 @@
                   <a:t> </a:t>
                 </a:r>
                 <a:r>
-                  <a:rPr lang="pt-BR" i="1" dirty="0">
+                  <a:rPr lang="pt-BR" dirty="0">
                     <a:ea typeface="Cambria Math" panose="02040503050406030204" pitchFamily="18" charset="0"/>
                   </a:rPr>
                   <a:t>follows by structural induction.</a:t>
                 </a:r>
-                <a:endParaRPr lang="pt-BR" i="1" dirty="0">
+                <a:endParaRPr lang="pt-BR" dirty="0">
                   <a:latin typeface="Lucida Bright" panose="02040602050505020304" pitchFamily="18" charset="0"/>
                   <a:ea typeface="Cambria Math" panose="02040503050406030204" pitchFamily="18" charset="0"/>
                 </a:endParaRPr>
@@ -10561,7 +11629,7 @@
             </p:txBody>
           </p:sp>
         </mc:Choice>
-        <mc:Fallback xmlns="">
+        <mc:Fallback>
           <p:sp>
             <p:nvSpPr>
               <p:cNvPr id="3" name="Inhaltsplatzhalter 2">
@@ -10601,6 +11669,51 @@
           </p:sp>
         </mc:Fallback>
       </mc:AlternateContent>
+      <p:cxnSp>
+        <p:nvCxnSpPr>
+          <p:cNvPr id="5" name="Gerader Verbinder 4">
+            <a:extLst>
+              <a:ext uri="{FF2B5EF4-FFF2-40B4-BE49-F238E27FC236}">
+                <a16:creationId xmlns:a16="http://schemas.microsoft.com/office/drawing/2014/main" id="{CD99C618-0A36-476F-BCA0-8DA59180F778}"/>
+              </a:ext>
+            </a:extLst>
+          </p:cNvPr>
+          <p:cNvCxnSpPr>
+            <a:cxnSpLocks/>
+          </p:cNvCxnSpPr>
+          <p:nvPr/>
+        </p:nvCxnSpPr>
+        <p:spPr>
+          <a:xfrm>
+            <a:off x="948267" y="4921956"/>
+            <a:ext cx="7710311" cy="0"/>
+          </a:xfrm>
+          <a:prstGeom prst="line">
+            <a:avLst/>
+          </a:prstGeom>
+          <a:ln>
+            <a:solidFill>
+              <a:schemeClr val="bg2">
+                <a:lumMod val="90000"/>
+              </a:schemeClr>
+            </a:solidFill>
+          </a:ln>
+        </p:spPr>
+        <p:style>
+          <a:lnRef idx="1">
+            <a:schemeClr val="accent1"/>
+          </a:lnRef>
+          <a:fillRef idx="0">
+            <a:schemeClr val="accent1"/>
+          </a:fillRef>
+          <a:effectRef idx="0">
+            <a:schemeClr val="accent1"/>
+          </a:effectRef>
+          <a:fontRef idx="minor">
+            <a:schemeClr val="tx1"/>
+          </a:fontRef>
+        </p:style>
+      </p:cxnSp>
     </p:spTree>
     <p:extLst>
       <p:ext uri="{BB962C8B-B14F-4D97-AF65-F5344CB8AC3E}">

</xml_diff>